<commit_message>
1st draft O1 complete
Really needs to be a lot shorter, but it's a start.
</commit_message>
<xml_diff>
--- a/graphics/Graphics.pptx
+++ b/graphics/Graphics.pptx
@@ -12,6 +12,9 @@
     <p:sldId id="261" r:id="rId6"/>
     <p:sldId id="263" r:id="rId7"/>
     <p:sldId id="262" r:id="rId8"/>
+    <p:sldId id="264" r:id="rId9"/>
+    <p:sldId id="265" r:id="rId10"/>
+    <p:sldId id="266" r:id="rId11"/>
   </p:sldIdLst>
   <p:sldSz cx="6858000" cy="9906000" type="A4"/>
   <p:notesSz cx="6858000" cy="9144000"/>
@@ -260,7 +263,7 @@
           <a:p>
             <a:fld id="{84CBB076-2C69-DC49-A9FF-99213B15956D}" type="datetimeFigureOut">
               <a:rPr lang="en-AU" smtClean="0"/>
-              <a:t>23/11/22</a:t>
+              <a:t>26/11/22</a:t>
             </a:fld>
             <a:endParaRPr lang="en-AU"/>
           </a:p>
@@ -430,7 +433,7 @@
           <a:p>
             <a:fld id="{84CBB076-2C69-DC49-A9FF-99213B15956D}" type="datetimeFigureOut">
               <a:rPr lang="en-AU" smtClean="0"/>
-              <a:t>23/11/22</a:t>
+              <a:t>26/11/22</a:t>
             </a:fld>
             <a:endParaRPr lang="en-AU"/>
           </a:p>
@@ -610,7 +613,7 @@
           <a:p>
             <a:fld id="{84CBB076-2C69-DC49-A9FF-99213B15956D}" type="datetimeFigureOut">
               <a:rPr lang="en-AU" smtClean="0"/>
-              <a:t>23/11/22</a:t>
+              <a:t>26/11/22</a:t>
             </a:fld>
             <a:endParaRPr lang="en-AU"/>
           </a:p>
@@ -780,7 +783,7 @@
           <a:p>
             <a:fld id="{84CBB076-2C69-DC49-A9FF-99213B15956D}" type="datetimeFigureOut">
               <a:rPr lang="en-AU" smtClean="0"/>
-              <a:t>23/11/22</a:t>
+              <a:t>26/11/22</a:t>
             </a:fld>
             <a:endParaRPr lang="en-AU"/>
           </a:p>
@@ -1024,7 +1027,7 @@
           <a:p>
             <a:fld id="{84CBB076-2C69-DC49-A9FF-99213B15956D}" type="datetimeFigureOut">
               <a:rPr lang="en-AU" smtClean="0"/>
-              <a:t>23/11/22</a:t>
+              <a:t>26/11/22</a:t>
             </a:fld>
             <a:endParaRPr lang="en-AU"/>
           </a:p>
@@ -1256,7 +1259,7 @@
           <a:p>
             <a:fld id="{84CBB076-2C69-DC49-A9FF-99213B15956D}" type="datetimeFigureOut">
               <a:rPr lang="en-AU" smtClean="0"/>
-              <a:t>23/11/22</a:t>
+              <a:t>26/11/22</a:t>
             </a:fld>
             <a:endParaRPr lang="en-AU"/>
           </a:p>
@@ -1623,7 +1626,7 @@
           <a:p>
             <a:fld id="{84CBB076-2C69-DC49-A9FF-99213B15956D}" type="datetimeFigureOut">
               <a:rPr lang="en-AU" smtClean="0"/>
-              <a:t>23/11/22</a:t>
+              <a:t>26/11/22</a:t>
             </a:fld>
             <a:endParaRPr lang="en-AU"/>
           </a:p>
@@ -1741,7 +1744,7 @@
           <a:p>
             <a:fld id="{84CBB076-2C69-DC49-A9FF-99213B15956D}" type="datetimeFigureOut">
               <a:rPr lang="en-AU" smtClean="0"/>
-              <a:t>23/11/22</a:t>
+              <a:t>26/11/22</a:t>
             </a:fld>
             <a:endParaRPr lang="en-AU"/>
           </a:p>
@@ -1836,7 +1839,7 @@
           <a:p>
             <a:fld id="{84CBB076-2C69-DC49-A9FF-99213B15956D}" type="datetimeFigureOut">
               <a:rPr lang="en-AU" smtClean="0"/>
-              <a:t>23/11/22</a:t>
+              <a:t>26/11/22</a:t>
             </a:fld>
             <a:endParaRPr lang="en-AU"/>
           </a:p>
@@ -2113,7 +2116,7 @@
           <a:p>
             <a:fld id="{84CBB076-2C69-DC49-A9FF-99213B15956D}" type="datetimeFigureOut">
               <a:rPr lang="en-AU" smtClean="0"/>
-              <a:t>23/11/22</a:t>
+              <a:t>26/11/22</a:t>
             </a:fld>
             <a:endParaRPr lang="en-AU"/>
           </a:p>
@@ -2370,7 +2373,7 @@
           <a:p>
             <a:fld id="{84CBB076-2C69-DC49-A9FF-99213B15956D}" type="datetimeFigureOut">
               <a:rPr lang="en-AU" smtClean="0"/>
-              <a:t>23/11/22</a:t>
+              <a:t>26/11/22</a:t>
             </a:fld>
             <a:endParaRPr lang="en-AU"/>
           </a:p>
@@ -2583,7 +2586,7 @@
           <a:p>
             <a:fld id="{84CBB076-2C69-DC49-A9FF-99213B15956D}" type="datetimeFigureOut">
               <a:rPr lang="en-AU" smtClean="0"/>
-              <a:t>23/11/22</a:t>
+              <a:t>26/11/22</a:t>
             </a:fld>
             <a:endParaRPr lang="en-AU"/>
           </a:p>
@@ -4124,6 +4127,1233 @@
 </p:sld>
 </file>
 
+<file path=ppt/slides/slide10.xml><?xml version="1.0" encoding="utf-8"?>
+<p:sld xmlns:a="http://schemas.openxmlformats.org/drawingml/2006/main" xmlns:r="http://schemas.openxmlformats.org/officeDocument/2006/relationships" xmlns:p="http://schemas.openxmlformats.org/presentationml/2006/main">
+  <p:cSld>
+    <p:spTree>
+      <p:nvGrpSpPr>
+        <p:cNvPr id="1" name=""/>
+        <p:cNvGrpSpPr/>
+        <p:nvPr/>
+      </p:nvGrpSpPr>
+      <p:grpSpPr>
+        <a:xfrm>
+          <a:off x="0" y="0"/>
+          <a:ext cx="0" cy="0"/>
+          <a:chOff x="0" y="0"/>
+          <a:chExt cx="0" cy="0"/>
+        </a:xfrm>
+      </p:grpSpPr>
+      <p:sp>
+        <p:nvSpPr>
+          <p:cNvPr id="4" name="Rounded Rectangle 3">
+            <a:extLst>
+              <a:ext uri="{FF2B5EF4-FFF2-40B4-BE49-F238E27FC236}">
+                <a16:creationId xmlns:a16="http://schemas.microsoft.com/office/drawing/2014/main" id="{70652F4E-8EA6-2C4D-A4F0-52433013FDED}"/>
+              </a:ext>
+            </a:extLst>
+          </p:cNvPr>
+          <p:cNvSpPr>
+            <a:spLocks noChangeAspect="1"/>
+          </p:cNvSpPr>
+          <p:nvPr/>
+        </p:nvSpPr>
+        <p:spPr>
+          <a:xfrm>
+            <a:off x="1953463" y="2114322"/>
+            <a:ext cx="3240000" cy="5604325"/>
+          </a:xfrm>
+          <a:prstGeom prst="roundRect">
+            <a:avLst/>
+          </a:prstGeom>
+          <a:noFill/>
+          <a:ln w="38100">
+            <a:solidFill>
+              <a:schemeClr val="tx1"/>
+            </a:solidFill>
+          </a:ln>
+        </p:spPr>
+        <p:style>
+          <a:lnRef idx="2">
+            <a:schemeClr val="accent1">
+              <a:shade val="50000"/>
+            </a:schemeClr>
+          </a:lnRef>
+          <a:fillRef idx="1">
+            <a:schemeClr val="accent1"/>
+          </a:fillRef>
+          <a:effectRef idx="0">
+            <a:schemeClr val="accent1"/>
+          </a:effectRef>
+          <a:fontRef idx="minor">
+            <a:schemeClr val="lt1"/>
+          </a:fontRef>
+        </p:style>
+        <p:txBody>
+          <a:bodyPr rtlCol="0" anchor="ctr"/>
+          <a:lstStyle/>
+          <a:p>
+            <a:pPr algn="ctr"/>
+            <a:endParaRPr lang="en-AU"/>
+          </a:p>
+        </p:txBody>
+      </p:sp>
+      <p:sp>
+        <p:nvSpPr>
+          <p:cNvPr id="5" name="Rounded Rectangle 4">
+            <a:extLst>
+              <a:ext uri="{FF2B5EF4-FFF2-40B4-BE49-F238E27FC236}">
+                <a16:creationId xmlns:a16="http://schemas.microsoft.com/office/drawing/2014/main" id="{3C953649-ED7C-3742-AAEA-8B243B81C427}"/>
+              </a:ext>
+            </a:extLst>
+          </p:cNvPr>
+          <p:cNvSpPr>
+            <a:spLocks noChangeAspect="1"/>
+          </p:cNvSpPr>
+          <p:nvPr/>
+        </p:nvSpPr>
+        <p:spPr>
+          <a:xfrm>
+            <a:off x="1953463" y="7718649"/>
+            <a:ext cx="3240000" cy="1576217"/>
+          </a:xfrm>
+          <a:prstGeom prst="roundRect">
+            <a:avLst/>
+          </a:prstGeom>
+          <a:solidFill>
+            <a:schemeClr val="accent6">
+              <a:lumMod val="40000"/>
+              <a:lumOff val="60000"/>
+            </a:schemeClr>
+          </a:solidFill>
+          <a:ln w="38100">
+            <a:solidFill>
+              <a:schemeClr val="tx1"/>
+            </a:solidFill>
+          </a:ln>
+        </p:spPr>
+        <p:style>
+          <a:lnRef idx="2">
+            <a:schemeClr val="accent1">
+              <a:shade val="50000"/>
+            </a:schemeClr>
+          </a:lnRef>
+          <a:fillRef idx="1">
+            <a:schemeClr val="accent1"/>
+          </a:fillRef>
+          <a:effectRef idx="0">
+            <a:schemeClr val="accent1"/>
+          </a:effectRef>
+          <a:fontRef idx="minor">
+            <a:schemeClr val="lt1"/>
+          </a:fontRef>
+        </p:style>
+        <p:txBody>
+          <a:bodyPr rtlCol="0" anchor="ctr"/>
+          <a:lstStyle/>
+          <a:p>
+            <a:pPr algn="ctr"/>
+            <a:endParaRPr lang="en-AU"/>
+          </a:p>
+        </p:txBody>
+      </p:sp>
+      <p:sp>
+        <p:nvSpPr>
+          <p:cNvPr id="6" name="Rounded Rectangle 5">
+            <a:extLst>
+              <a:ext uri="{FF2B5EF4-FFF2-40B4-BE49-F238E27FC236}">
+                <a16:creationId xmlns:a16="http://schemas.microsoft.com/office/drawing/2014/main" id="{781AE066-2F6F-CD4A-8C9D-2174A5C270BE}"/>
+              </a:ext>
+            </a:extLst>
+          </p:cNvPr>
+          <p:cNvSpPr>
+            <a:spLocks noChangeAspect="1"/>
+          </p:cNvSpPr>
+          <p:nvPr/>
+        </p:nvSpPr>
+        <p:spPr>
+          <a:xfrm>
+            <a:off x="1953463" y="520745"/>
+            <a:ext cx="3240000" cy="1576217"/>
+          </a:xfrm>
+          <a:prstGeom prst="roundRect">
+            <a:avLst/>
+          </a:prstGeom>
+          <a:solidFill>
+            <a:srgbClr val="FF0000"/>
+          </a:solidFill>
+          <a:ln w="38100">
+            <a:solidFill>
+              <a:schemeClr val="tx1"/>
+            </a:solidFill>
+          </a:ln>
+        </p:spPr>
+        <p:style>
+          <a:lnRef idx="2">
+            <a:schemeClr val="accent1">
+              <a:shade val="50000"/>
+            </a:schemeClr>
+          </a:lnRef>
+          <a:fillRef idx="1">
+            <a:schemeClr val="accent1"/>
+          </a:fillRef>
+          <a:effectRef idx="0">
+            <a:schemeClr val="accent1"/>
+          </a:effectRef>
+          <a:fontRef idx="minor">
+            <a:schemeClr val="lt1"/>
+          </a:fontRef>
+        </p:style>
+        <p:txBody>
+          <a:bodyPr rtlCol="0" anchor="ctr"/>
+          <a:lstStyle/>
+          <a:p>
+            <a:pPr algn="ctr"/>
+            <a:endParaRPr lang="en-AU" dirty="0"/>
+          </a:p>
+        </p:txBody>
+      </p:sp>
+      <p:sp>
+        <p:nvSpPr>
+          <p:cNvPr id="7" name="Rounded Rectangle 6">
+            <a:extLst>
+              <a:ext uri="{FF2B5EF4-FFF2-40B4-BE49-F238E27FC236}">
+                <a16:creationId xmlns:a16="http://schemas.microsoft.com/office/drawing/2014/main" id="{58A277D1-08DF-1A43-AFBF-E7F4DE2FD6BB}"/>
+              </a:ext>
+            </a:extLst>
+          </p:cNvPr>
+          <p:cNvSpPr>
+            <a:spLocks noChangeAspect="1"/>
+          </p:cNvSpPr>
+          <p:nvPr/>
+        </p:nvSpPr>
+        <p:spPr>
+          <a:xfrm>
+            <a:off x="1524892" y="101296"/>
+            <a:ext cx="4114800" cy="9630383"/>
+          </a:xfrm>
+          <a:prstGeom prst="roundRect">
+            <a:avLst/>
+          </a:prstGeom>
+          <a:noFill/>
+          <a:ln w="38100">
+            <a:solidFill>
+              <a:schemeClr val="bg1">
+                <a:lumMod val="50000"/>
+              </a:schemeClr>
+            </a:solidFill>
+            <a:prstDash val="sysDot"/>
+          </a:ln>
+        </p:spPr>
+        <p:style>
+          <a:lnRef idx="2">
+            <a:schemeClr val="accent1">
+              <a:shade val="50000"/>
+            </a:schemeClr>
+          </a:lnRef>
+          <a:fillRef idx="1">
+            <a:schemeClr val="accent1"/>
+          </a:fillRef>
+          <a:effectRef idx="0">
+            <a:schemeClr val="accent1"/>
+          </a:effectRef>
+          <a:fontRef idx="minor">
+            <a:schemeClr val="lt1"/>
+          </a:fontRef>
+        </p:style>
+        <p:txBody>
+          <a:bodyPr rtlCol="0" anchor="ctr"/>
+          <a:lstStyle/>
+          <a:p>
+            <a:pPr algn="ctr"/>
+            <a:endParaRPr lang="en-AU"/>
+          </a:p>
+        </p:txBody>
+      </p:sp>
+      <p:sp>
+        <p:nvSpPr>
+          <p:cNvPr id="12" name="Multiply 11">
+            <a:extLst>
+              <a:ext uri="{FF2B5EF4-FFF2-40B4-BE49-F238E27FC236}">
+                <a16:creationId xmlns:a16="http://schemas.microsoft.com/office/drawing/2014/main" id="{782966C4-8BAB-EC4A-B3CC-ECB9FD404B1E}"/>
+              </a:ext>
+            </a:extLst>
+          </p:cNvPr>
+          <p:cNvSpPr/>
+          <p:nvPr/>
+        </p:nvSpPr>
+        <p:spPr>
+          <a:xfrm>
+            <a:off x="3198571" y="5737186"/>
+            <a:ext cx="767443" cy="849086"/>
+          </a:xfrm>
+          <a:prstGeom prst="mathMultiply">
+            <a:avLst/>
+          </a:prstGeom>
+          <a:noFill/>
+        </p:spPr>
+        <p:style>
+          <a:lnRef idx="2">
+            <a:schemeClr val="accent1">
+              <a:shade val="50000"/>
+            </a:schemeClr>
+          </a:lnRef>
+          <a:fillRef idx="1">
+            <a:schemeClr val="accent1"/>
+          </a:fillRef>
+          <a:effectRef idx="0">
+            <a:schemeClr val="accent1"/>
+          </a:effectRef>
+          <a:fontRef idx="minor">
+            <a:schemeClr val="lt1"/>
+          </a:fontRef>
+        </p:style>
+        <p:txBody>
+          <a:bodyPr rtlCol="0" anchor="ctr"/>
+          <a:lstStyle/>
+          <a:p>
+            <a:pPr algn="ctr"/>
+            <a:endParaRPr lang="en-AU"/>
+          </a:p>
+        </p:txBody>
+      </p:sp>
+      <p:sp>
+        <p:nvSpPr>
+          <p:cNvPr id="13" name="Multiply 12">
+            <a:extLst>
+              <a:ext uri="{FF2B5EF4-FFF2-40B4-BE49-F238E27FC236}">
+                <a16:creationId xmlns:a16="http://schemas.microsoft.com/office/drawing/2014/main" id="{711FF500-E426-0D44-916C-B24A7A610DF5}"/>
+              </a:ext>
+            </a:extLst>
+          </p:cNvPr>
+          <p:cNvSpPr/>
+          <p:nvPr/>
+        </p:nvSpPr>
+        <p:spPr>
+          <a:xfrm>
+            <a:off x="3192236" y="3246701"/>
+            <a:ext cx="767443" cy="849086"/>
+          </a:xfrm>
+          <a:prstGeom prst="mathMultiply">
+            <a:avLst/>
+          </a:prstGeom>
+          <a:noFill/>
+        </p:spPr>
+        <p:style>
+          <a:lnRef idx="2">
+            <a:schemeClr val="accent1">
+              <a:shade val="50000"/>
+            </a:schemeClr>
+          </a:lnRef>
+          <a:fillRef idx="1">
+            <a:schemeClr val="accent1"/>
+          </a:fillRef>
+          <a:effectRef idx="0">
+            <a:schemeClr val="accent1"/>
+          </a:effectRef>
+          <a:fontRef idx="minor">
+            <a:schemeClr val="lt1"/>
+          </a:fontRef>
+        </p:style>
+        <p:txBody>
+          <a:bodyPr rtlCol="0" anchor="ctr"/>
+          <a:lstStyle/>
+          <a:p>
+            <a:pPr algn="ctr"/>
+            <a:endParaRPr lang="en-AU"/>
+          </a:p>
+        </p:txBody>
+      </p:sp>
+      <p:sp>
+        <p:nvSpPr>
+          <p:cNvPr id="14" name="TextBox 13">
+            <a:extLst>
+              <a:ext uri="{FF2B5EF4-FFF2-40B4-BE49-F238E27FC236}">
+                <a16:creationId xmlns:a16="http://schemas.microsoft.com/office/drawing/2014/main" id="{CC9FDAD2-F231-6B43-92F7-C2C2863676C2}"/>
+              </a:ext>
+            </a:extLst>
+          </p:cNvPr>
+          <p:cNvSpPr txBox="1"/>
+          <p:nvPr/>
+        </p:nvSpPr>
+        <p:spPr>
+          <a:xfrm>
+            <a:off x="3582292" y="7938242"/>
+            <a:ext cx="517182" cy="369332"/>
+          </a:xfrm>
+          <a:prstGeom prst="rect">
+            <a:avLst/>
+          </a:prstGeom>
+          <a:noFill/>
+        </p:spPr>
+        <p:txBody>
+          <a:bodyPr wrap="square" rtlCol="0">
+            <a:spAutoFit/>
+          </a:bodyPr>
+          <a:lstStyle/>
+          <a:p>
+            <a:r>
+              <a:rPr lang="en-AU" dirty="0"/>
+              <a:t>O2</a:t>
+            </a:r>
+          </a:p>
+        </p:txBody>
+      </p:sp>
+      <p:sp>
+        <p:nvSpPr>
+          <p:cNvPr id="15" name="TextBox 14">
+            <a:extLst>
+              <a:ext uri="{FF2B5EF4-FFF2-40B4-BE49-F238E27FC236}">
+                <a16:creationId xmlns:a16="http://schemas.microsoft.com/office/drawing/2014/main" id="{3986F052-18AA-4443-A26B-C88FE17F207D}"/>
+              </a:ext>
+            </a:extLst>
+          </p:cNvPr>
+          <p:cNvSpPr txBox="1"/>
+          <p:nvPr/>
+        </p:nvSpPr>
+        <p:spPr>
+          <a:xfrm>
+            <a:off x="4191283" y="8278459"/>
+            <a:ext cx="466518" cy="369332"/>
+          </a:xfrm>
+          <a:prstGeom prst="rect">
+            <a:avLst/>
+          </a:prstGeom>
+          <a:solidFill>
+            <a:schemeClr val="tx1"/>
+          </a:solidFill>
+        </p:spPr>
+        <p:txBody>
+          <a:bodyPr wrap="square" rtlCol="0">
+            <a:spAutoFit/>
+          </a:bodyPr>
+          <a:lstStyle/>
+          <a:p>
+            <a:r>
+              <a:rPr lang="en-AU" dirty="0">
+                <a:solidFill>
+                  <a:schemeClr val="bg1"/>
+                </a:solidFill>
+              </a:rPr>
+              <a:t>O1</a:t>
+            </a:r>
+          </a:p>
+        </p:txBody>
+      </p:sp>
+      <p:sp>
+        <p:nvSpPr>
+          <p:cNvPr id="16" name="TextBox 15">
+            <a:extLst>
+              <a:ext uri="{FF2B5EF4-FFF2-40B4-BE49-F238E27FC236}">
+                <a16:creationId xmlns:a16="http://schemas.microsoft.com/office/drawing/2014/main" id="{EEF04ED5-E466-A243-9D27-7184F13C1262}"/>
+              </a:ext>
+            </a:extLst>
+          </p:cNvPr>
+          <p:cNvSpPr txBox="1"/>
+          <p:nvPr/>
+        </p:nvSpPr>
+        <p:spPr>
+          <a:xfrm>
+            <a:off x="2809942" y="7866197"/>
+            <a:ext cx="517182" cy="369332"/>
+          </a:xfrm>
+          <a:prstGeom prst="rect">
+            <a:avLst/>
+          </a:prstGeom>
+          <a:noFill/>
+        </p:spPr>
+        <p:txBody>
+          <a:bodyPr wrap="square" rtlCol="0">
+            <a:spAutoFit/>
+          </a:bodyPr>
+          <a:lstStyle/>
+          <a:p>
+            <a:r>
+              <a:rPr lang="en-AU" dirty="0"/>
+              <a:t>O3</a:t>
+            </a:r>
+          </a:p>
+        </p:txBody>
+      </p:sp>
+      <p:sp>
+        <p:nvSpPr>
+          <p:cNvPr id="17" name="TextBox 16">
+            <a:extLst>
+              <a:ext uri="{FF2B5EF4-FFF2-40B4-BE49-F238E27FC236}">
+                <a16:creationId xmlns:a16="http://schemas.microsoft.com/office/drawing/2014/main" id="{7AB684D8-9879-0C4A-9489-F87A8809D064}"/>
+              </a:ext>
+            </a:extLst>
+          </p:cNvPr>
+          <p:cNvSpPr txBox="1"/>
+          <p:nvPr/>
+        </p:nvSpPr>
+        <p:spPr>
+          <a:xfrm>
+            <a:off x="2297770" y="8129849"/>
+            <a:ext cx="466518" cy="369332"/>
+          </a:xfrm>
+          <a:prstGeom prst="rect">
+            <a:avLst/>
+          </a:prstGeom>
+          <a:noFill/>
+        </p:spPr>
+        <p:txBody>
+          <a:bodyPr wrap="square" rtlCol="0">
+            <a:spAutoFit/>
+          </a:bodyPr>
+          <a:lstStyle/>
+          <a:p>
+            <a:r>
+              <a:rPr lang="en-AU" dirty="0"/>
+              <a:t>O4</a:t>
+            </a:r>
+          </a:p>
+        </p:txBody>
+      </p:sp>
+      <p:sp>
+        <p:nvSpPr>
+          <p:cNvPr id="18" name="TextBox 17">
+            <a:extLst>
+              <a:ext uri="{FF2B5EF4-FFF2-40B4-BE49-F238E27FC236}">
+                <a16:creationId xmlns:a16="http://schemas.microsoft.com/office/drawing/2014/main" id="{F387E253-DCE8-A344-84ED-5DB76FED00C0}"/>
+              </a:ext>
+            </a:extLst>
+          </p:cNvPr>
+          <p:cNvSpPr txBox="1"/>
+          <p:nvPr/>
+        </p:nvSpPr>
+        <p:spPr>
+          <a:xfrm>
+            <a:off x="4631644" y="7295849"/>
+            <a:ext cx="466518" cy="369332"/>
+          </a:xfrm>
+          <a:prstGeom prst="rect">
+            <a:avLst/>
+          </a:prstGeom>
+          <a:noFill/>
+        </p:spPr>
+        <p:txBody>
+          <a:bodyPr wrap="square" rtlCol="0">
+            <a:spAutoFit/>
+          </a:bodyPr>
+          <a:lstStyle/>
+          <a:p>
+            <a:r>
+              <a:rPr lang="en-AU" dirty="0"/>
+              <a:t>O5</a:t>
+            </a:r>
+          </a:p>
+        </p:txBody>
+      </p:sp>
+      <p:sp>
+        <p:nvSpPr>
+          <p:cNvPr id="19" name="TextBox 18">
+            <a:extLst>
+              <a:ext uri="{FF2B5EF4-FFF2-40B4-BE49-F238E27FC236}">
+                <a16:creationId xmlns:a16="http://schemas.microsoft.com/office/drawing/2014/main" id="{A2087CBC-C5DF-574A-BDD6-786E46B4A1F8}"/>
+              </a:ext>
+            </a:extLst>
+          </p:cNvPr>
+          <p:cNvSpPr txBox="1"/>
+          <p:nvPr/>
+        </p:nvSpPr>
+        <p:spPr>
+          <a:xfrm>
+            <a:off x="3392984" y="6723584"/>
+            <a:ext cx="466518" cy="369332"/>
+          </a:xfrm>
+          <a:prstGeom prst="rect">
+            <a:avLst/>
+          </a:prstGeom>
+          <a:noFill/>
+        </p:spPr>
+        <p:txBody>
+          <a:bodyPr wrap="square" rtlCol="0">
+            <a:spAutoFit/>
+          </a:bodyPr>
+          <a:lstStyle/>
+          <a:p>
+            <a:r>
+              <a:rPr lang="en-AU" dirty="0"/>
+              <a:t>O6</a:t>
+            </a:r>
+          </a:p>
+        </p:txBody>
+      </p:sp>
+      <p:sp>
+        <p:nvSpPr>
+          <p:cNvPr id="20" name="TextBox 19">
+            <a:extLst>
+              <a:ext uri="{FF2B5EF4-FFF2-40B4-BE49-F238E27FC236}">
+                <a16:creationId xmlns:a16="http://schemas.microsoft.com/office/drawing/2014/main" id="{3B025EB7-D319-3540-8105-6009DDC47831}"/>
+              </a:ext>
+            </a:extLst>
+          </p:cNvPr>
+          <p:cNvSpPr txBox="1"/>
+          <p:nvPr/>
+        </p:nvSpPr>
+        <p:spPr>
+          <a:xfrm>
+            <a:off x="2098322" y="7281836"/>
+            <a:ext cx="466518" cy="369332"/>
+          </a:xfrm>
+          <a:prstGeom prst="rect">
+            <a:avLst/>
+          </a:prstGeom>
+          <a:noFill/>
+        </p:spPr>
+        <p:txBody>
+          <a:bodyPr wrap="square" rtlCol="0">
+            <a:spAutoFit/>
+          </a:bodyPr>
+          <a:lstStyle/>
+          <a:p>
+            <a:r>
+              <a:rPr lang="en-AU" dirty="0"/>
+              <a:t>O7</a:t>
+            </a:r>
+          </a:p>
+        </p:txBody>
+      </p:sp>
+      <p:sp>
+        <p:nvSpPr>
+          <p:cNvPr id="21" name="TextBox 20">
+            <a:extLst>
+              <a:ext uri="{FF2B5EF4-FFF2-40B4-BE49-F238E27FC236}">
+                <a16:creationId xmlns:a16="http://schemas.microsoft.com/office/drawing/2014/main" id="{52AF208C-DBD1-3640-80BB-BFEF6E67AA82}"/>
+              </a:ext>
+            </a:extLst>
+          </p:cNvPr>
+          <p:cNvSpPr txBox="1"/>
+          <p:nvPr/>
+        </p:nvSpPr>
+        <p:spPr>
+          <a:xfrm>
+            <a:off x="3066753" y="8154889"/>
+            <a:ext cx="487333" cy="369332"/>
+          </a:xfrm>
+          <a:prstGeom prst="rect">
+            <a:avLst/>
+          </a:prstGeom>
+          <a:noFill/>
+        </p:spPr>
+        <p:txBody>
+          <a:bodyPr wrap="square" rtlCol="0">
+            <a:spAutoFit/>
+          </a:bodyPr>
+          <a:lstStyle/>
+          <a:p>
+            <a:r>
+              <a:rPr lang="en-AU" dirty="0">
+                <a:solidFill>
+                  <a:srgbClr val="0070C0"/>
+                </a:solidFill>
+              </a:rPr>
+              <a:t>D8</a:t>
+            </a:r>
+          </a:p>
+        </p:txBody>
+      </p:sp>
+      <p:sp>
+        <p:nvSpPr>
+          <p:cNvPr id="22" name="TextBox 21">
+            <a:extLst>
+              <a:ext uri="{FF2B5EF4-FFF2-40B4-BE49-F238E27FC236}">
+                <a16:creationId xmlns:a16="http://schemas.microsoft.com/office/drawing/2014/main" id="{329C0760-F363-5D42-B231-1684AA9C118C}"/>
+              </a:ext>
+            </a:extLst>
+          </p:cNvPr>
+          <p:cNvSpPr txBox="1"/>
+          <p:nvPr/>
+        </p:nvSpPr>
+        <p:spPr>
+          <a:xfrm>
+            <a:off x="3972431" y="7827875"/>
+            <a:ext cx="466518" cy="369332"/>
+          </a:xfrm>
+          <a:prstGeom prst="rect">
+            <a:avLst/>
+          </a:prstGeom>
+          <a:noFill/>
+        </p:spPr>
+        <p:txBody>
+          <a:bodyPr wrap="square" rtlCol="0">
+            <a:spAutoFit/>
+          </a:bodyPr>
+          <a:lstStyle/>
+          <a:p>
+            <a:r>
+              <a:rPr lang="en-AU" dirty="0">
+                <a:solidFill>
+                  <a:srgbClr val="0070C0"/>
+                </a:solidFill>
+              </a:rPr>
+              <a:t>D9</a:t>
+            </a:r>
+          </a:p>
+        </p:txBody>
+      </p:sp>
+      <p:sp>
+        <p:nvSpPr>
+          <p:cNvPr id="23" name="TextBox 22">
+            <a:extLst>
+              <a:ext uri="{FF2B5EF4-FFF2-40B4-BE49-F238E27FC236}">
+                <a16:creationId xmlns:a16="http://schemas.microsoft.com/office/drawing/2014/main" id="{7D0E6BA3-DC58-5548-9512-A62D90CF5E98}"/>
+              </a:ext>
+            </a:extLst>
+          </p:cNvPr>
+          <p:cNvSpPr txBox="1"/>
+          <p:nvPr/>
+        </p:nvSpPr>
+        <p:spPr>
+          <a:xfrm>
+            <a:off x="2647790" y="7624820"/>
+            <a:ext cx="616526" cy="369332"/>
+          </a:xfrm>
+          <a:prstGeom prst="rect">
+            <a:avLst/>
+          </a:prstGeom>
+          <a:noFill/>
+        </p:spPr>
+        <p:txBody>
+          <a:bodyPr wrap="square" rtlCol="0">
+            <a:spAutoFit/>
+          </a:bodyPr>
+          <a:lstStyle/>
+          <a:p>
+            <a:r>
+              <a:rPr lang="en-AU" dirty="0">
+                <a:solidFill>
+                  <a:srgbClr val="0070C0"/>
+                </a:solidFill>
+              </a:rPr>
+              <a:t>D10</a:t>
+            </a:r>
+          </a:p>
+        </p:txBody>
+      </p:sp>
+      <p:sp>
+        <p:nvSpPr>
+          <p:cNvPr id="24" name="TextBox 23">
+            <a:extLst>
+              <a:ext uri="{FF2B5EF4-FFF2-40B4-BE49-F238E27FC236}">
+                <a16:creationId xmlns:a16="http://schemas.microsoft.com/office/drawing/2014/main" id="{2F07E686-35A4-4245-871F-DFF71870B7E2}"/>
+              </a:ext>
+            </a:extLst>
+          </p:cNvPr>
+          <p:cNvSpPr txBox="1"/>
+          <p:nvPr/>
+        </p:nvSpPr>
+        <p:spPr>
+          <a:xfrm>
+            <a:off x="2186668" y="7734637"/>
+            <a:ext cx="616526" cy="369332"/>
+          </a:xfrm>
+          <a:prstGeom prst="rect">
+            <a:avLst/>
+          </a:prstGeom>
+          <a:noFill/>
+        </p:spPr>
+        <p:txBody>
+          <a:bodyPr wrap="square" rtlCol="0">
+            <a:spAutoFit/>
+          </a:bodyPr>
+          <a:lstStyle/>
+          <a:p>
+            <a:r>
+              <a:rPr lang="en-AU" dirty="0">
+                <a:solidFill>
+                  <a:srgbClr val="0070C0"/>
+                </a:solidFill>
+              </a:rPr>
+              <a:t>D11</a:t>
+            </a:r>
+          </a:p>
+        </p:txBody>
+      </p:sp>
+      <p:sp>
+        <p:nvSpPr>
+          <p:cNvPr id="25" name="TextBox 24">
+            <a:extLst>
+              <a:ext uri="{FF2B5EF4-FFF2-40B4-BE49-F238E27FC236}">
+                <a16:creationId xmlns:a16="http://schemas.microsoft.com/office/drawing/2014/main" id="{0752D762-AB6E-314A-9593-3121603F88E7}"/>
+              </a:ext>
+            </a:extLst>
+          </p:cNvPr>
+          <p:cNvSpPr txBox="1"/>
+          <p:nvPr/>
+        </p:nvSpPr>
+        <p:spPr>
+          <a:xfrm>
+            <a:off x="3707495" y="6796769"/>
+            <a:ext cx="616526" cy="369332"/>
+          </a:xfrm>
+          <a:prstGeom prst="rect">
+            <a:avLst/>
+          </a:prstGeom>
+          <a:noFill/>
+        </p:spPr>
+        <p:txBody>
+          <a:bodyPr wrap="square" rtlCol="0">
+            <a:spAutoFit/>
+          </a:bodyPr>
+          <a:lstStyle/>
+          <a:p>
+            <a:r>
+              <a:rPr lang="en-AU" dirty="0">
+                <a:solidFill>
+                  <a:srgbClr val="0070C0"/>
+                </a:solidFill>
+              </a:rPr>
+              <a:t>D12</a:t>
+            </a:r>
+          </a:p>
+        </p:txBody>
+      </p:sp>
+      <p:sp>
+        <p:nvSpPr>
+          <p:cNvPr id="26" name="TextBox 25">
+            <a:extLst>
+              <a:ext uri="{FF2B5EF4-FFF2-40B4-BE49-F238E27FC236}">
+                <a16:creationId xmlns:a16="http://schemas.microsoft.com/office/drawing/2014/main" id="{9DAF916B-52B3-584A-B384-14D8DBA2AF05}"/>
+              </a:ext>
+            </a:extLst>
+          </p:cNvPr>
+          <p:cNvSpPr txBox="1"/>
+          <p:nvPr/>
+        </p:nvSpPr>
+        <p:spPr>
+          <a:xfrm>
+            <a:off x="3527850" y="7238950"/>
+            <a:ext cx="616526" cy="369332"/>
+          </a:xfrm>
+          <a:prstGeom prst="rect">
+            <a:avLst/>
+          </a:prstGeom>
+          <a:noFill/>
+        </p:spPr>
+        <p:txBody>
+          <a:bodyPr wrap="square" rtlCol="0">
+            <a:spAutoFit/>
+          </a:bodyPr>
+          <a:lstStyle/>
+          <a:p>
+            <a:r>
+              <a:rPr lang="en-AU" dirty="0">
+                <a:solidFill>
+                  <a:srgbClr val="0070C0"/>
+                </a:solidFill>
+              </a:rPr>
+              <a:t>D13</a:t>
+            </a:r>
+          </a:p>
+        </p:txBody>
+      </p:sp>
+      <p:sp>
+        <p:nvSpPr>
+          <p:cNvPr id="27" name="TextBox 26">
+            <a:extLst>
+              <a:ext uri="{FF2B5EF4-FFF2-40B4-BE49-F238E27FC236}">
+                <a16:creationId xmlns:a16="http://schemas.microsoft.com/office/drawing/2014/main" id="{4E9E14C7-CBCA-234F-9806-A90D9C1DDF75}"/>
+              </a:ext>
+            </a:extLst>
+          </p:cNvPr>
+          <p:cNvSpPr txBox="1"/>
+          <p:nvPr/>
+        </p:nvSpPr>
+        <p:spPr>
+          <a:xfrm>
+            <a:off x="3051354" y="7436176"/>
+            <a:ext cx="616526" cy="369332"/>
+          </a:xfrm>
+          <a:prstGeom prst="rect">
+            <a:avLst/>
+          </a:prstGeom>
+          <a:noFill/>
+        </p:spPr>
+        <p:txBody>
+          <a:bodyPr wrap="square" rtlCol="0">
+            <a:spAutoFit/>
+          </a:bodyPr>
+          <a:lstStyle/>
+          <a:p>
+            <a:r>
+              <a:rPr lang="en-AU" dirty="0">
+                <a:solidFill>
+                  <a:srgbClr val="0070C0"/>
+                </a:solidFill>
+              </a:rPr>
+              <a:t>D14</a:t>
+            </a:r>
+          </a:p>
+        </p:txBody>
+      </p:sp>
+      <p:sp>
+        <p:nvSpPr>
+          <p:cNvPr id="40" name="Oval 39">
+            <a:extLst>
+              <a:ext uri="{FF2B5EF4-FFF2-40B4-BE49-F238E27FC236}">
+                <a16:creationId xmlns:a16="http://schemas.microsoft.com/office/drawing/2014/main" id="{F7991E49-51E5-B144-BF2D-90C81A5A6344}"/>
+              </a:ext>
+            </a:extLst>
+          </p:cNvPr>
+          <p:cNvSpPr/>
+          <p:nvPr/>
+        </p:nvSpPr>
+        <p:spPr>
+          <a:xfrm>
+            <a:off x="3314650" y="6980671"/>
+            <a:ext cx="180000" cy="180000"/>
+          </a:xfrm>
+          <a:prstGeom prst="ellipse">
+            <a:avLst/>
+          </a:prstGeom>
+          <a:solidFill>
+            <a:schemeClr val="tx1"/>
+          </a:solidFill>
+        </p:spPr>
+        <p:style>
+          <a:lnRef idx="2">
+            <a:schemeClr val="accent1">
+              <a:shade val="50000"/>
+            </a:schemeClr>
+          </a:lnRef>
+          <a:fillRef idx="1">
+            <a:schemeClr val="accent1"/>
+          </a:fillRef>
+          <a:effectRef idx="0">
+            <a:schemeClr val="accent1"/>
+          </a:effectRef>
+          <a:fontRef idx="minor">
+            <a:schemeClr val="lt1"/>
+          </a:fontRef>
+        </p:style>
+        <p:txBody>
+          <a:bodyPr rtlCol="0" anchor="ctr"/>
+          <a:lstStyle/>
+          <a:p>
+            <a:pPr algn="ctr"/>
+            <a:endParaRPr lang="en-AU"/>
+          </a:p>
+        </p:txBody>
+      </p:sp>
+      <p:cxnSp>
+        <p:nvCxnSpPr>
+          <p:cNvPr id="41" name="Straight Connector 40">
+            <a:extLst>
+              <a:ext uri="{FF2B5EF4-FFF2-40B4-BE49-F238E27FC236}">
+                <a16:creationId xmlns:a16="http://schemas.microsoft.com/office/drawing/2014/main" id="{0DA6ECE3-5073-1A4A-8AB8-7EEBEADCE3B9}"/>
+              </a:ext>
+            </a:extLst>
+          </p:cNvPr>
+          <p:cNvCxnSpPr>
+            <a:cxnSpLocks/>
+          </p:cNvCxnSpPr>
+          <p:nvPr/>
+        </p:nvCxnSpPr>
+        <p:spPr>
+          <a:xfrm>
+            <a:off x="5373127" y="294245"/>
+            <a:ext cx="0" cy="839561"/>
+          </a:xfrm>
+          <a:prstGeom prst="line">
+            <a:avLst/>
+          </a:prstGeom>
+          <a:ln w="60325">
+            <a:solidFill>
+              <a:srgbClr val="C00000"/>
+            </a:solidFill>
+            <a:headEnd type="stealth" w="lg" len="lg"/>
+          </a:ln>
+        </p:spPr>
+        <p:style>
+          <a:lnRef idx="1">
+            <a:schemeClr val="accent1"/>
+          </a:lnRef>
+          <a:fillRef idx="0">
+            <a:schemeClr val="accent1"/>
+          </a:fillRef>
+          <a:effectRef idx="0">
+            <a:schemeClr val="accent1"/>
+          </a:effectRef>
+          <a:fontRef idx="minor">
+            <a:schemeClr val="tx1"/>
+          </a:fontRef>
+        </p:style>
+      </p:cxnSp>
+      <p:sp>
+        <p:nvSpPr>
+          <p:cNvPr id="42" name="TextBox 41">
+            <a:extLst>
+              <a:ext uri="{FF2B5EF4-FFF2-40B4-BE49-F238E27FC236}">
+                <a16:creationId xmlns:a16="http://schemas.microsoft.com/office/drawing/2014/main" id="{202F7DA6-28E9-A14D-B2F3-6A88F109DF56}"/>
+              </a:ext>
+            </a:extLst>
+          </p:cNvPr>
+          <p:cNvSpPr txBox="1"/>
+          <p:nvPr/>
+        </p:nvSpPr>
+        <p:spPr>
+          <a:xfrm>
+            <a:off x="4446628" y="168836"/>
+            <a:ext cx="961755" cy="369332"/>
+          </a:xfrm>
+          <a:prstGeom prst="rect">
+            <a:avLst/>
+          </a:prstGeom>
+          <a:noFill/>
+        </p:spPr>
+        <p:txBody>
+          <a:bodyPr wrap="square" rtlCol="0">
+            <a:spAutoFit/>
+          </a:bodyPr>
+          <a:lstStyle/>
+          <a:p>
+            <a:r>
+              <a:rPr lang="en-AU" dirty="0">
+                <a:solidFill>
+                  <a:srgbClr val="C00000"/>
+                </a:solidFill>
+              </a:rPr>
+              <a:t>Upfield</a:t>
+            </a:r>
+          </a:p>
+        </p:txBody>
+      </p:sp>
+      <p:sp>
+        <p:nvSpPr>
+          <p:cNvPr id="43" name="TextBox 42">
+            <a:extLst>
+              <a:ext uri="{FF2B5EF4-FFF2-40B4-BE49-F238E27FC236}">
+                <a16:creationId xmlns:a16="http://schemas.microsoft.com/office/drawing/2014/main" id="{DD1EC9A5-79C9-1242-B6F2-E5E224E388FB}"/>
+              </a:ext>
+            </a:extLst>
+          </p:cNvPr>
+          <p:cNvSpPr txBox="1"/>
+          <p:nvPr/>
+        </p:nvSpPr>
+        <p:spPr>
+          <a:xfrm>
+            <a:off x="4288814" y="9291052"/>
+            <a:ext cx="1210561" cy="369332"/>
+          </a:xfrm>
+          <a:prstGeom prst="rect">
+            <a:avLst/>
+          </a:prstGeom>
+          <a:noFill/>
+        </p:spPr>
+        <p:txBody>
+          <a:bodyPr wrap="square" rtlCol="0">
+            <a:spAutoFit/>
+          </a:bodyPr>
+          <a:lstStyle/>
+          <a:p>
+            <a:r>
+              <a:rPr lang="en-AU" dirty="0">
+                <a:solidFill>
+                  <a:schemeClr val="accent6"/>
+                </a:solidFill>
+              </a:rPr>
+              <a:t>Downfield</a:t>
+            </a:r>
+          </a:p>
+        </p:txBody>
+      </p:sp>
+      <p:cxnSp>
+        <p:nvCxnSpPr>
+          <p:cNvPr id="44" name="Straight Connector 43">
+            <a:extLst>
+              <a:ext uri="{FF2B5EF4-FFF2-40B4-BE49-F238E27FC236}">
+                <a16:creationId xmlns:a16="http://schemas.microsoft.com/office/drawing/2014/main" id="{0F30EF98-D099-6B42-AC9C-D6A71369EEC9}"/>
+              </a:ext>
+            </a:extLst>
+          </p:cNvPr>
+          <p:cNvCxnSpPr>
+            <a:cxnSpLocks/>
+          </p:cNvCxnSpPr>
+          <p:nvPr/>
+        </p:nvCxnSpPr>
+        <p:spPr>
+          <a:xfrm flipV="1">
+            <a:off x="5373127" y="8373862"/>
+            <a:ext cx="0" cy="938269"/>
+          </a:xfrm>
+          <a:prstGeom prst="line">
+            <a:avLst/>
+          </a:prstGeom>
+          <a:ln w="60325">
+            <a:solidFill>
+              <a:srgbClr val="00B050"/>
+            </a:solidFill>
+            <a:headEnd type="stealth" w="lg" len="lg"/>
+          </a:ln>
+        </p:spPr>
+        <p:style>
+          <a:lnRef idx="1">
+            <a:schemeClr val="accent1"/>
+          </a:lnRef>
+          <a:fillRef idx="0">
+            <a:schemeClr val="accent1"/>
+          </a:fillRef>
+          <a:effectRef idx="0">
+            <a:schemeClr val="accent1"/>
+          </a:effectRef>
+          <a:fontRef idx="minor">
+            <a:schemeClr val="tx1"/>
+          </a:fontRef>
+        </p:style>
+      </p:cxnSp>
+      <p:sp>
+        <p:nvSpPr>
+          <p:cNvPr id="3" name="Arc 2">
+            <a:extLst>
+              <a:ext uri="{FF2B5EF4-FFF2-40B4-BE49-F238E27FC236}">
+                <a16:creationId xmlns:a16="http://schemas.microsoft.com/office/drawing/2014/main" id="{FD25C454-65A8-EA43-BA64-A2BA9DCFCA80}"/>
+              </a:ext>
+            </a:extLst>
+          </p:cNvPr>
+          <p:cNvSpPr/>
+          <p:nvPr/>
+        </p:nvSpPr>
+        <p:spPr>
+          <a:xfrm rot="6095834">
+            <a:off x="2560850" y="6238577"/>
+            <a:ext cx="1669383" cy="866793"/>
+          </a:xfrm>
+          <a:prstGeom prst="arc">
+            <a:avLst/>
+          </a:prstGeom>
+        </p:spPr>
+        <p:style>
+          <a:lnRef idx="1">
+            <a:schemeClr val="accent1"/>
+          </a:lnRef>
+          <a:fillRef idx="0">
+            <a:schemeClr val="accent1"/>
+          </a:fillRef>
+          <a:effectRef idx="0">
+            <a:schemeClr val="accent1"/>
+          </a:effectRef>
+          <a:fontRef idx="minor">
+            <a:schemeClr val="tx1"/>
+          </a:fontRef>
+        </p:style>
+        <p:txBody>
+          <a:bodyPr rtlCol="0" anchor="ctr"/>
+          <a:lstStyle/>
+          <a:p>
+            <a:pPr algn="ctr"/>
+            <a:endParaRPr lang="en-AU"/>
+          </a:p>
+        </p:txBody>
+      </p:sp>
+      <p:cxnSp>
+        <p:nvCxnSpPr>
+          <p:cNvPr id="54" name="Straight Arrow Connector 53">
+            <a:extLst>
+              <a:ext uri="{FF2B5EF4-FFF2-40B4-BE49-F238E27FC236}">
+                <a16:creationId xmlns:a16="http://schemas.microsoft.com/office/drawing/2014/main" id="{6B9CAAA3-CC30-C24F-93F7-B20E22330AF9}"/>
+              </a:ext>
+            </a:extLst>
+          </p:cNvPr>
+          <p:cNvCxnSpPr>
+            <a:cxnSpLocks/>
+          </p:cNvCxnSpPr>
+          <p:nvPr/>
+        </p:nvCxnSpPr>
+        <p:spPr>
+          <a:xfrm>
+            <a:off x="3608698" y="7092075"/>
+            <a:ext cx="1165170" cy="613949"/>
+          </a:xfrm>
+          <a:prstGeom prst="straightConnector1">
+            <a:avLst/>
+          </a:prstGeom>
+          <a:ln w="60325">
+            <a:solidFill>
+              <a:schemeClr val="bg1">
+                <a:lumMod val="50000"/>
+              </a:schemeClr>
+            </a:solidFill>
+            <a:prstDash val="sysDash"/>
+            <a:tailEnd type="triangle"/>
+          </a:ln>
+        </p:spPr>
+        <p:style>
+          <a:lnRef idx="1">
+            <a:schemeClr val="accent1"/>
+          </a:lnRef>
+          <a:fillRef idx="0">
+            <a:schemeClr val="accent1"/>
+          </a:fillRef>
+          <a:effectRef idx="0">
+            <a:schemeClr val="accent1"/>
+          </a:effectRef>
+          <a:fontRef idx="minor">
+            <a:schemeClr val="tx1"/>
+          </a:fontRef>
+        </p:style>
+      </p:cxnSp>
+      <p:cxnSp>
+        <p:nvCxnSpPr>
+          <p:cNvPr id="62" name="Straight Arrow Connector 61">
+            <a:extLst>
+              <a:ext uri="{FF2B5EF4-FFF2-40B4-BE49-F238E27FC236}">
+                <a16:creationId xmlns:a16="http://schemas.microsoft.com/office/drawing/2014/main" id="{D4EB2A2C-FE63-E24F-9999-DED7695BF0D9}"/>
+              </a:ext>
+            </a:extLst>
+          </p:cNvPr>
+          <p:cNvCxnSpPr>
+            <a:cxnSpLocks/>
+          </p:cNvCxnSpPr>
+          <p:nvPr/>
+        </p:nvCxnSpPr>
+        <p:spPr>
+          <a:xfrm>
+            <a:off x="3439535" y="7181451"/>
+            <a:ext cx="309193" cy="832502"/>
+          </a:xfrm>
+          <a:prstGeom prst="straightConnector1">
+            <a:avLst/>
+          </a:prstGeom>
+          <a:ln w="60325">
+            <a:solidFill>
+              <a:schemeClr val="bg1">
+                <a:lumMod val="50000"/>
+              </a:schemeClr>
+            </a:solidFill>
+            <a:prstDash val="sysDash"/>
+            <a:tailEnd type="triangle"/>
+          </a:ln>
+        </p:spPr>
+        <p:style>
+          <a:lnRef idx="1">
+            <a:schemeClr val="accent1"/>
+          </a:lnRef>
+          <a:fillRef idx="0">
+            <a:schemeClr val="accent1"/>
+          </a:fillRef>
+          <a:effectRef idx="0">
+            <a:schemeClr val="accent1"/>
+          </a:effectRef>
+          <a:fontRef idx="minor">
+            <a:schemeClr val="tx1"/>
+          </a:fontRef>
+        </p:style>
+      </p:cxnSp>
+    </p:spTree>
+    <p:extLst>
+      <p:ext uri="{BB962C8B-B14F-4D97-AF65-F5344CB8AC3E}">
+        <p14:creationId xmlns:p14="http://schemas.microsoft.com/office/powerpoint/2010/main" val="3490530093"/>
+      </p:ext>
+    </p:extLst>
+  </p:cSld>
+  <p:clrMapOvr>
+    <a:masterClrMapping/>
+  </p:clrMapOvr>
+</p:sld>
+</file>
+
 <file path=ppt/slides/slide2.xml><?xml version="1.0" encoding="utf-8"?>
 <p:sld xmlns:a="http://schemas.openxmlformats.org/drawingml/2006/main" xmlns:r="http://schemas.openxmlformats.org/officeDocument/2006/relationships" xmlns:p="http://schemas.openxmlformats.org/presentationml/2006/main">
   <p:cSld>
@@ -11614,8 +12844,8 @@
         </p:nvSpPr>
         <p:spPr>
           <a:xfrm>
-            <a:off x="4616346" y="8805856"/>
-            <a:ext cx="301212" cy="369332"/>
+            <a:off x="4616346" y="8800073"/>
+            <a:ext cx="397890" cy="375115"/>
           </a:xfrm>
           <a:prstGeom prst="rect">
             <a:avLst/>
@@ -11636,7 +12866,7 @@
                   <a:schemeClr val="bg1"/>
                 </a:solidFill>
               </a:rPr>
-              <a:t>A</a:t>
+              <a:t>A’</a:t>
             </a:r>
           </a:p>
         </p:txBody>
@@ -11655,8 +12885,8 @@
         </p:nvSpPr>
         <p:spPr>
           <a:xfrm>
-            <a:off x="2116055" y="8803826"/>
-            <a:ext cx="301212" cy="369332"/>
+            <a:off x="2116055" y="8805856"/>
+            <a:ext cx="397890" cy="369332"/>
           </a:xfrm>
           <a:prstGeom prst="rect">
             <a:avLst/>
@@ -11677,7 +12907,7 @@
                   <a:schemeClr val="bg1"/>
                 </a:solidFill>
               </a:rPr>
-              <a:t>B</a:t>
+              <a:t>B’</a:t>
             </a:r>
           </a:p>
         </p:txBody>
@@ -11901,7 +13131,7 @@
         <p:spPr>
           <a:xfrm>
             <a:off x="2712708" y="3655757"/>
-            <a:ext cx="2398408" cy="4080249"/>
+            <a:ext cx="2437562" cy="4142933"/>
           </a:xfrm>
           <a:prstGeom prst="arc">
             <a:avLst>
@@ -12910,96 +14140,6 @@
           </a:p>
         </p:txBody>
       </p:sp>
-      <p:cxnSp>
-        <p:nvCxnSpPr>
-          <p:cNvPr id="30" name="Straight Connector 29">
-            <a:extLst>
-              <a:ext uri="{FF2B5EF4-FFF2-40B4-BE49-F238E27FC236}">
-                <a16:creationId xmlns:a16="http://schemas.microsoft.com/office/drawing/2014/main" id="{B4D48460-EF8C-4F4A-A7B3-E5390CF72E79}"/>
-              </a:ext>
-            </a:extLst>
-          </p:cNvPr>
-          <p:cNvCxnSpPr>
-            <a:cxnSpLocks/>
-          </p:cNvCxnSpPr>
-          <p:nvPr/>
-        </p:nvCxnSpPr>
-        <p:spPr>
-          <a:xfrm>
-            <a:off x="1961250" y="8195722"/>
-            <a:ext cx="3238092" cy="0"/>
-          </a:xfrm>
-          <a:prstGeom prst="line">
-            <a:avLst/>
-          </a:prstGeom>
-          <a:ln w="38100">
-            <a:solidFill>
-              <a:srgbClr val="FF0000"/>
-            </a:solidFill>
-            <a:prstDash val="sysDash"/>
-          </a:ln>
-        </p:spPr>
-        <p:style>
-          <a:lnRef idx="1">
-            <a:schemeClr val="accent1"/>
-          </a:lnRef>
-          <a:fillRef idx="0">
-            <a:schemeClr val="accent1"/>
-          </a:fillRef>
-          <a:effectRef idx="0">
-            <a:schemeClr val="accent1"/>
-          </a:effectRef>
-          <a:fontRef idx="minor">
-            <a:schemeClr val="tx1"/>
-          </a:fontRef>
-        </p:style>
-      </p:cxnSp>
-      <p:cxnSp>
-        <p:nvCxnSpPr>
-          <p:cNvPr id="35" name="Straight Connector 34">
-            <a:extLst>
-              <a:ext uri="{FF2B5EF4-FFF2-40B4-BE49-F238E27FC236}">
-                <a16:creationId xmlns:a16="http://schemas.microsoft.com/office/drawing/2014/main" id="{96DA6223-3940-684E-96D5-572E2E45F862}"/>
-              </a:ext>
-            </a:extLst>
-          </p:cNvPr>
-          <p:cNvCxnSpPr>
-            <a:cxnSpLocks/>
-          </p:cNvCxnSpPr>
-          <p:nvPr/>
-        </p:nvCxnSpPr>
-        <p:spPr>
-          <a:xfrm>
-            <a:off x="1961250" y="4207747"/>
-            <a:ext cx="3238092" cy="0"/>
-          </a:xfrm>
-          <a:prstGeom prst="line">
-            <a:avLst/>
-          </a:prstGeom>
-          <a:ln w="38100">
-            <a:solidFill>
-              <a:schemeClr val="bg1">
-                <a:lumMod val="50000"/>
-              </a:schemeClr>
-            </a:solidFill>
-            <a:prstDash val="sysDash"/>
-          </a:ln>
-        </p:spPr>
-        <p:style>
-          <a:lnRef idx="1">
-            <a:schemeClr val="accent1"/>
-          </a:lnRef>
-          <a:fillRef idx="0">
-            <a:schemeClr val="accent1"/>
-          </a:fillRef>
-          <a:effectRef idx="0">
-            <a:schemeClr val="accent1"/>
-          </a:effectRef>
-          <a:fontRef idx="minor">
-            <a:schemeClr val="tx1"/>
-          </a:fontRef>
-        </p:style>
-      </p:cxnSp>
       <p:cxnSp>
         <p:nvCxnSpPr>
           <p:cNvPr id="32" name="Straight Arrow Connector 31">
@@ -13060,8 +14200,8 @@
         </p:nvCxnSpPr>
         <p:spPr>
           <a:xfrm flipV="1">
-            <a:off x="5066624" y="5247843"/>
-            <a:ext cx="27333" cy="934850"/>
+            <a:off x="5066624" y="5695154"/>
+            <a:ext cx="0" cy="487539"/>
           </a:xfrm>
           <a:prstGeom prst="straightConnector1">
             <a:avLst/>
@@ -13291,6 +14431,3105 @@
               <a:srgbClr val="00B050"/>
             </a:solidFill>
             <a:headEnd type="stealth" w="lg" len="lg"/>
+          </a:ln>
+        </p:spPr>
+        <p:style>
+          <a:lnRef idx="1">
+            <a:schemeClr val="accent1"/>
+          </a:lnRef>
+          <a:fillRef idx="0">
+            <a:schemeClr val="accent1"/>
+          </a:fillRef>
+          <a:effectRef idx="0">
+            <a:schemeClr val="accent1"/>
+          </a:effectRef>
+          <a:fontRef idx="minor">
+            <a:schemeClr val="tx1"/>
+          </a:fontRef>
+        </p:style>
+      </p:cxnSp>
+      <p:cxnSp>
+        <p:nvCxnSpPr>
+          <p:cNvPr id="46" name="Straight Connector 45">
+            <a:extLst>
+              <a:ext uri="{FF2B5EF4-FFF2-40B4-BE49-F238E27FC236}">
+                <a16:creationId xmlns:a16="http://schemas.microsoft.com/office/drawing/2014/main" id="{F3236F0C-4C3D-4644-9082-CD27BBDCE797}"/>
+              </a:ext>
+            </a:extLst>
+          </p:cNvPr>
+          <p:cNvCxnSpPr>
+            <a:cxnSpLocks/>
+          </p:cNvCxnSpPr>
+          <p:nvPr/>
+        </p:nvCxnSpPr>
+        <p:spPr>
+          <a:xfrm>
+            <a:off x="1965027" y="6516354"/>
+            <a:ext cx="3238092" cy="0"/>
+          </a:xfrm>
+          <a:prstGeom prst="line">
+            <a:avLst/>
+          </a:prstGeom>
+          <a:ln w="38100">
+            <a:solidFill>
+              <a:srgbClr val="FF0000"/>
+            </a:solidFill>
+            <a:prstDash val="sysDash"/>
+          </a:ln>
+        </p:spPr>
+        <p:style>
+          <a:lnRef idx="1">
+            <a:schemeClr val="accent1"/>
+          </a:lnRef>
+          <a:fillRef idx="0">
+            <a:schemeClr val="accent1"/>
+          </a:fillRef>
+          <a:effectRef idx="0">
+            <a:schemeClr val="accent1"/>
+          </a:effectRef>
+          <a:fontRef idx="minor">
+            <a:schemeClr val="tx1"/>
+          </a:fontRef>
+        </p:style>
+      </p:cxnSp>
+      <p:cxnSp>
+        <p:nvCxnSpPr>
+          <p:cNvPr id="47" name="Straight Connector 46">
+            <a:extLst>
+              <a:ext uri="{FF2B5EF4-FFF2-40B4-BE49-F238E27FC236}">
+                <a16:creationId xmlns:a16="http://schemas.microsoft.com/office/drawing/2014/main" id="{FDD421D9-46E9-8940-91A2-963CC70167A3}"/>
+              </a:ext>
+            </a:extLst>
+          </p:cNvPr>
+          <p:cNvCxnSpPr>
+            <a:cxnSpLocks/>
+          </p:cNvCxnSpPr>
+          <p:nvPr/>
+        </p:nvCxnSpPr>
+        <p:spPr>
+          <a:xfrm flipV="1">
+            <a:off x="1961249" y="4191053"/>
+            <a:ext cx="3240000" cy="0"/>
+          </a:xfrm>
+          <a:prstGeom prst="line">
+            <a:avLst/>
+          </a:prstGeom>
+          <a:ln w="38100">
+            <a:solidFill>
+              <a:schemeClr val="accent2"/>
+            </a:solidFill>
+            <a:prstDash val="sysDash"/>
+          </a:ln>
+        </p:spPr>
+        <p:style>
+          <a:lnRef idx="1">
+            <a:schemeClr val="accent1"/>
+          </a:lnRef>
+          <a:fillRef idx="0">
+            <a:schemeClr val="accent1"/>
+          </a:fillRef>
+          <a:effectRef idx="0">
+            <a:schemeClr val="accent1"/>
+          </a:effectRef>
+          <a:fontRef idx="minor">
+            <a:schemeClr val="tx1"/>
+          </a:fontRef>
+        </p:style>
+      </p:cxnSp>
+      <p:sp>
+        <p:nvSpPr>
+          <p:cNvPr id="48" name="TextBox 47">
+            <a:extLst>
+              <a:ext uri="{FF2B5EF4-FFF2-40B4-BE49-F238E27FC236}">
+                <a16:creationId xmlns:a16="http://schemas.microsoft.com/office/drawing/2014/main" id="{64124B02-1C66-374E-B873-2B829CE5EE7B}"/>
+              </a:ext>
+            </a:extLst>
+          </p:cNvPr>
+          <p:cNvSpPr txBox="1"/>
+          <p:nvPr/>
+        </p:nvSpPr>
+        <p:spPr>
+          <a:xfrm>
+            <a:off x="4743488" y="8214170"/>
+            <a:ext cx="301212" cy="369332"/>
+          </a:xfrm>
+          <a:prstGeom prst="rect">
+            <a:avLst/>
+          </a:prstGeom>
+          <a:solidFill>
+            <a:schemeClr val="tx1"/>
+          </a:solidFill>
+        </p:spPr>
+        <p:txBody>
+          <a:bodyPr wrap="square" rtlCol="0">
+            <a:spAutoFit/>
+          </a:bodyPr>
+          <a:lstStyle/>
+          <a:p>
+            <a:r>
+              <a:rPr lang="en-AU" dirty="0">
+                <a:solidFill>
+                  <a:schemeClr val="bg1"/>
+                </a:solidFill>
+              </a:rPr>
+              <a:t>A</a:t>
+            </a:r>
+          </a:p>
+        </p:txBody>
+      </p:sp>
+      <p:sp>
+        <p:nvSpPr>
+          <p:cNvPr id="50" name="TextBox 49">
+            <a:extLst>
+              <a:ext uri="{FF2B5EF4-FFF2-40B4-BE49-F238E27FC236}">
+                <a16:creationId xmlns:a16="http://schemas.microsoft.com/office/drawing/2014/main" id="{17CA0749-9C04-E046-9100-221F09785A29}"/>
+              </a:ext>
+            </a:extLst>
+          </p:cNvPr>
+          <p:cNvSpPr txBox="1"/>
+          <p:nvPr/>
+        </p:nvSpPr>
+        <p:spPr>
+          <a:xfrm>
+            <a:off x="5007599" y="5258007"/>
+            <a:ext cx="251215" cy="369332"/>
+          </a:xfrm>
+          <a:prstGeom prst="rect">
+            <a:avLst/>
+          </a:prstGeom>
+          <a:solidFill>
+            <a:schemeClr val="tx1"/>
+          </a:solidFill>
+        </p:spPr>
+        <p:txBody>
+          <a:bodyPr wrap="square" rtlCol="0">
+            <a:spAutoFit/>
+          </a:bodyPr>
+          <a:lstStyle/>
+          <a:p>
+            <a:r>
+              <a:rPr lang="en-AU" dirty="0">
+                <a:solidFill>
+                  <a:schemeClr val="bg1"/>
+                </a:solidFill>
+              </a:rPr>
+              <a:t>D</a:t>
+            </a:r>
+          </a:p>
+        </p:txBody>
+      </p:sp>
+    </p:spTree>
+    <p:extLst>
+      <p:ext uri="{BB962C8B-B14F-4D97-AF65-F5344CB8AC3E}">
+        <p14:creationId xmlns:p14="http://schemas.microsoft.com/office/powerpoint/2010/main" val="799718895"/>
+      </p:ext>
+    </p:extLst>
+  </p:cSld>
+  <p:clrMapOvr>
+    <a:masterClrMapping/>
+  </p:clrMapOvr>
+</p:sld>
+</file>
+
+<file path=ppt/slides/slide8.xml><?xml version="1.0" encoding="utf-8"?>
+<p:sld xmlns:a="http://schemas.openxmlformats.org/drawingml/2006/main" xmlns:r="http://schemas.openxmlformats.org/officeDocument/2006/relationships" xmlns:p="http://schemas.openxmlformats.org/presentationml/2006/main">
+  <p:cSld>
+    <p:spTree>
+      <p:nvGrpSpPr>
+        <p:cNvPr id="1" name=""/>
+        <p:cNvGrpSpPr/>
+        <p:nvPr/>
+      </p:nvGrpSpPr>
+      <p:grpSpPr>
+        <a:xfrm>
+          <a:off x="0" y="0"/>
+          <a:ext cx="0" cy="0"/>
+          <a:chOff x="0" y="0"/>
+          <a:chExt cx="0" cy="0"/>
+        </a:xfrm>
+      </p:grpSpPr>
+      <p:sp>
+        <p:nvSpPr>
+          <p:cNvPr id="4" name="Rounded Rectangle 3">
+            <a:extLst>
+              <a:ext uri="{FF2B5EF4-FFF2-40B4-BE49-F238E27FC236}">
+                <a16:creationId xmlns:a16="http://schemas.microsoft.com/office/drawing/2014/main" id="{70652F4E-8EA6-2C4D-A4F0-52433013FDED}"/>
+              </a:ext>
+            </a:extLst>
+          </p:cNvPr>
+          <p:cNvSpPr>
+            <a:spLocks noChangeAspect="1"/>
+          </p:cNvSpPr>
+          <p:nvPr/>
+        </p:nvSpPr>
+        <p:spPr>
+          <a:xfrm>
+            <a:off x="1953463" y="2114322"/>
+            <a:ext cx="3240000" cy="5604325"/>
+          </a:xfrm>
+          <a:prstGeom prst="roundRect">
+            <a:avLst/>
+          </a:prstGeom>
+          <a:noFill/>
+          <a:ln w="38100">
+            <a:solidFill>
+              <a:schemeClr val="tx1"/>
+            </a:solidFill>
+          </a:ln>
+        </p:spPr>
+        <p:style>
+          <a:lnRef idx="2">
+            <a:schemeClr val="accent1">
+              <a:shade val="50000"/>
+            </a:schemeClr>
+          </a:lnRef>
+          <a:fillRef idx="1">
+            <a:schemeClr val="accent1"/>
+          </a:fillRef>
+          <a:effectRef idx="0">
+            <a:schemeClr val="accent1"/>
+          </a:effectRef>
+          <a:fontRef idx="minor">
+            <a:schemeClr val="lt1"/>
+          </a:fontRef>
+        </p:style>
+        <p:txBody>
+          <a:bodyPr rtlCol="0" anchor="ctr"/>
+          <a:lstStyle/>
+          <a:p>
+            <a:pPr algn="ctr"/>
+            <a:endParaRPr lang="en-AU"/>
+          </a:p>
+        </p:txBody>
+      </p:sp>
+      <p:sp>
+        <p:nvSpPr>
+          <p:cNvPr id="5" name="Rounded Rectangle 4">
+            <a:extLst>
+              <a:ext uri="{FF2B5EF4-FFF2-40B4-BE49-F238E27FC236}">
+                <a16:creationId xmlns:a16="http://schemas.microsoft.com/office/drawing/2014/main" id="{3C953649-ED7C-3742-AAEA-8B243B81C427}"/>
+              </a:ext>
+            </a:extLst>
+          </p:cNvPr>
+          <p:cNvSpPr>
+            <a:spLocks noChangeAspect="1"/>
+          </p:cNvSpPr>
+          <p:nvPr/>
+        </p:nvSpPr>
+        <p:spPr>
+          <a:xfrm>
+            <a:off x="1953463" y="7718649"/>
+            <a:ext cx="3240000" cy="1576217"/>
+          </a:xfrm>
+          <a:prstGeom prst="roundRect">
+            <a:avLst/>
+          </a:prstGeom>
+          <a:solidFill>
+            <a:srgbClr val="00B050"/>
+          </a:solidFill>
+          <a:ln w="38100">
+            <a:solidFill>
+              <a:schemeClr val="tx1"/>
+            </a:solidFill>
+          </a:ln>
+        </p:spPr>
+        <p:style>
+          <a:lnRef idx="2">
+            <a:schemeClr val="accent1">
+              <a:shade val="50000"/>
+            </a:schemeClr>
+          </a:lnRef>
+          <a:fillRef idx="1">
+            <a:schemeClr val="accent1"/>
+          </a:fillRef>
+          <a:effectRef idx="0">
+            <a:schemeClr val="accent1"/>
+          </a:effectRef>
+          <a:fontRef idx="minor">
+            <a:schemeClr val="lt1"/>
+          </a:fontRef>
+        </p:style>
+        <p:txBody>
+          <a:bodyPr rtlCol="0" anchor="ctr"/>
+          <a:lstStyle/>
+          <a:p>
+            <a:pPr algn="ctr"/>
+            <a:endParaRPr lang="en-AU"/>
+          </a:p>
+        </p:txBody>
+      </p:sp>
+      <p:sp>
+        <p:nvSpPr>
+          <p:cNvPr id="6" name="Rounded Rectangle 5">
+            <a:extLst>
+              <a:ext uri="{FF2B5EF4-FFF2-40B4-BE49-F238E27FC236}">
+                <a16:creationId xmlns:a16="http://schemas.microsoft.com/office/drawing/2014/main" id="{781AE066-2F6F-CD4A-8C9D-2174A5C270BE}"/>
+              </a:ext>
+            </a:extLst>
+          </p:cNvPr>
+          <p:cNvSpPr>
+            <a:spLocks noChangeAspect="1"/>
+          </p:cNvSpPr>
+          <p:nvPr/>
+        </p:nvSpPr>
+        <p:spPr>
+          <a:xfrm>
+            <a:off x="1953463" y="520745"/>
+            <a:ext cx="3240000" cy="1576217"/>
+          </a:xfrm>
+          <a:prstGeom prst="roundRect">
+            <a:avLst/>
+          </a:prstGeom>
+          <a:solidFill>
+            <a:srgbClr val="FF0000"/>
+          </a:solidFill>
+          <a:ln w="38100">
+            <a:solidFill>
+              <a:schemeClr val="tx1"/>
+            </a:solidFill>
+          </a:ln>
+        </p:spPr>
+        <p:style>
+          <a:lnRef idx="2">
+            <a:schemeClr val="accent1">
+              <a:shade val="50000"/>
+            </a:schemeClr>
+          </a:lnRef>
+          <a:fillRef idx="1">
+            <a:schemeClr val="accent1"/>
+          </a:fillRef>
+          <a:effectRef idx="0">
+            <a:schemeClr val="accent1"/>
+          </a:effectRef>
+          <a:fontRef idx="minor">
+            <a:schemeClr val="lt1"/>
+          </a:fontRef>
+        </p:style>
+        <p:txBody>
+          <a:bodyPr rtlCol="0" anchor="ctr"/>
+          <a:lstStyle/>
+          <a:p>
+            <a:pPr algn="ctr"/>
+            <a:endParaRPr lang="en-AU" dirty="0"/>
+          </a:p>
+        </p:txBody>
+      </p:sp>
+      <p:sp>
+        <p:nvSpPr>
+          <p:cNvPr id="7" name="Rounded Rectangle 6">
+            <a:extLst>
+              <a:ext uri="{FF2B5EF4-FFF2-40B4-BE49-F238E27FC236}">
+                <a16:creationId xmlns:a16="http://schemas.microsoft.com/office/drawing/2014/main" id="{58A277D1-08DF-1A43-AFBF-E7F4DE2FD6BB}"/>
+              </a:ext>
+            </a:extLst>
+          </p:cNvPr>
+          <p:cNvSpPr>
+            <a:spLocks noChangeAspect="1"/>
+          </p:cNvSpPr>
+          <p:nvPr/>
+        </p:nvSpPr>
+        <p:spPr>
+          <a:xfrm>
+            <a:off x="1524892" y="101296"/>
+            <a:ext cx="4114800" cy="9630383"/>
+          </a:xfrm>
+          <a:prstGeom prst="roundRect">
+            <a:avLst/>
+          </a:prstGeom>
+          <a:noFill/>
+          <a:ln w="38100">
+            <a:solidFill>
+              <a:schemeClr val="bg1">
+                <a:lumMod val="50000"/>
+              </a:schemeClr>
+            </a:solidFill>
+            <a:prstDash val="sysDot"/>
+          </a:ln>
+        </p:spPr>
+        <p:style>
+          <a:lnRef idx="2">
+            <a:schemeClr val="accent1">
+              <a:shade val="50000"/>
+            </a:schemeClr>
+          </a:lnRef>
+          <a:fillRef idx="1">
+            <a:schemeClr val="accent1"/>
+          </a:fillRef>
+          <a:effectRef idx="0">
+            <a:schemeClr val="accent1"/>
+          </a:effectRef>
+          <a:fontRef idx="minor">
+            <a:schemeClr val="lt1"/>
+          </a:fontRef>
+        </p:style>
+        <p:txBody>
+          <a:bodyPr rtlCol="0" anchor="ctr"/>
+          <a:lstStyle/>
+          <a:p>
+            <a:pPr algn="ctr"/>
+            <a:endParaRPr lang="en-AU"/>
+          </a:p>
+        </p:txBody>
+      </p:sp>
+      <p:sp>
+        <p:nvSpPr>
+          <p:cNvPr id="12" name="Multiply 11">
+            <a:extLst>
+              <a:ext uri="{FF2B5EF4-FFF2-40B4-BE49-F238E27FC236}">
+                <a16:creationId xmlns:a16="http://schemas.microsoft.com/office/drawing/2014/main" id="{782966C4-8BAB-EC4A-B3CC-ECB9FD404B1E}"/>
+              </a:ext>
+            </a:extLst>
+          </p:cNvPr>
+          <p:cNvSpPr/>
+          <p:nvPr/>
+        </p:nvSpPr>
+        <p:spPr>
+          <a:xfrm>
+            <a:off x="3198571" y="5737186"/>
+            <a:ext cx="767443" cy="849086"/>
+          </a:xfrm>
+          <a:prstGeom prst="mathMultiply">
+            <a:avLst/>
+          </a:prstGeom>
+          <a:noFill/>
+        </p:spPr>
+        <p:style>
+          <a:lnRef idx="2">
+            <a:schemeClr val="accent1">
+              <a:shade val="50000"/>
+            </a:schemeClr>
+          </a:lnRef>
+          <a:fillRef idx="1">
+            <a:schemeClr val="accent1"/>
+          </a:fillRef>
+          <a:effectRef idx="0">
+            <a:schemeClr val="accent1"/>
+          </a:effectRef>
+          <a:fontRef idx="minor">
+            <a:schemeClr val="lt1"/>
+          </a:fontRef>
+        </p:style>
+        <p:txBody>
+          <a:bodyPr rtlCol="0" anchor="ctr"/>
+          <a:lstStyle/>
+          <a:p>
+            <a:pPr algn="ctr"/>
+            <a:endParaRPr lang="en-AU"/>
+          </a:p>
+        </p:txBody>
+      </p:sp>
+      <p:sp>
+        <p:nvSpPr>
+          <p:cNvPr id="13" name="Multiply 12">
+            <a:extLst>
+              <a:ext uri="{FF2B5EF4-FFF2-40B4-BE49-F238E27FC236}">
+                <a16:creationId xmlns:a16="http://schemas.microsoft.com/office/drawing/2014/main" id="{711FF500-E426-0D44-916C-B24A7A610DF5}"/>
+              </a:ext>
+            </a:extLst>
+          </p:cNvPr>
+          <p:cNvSpPr/>
+          <p:nvPr/>
+        </p:nvSpPr>
+        <p:spPr>
+          <a:xfrm>
+            <a:off x="3192236" y="3246701"/>
+            <a:ext cx="767443" cy="849086"/>
+          </a:xfrm>
+          <a:prstGeom prst="mathMultiply">
+            <a:avLst/>
+          </a:prstGeom>
+          <a:noFill/>
+        </p:spPr>
+        <p:style>
+          <a:lnRef idx="2">
+            <a:schemeClr val="accent1">
+              <a:shade val="50000"/>
+            </a:schemeClr>
+          </a:lnRef>
+          <a:fillRef idx="1">
+            <a:schemeClr val="accent1"/>
+          </a:fillRef>
+          <a:effectRef idx="0">
+            <a:schemeClr val="accent1"/>
+          </a:effectRef>
+          <a:fontRef idx="minor">
+            <a:schemeClr val="lt1"/>
+          </a:fontRef>
+        </p:style>
+        <p:txBody>
+          <a:bodyPr rtlCol="0" anchor="ctr"/>
+          <a:lstStyle/>
+          <a:p>
+            <a:pPr algn="ctr"/>
+            <a:endParaRPr lang="en-AU"/>
+          </a:p>
+        </p:txBody>
+      </p:sp>
+      <p:sp>
+        <p:nvSpPr>
+          <p:cNvPr id="14" name="TextBox 13">
+            <a:extLst>
+              <a:ext uri="{FF2B5EF4-FFF2-40B4-BE49-F238E27FC236}">
+                <a16:creationId xmlns:a16="http://schemas.microsoft.com/office/drawing/2014/main" id="{CC9FDAD2-F231-6B43-92F7-C2C2863676C2}"/>
+              </a:ext>
+            </a:extLst>
+          </p:cNvPr>
+          <p:cNvSpPr txBox="1"/>
+          <p:nvPr/>
+        </p:nvSpPr>
+        <p:spPr>
+          <a:xfrm>
+            <a:off x="4150653" y="4060977"/>
+            <a:ext cx="466518" cy="369332"/>
+          </a:xfrm>
+          <a:prstGeom prst="rect">
+            <a:avLst/>
+          </a:prstGeom>
+          <a:noFill/>
+        </p:spPr>
+        <p:txBody>
+          <a:bodyPr wrap="square" rtlCol="0">
+            <a:spAutoFit/>
+          </a:bodyPr>
+          <a:lstStyle/>
+          <a:p>
+            <a:r>
+              <a:rPr lang="en-AU" dirty="0"/>
+              <a:t>O2</a:t>
+            </a:r>
+          </a:p>
+        </p:txBody>
+      </p:sp>
+      <p:sp>
+        <p:nvSpPr>
+          <p:cNvPr id="15" name="TextBox 14">
+            <a:extLst>
+              <a:ext uri="{FF2B5EF4-FFF2-40B4-BE49-F238E27FC236}">
+                <a16:creationId xmlns:a16="http://schemas.microsoft.com/office/drawing/2014/main" id="{3986F052-18AA-4443-A26B-C88FE17F207D}"/>
+              </a:ext>
+            </a:extLst>
+          </p:cNvPr>
+          <p:cNvSpPr txBox="1"/>
+          <p:nvPr/>
+        </p:nvSpPr>
+        <p:spPr>
+          <a:xfrm>
+            <a:off x="4802729" y="5980966"/>
+            <a:ext cx="466518" cy="369332"/>
+          </a:xfrm>
+          <a:prstGeom prst="rect">
+            <a:avLst/>
+          </a:prstGeom>
+          <a:solidFill>
+            <a:schemeClr val="tx1"/>
+          </a:solidFill>
+        </p:spPr>
+        <p:txBody>
+          <a:bodyPr wrap="square" rtlCol="0">
+            <a:spAutoFit/>
+          </a:bodyPr>
+          <a:lstStyle/>
+          <a:p>
+            <a:r>
+              <a:rPr lang="en-AU" dirty="0">
+                <a:solidFill>
+                  <a:schemeClr val="bg1"/>
+                </a:solidFill>
+              </a:rPr>
+              <a:t>O1</a:t>
+            </a:r>
+          </a:p>
+        </p:txBody>
+      </p:sp>
+      <p:sp>
+        <p:nvSpPr>
+          <p:cNvPr id="16" name="TextBox 15">
+            <a:extLst>
+              <a:ext uri="{FF2B5EF4-FFF2-40B4-BE49-F238E27FC236}">
+                <a16:creationId xmlns:a16="http://schemas.microsoft.com/office/drawing/2014/main" id="{EEF04ED5-E466-A243-9D27-7184F13C1262}"/>
+              </a:ext>
+            </a:extLst>
+          </p:cNvPr>
+          <p:cNvSpPr txBox="1"/>
+          <p:nvPr/>
+        </p:nvSpPr>
+        <p:spPr>
+          <a:xfrm>
+            <a:off x="3400488" y="4628908"/>
+            <a:ext cx="466518" cy="369332"/>
+          </a:xfrm>
+          <a:prstGeom prst="rect">
+            <a:avLst/>
+          </a:prstGeom>
+          <a:noFill/>
+        </p:spPr>
+        <p:txBody>
+          <a:bodyPr wrap="square" rtlCol="0">
+            <a:spAutoFit/>
+          </a:bodyPr>
+          <a:lstStyle/>
+          <a:p>
+            <a:r>
+              <a:rPr lang="en-AU" dirty="0"/>
+              <a:t>O3</a:t>
+            </a:r>
+          </a:p>
+        </p:txBody>
+      </p:sp>
+      <p:sp>
+        <p:nvSpPr>
+          <p:cNvPr id="17" name="TextBox 16">
+            <a:extLst>
+              <a:ext uri="{FF2B5EF4-FFF2-40B4-BE49-F238E27FC236}">
+                <a16:creationId xmlns:a16="http://schemas.microsoft.com/office/drawing/2014/main" id="{7AB684D8-9879-0C4A-9489-F87A8809D064}"/>
+              </a:ext>
+            </a:extLst>
+          </p:cNvPr>
+          <p:cNvSpPr txBox="1"/>
+          <p:nvPr/>
+        </p:nvSpPr>
+        <p:spPr>
+          <a:xfrm>
+            <a:off x="1903841" y="6534751"/>
+            <a:ext cx="466518" cy="369332"/>
+          </a:xfrm>
+          <a:prstGeom prst="rect">
+            <a:avLst/>
+          </a:prstGeom>
+          <a:noFill/>
+        </p:spPr>
+        <p:txBody>
+          <a:bodyPr wrap="square" rtlCol="0">
+            <a:spAutoFit/>
+          </a:bodyPr>
+          <a:lstStyle/>
+          <a:p>
+            <a:r>
+              <a:rPr lang="en-AU" dirty="0"/>
+              <a:t>O4</a:t>
+            </a:r>
+          </a:p>
+        </p:txBody>
+      </p:sp>
+      <p:sp>
+        <p:nvSpPr>
+          <p:cNvPr id="18" name="TextBox 17">
+            <a:extLst>
+              <a:ext uri="{FF2B5EF4-FFF2-40B4-BE49-F238E27FC236}">
+                <a16:creationId xmlns:a16="http://schemas.microsoft.com/office/drawing/2014/main" id="{F387E253-DCE8-A344-84ED-5DB76FED00C0}"/>
+              </a:ext>
+            </a:extLst>
+          </p:cNvPr>
+          <p:cNvSpPr txBox="1"/>
+          <p:nvPr/>
+        </p:nvSpPr>
+        <p:spPr>
+          <a:xfrm>
+            <a:off x="4799009" y="3238848"/>
+            <a:ext cx="466518" cy="369332"/>
+          </a:xfrm>
+          <a:prstGeom prst="rect">
+            <a:avLst/>
+          </a:prstGeom>
+          <a:noFill/>
+        </p:spPr>
+        <p:txBody>
+          <a:bodyPr wrap="square" rtlCol="0">
+            <a:spAutoFit/>
+          </a:bodyPr>
+          <a:lstStyle/>
+          <a:p>
+            <a:r>
+              <a:rPr lang="en-AU" dirty="0"/>
+              <a:t>O5</a:t>
+            </a:r>
+          </a:p>
+        </p:txBody>
+      </p:sp>
+      <p:sp>
+        <p:nvSpPr>
+          <p:cNvPr id="19" name="TextBox 18">
+            <a:extLst>
+              <a:ext uri="{FF2B5EF4-FFF2-40B4-BE49-F238E27FC236}">
+                <a16:creationId xmlns:a16="http://schemas.microsoft.com/office/drawing/2014/main" id="{A2087CBC-C5DF-574A-BDD6-786E46B4A1F8}"/>
+              </a:ext>
+            </a:extLst>
+          </p:cNvPr>
+          <p:cNvSpPr txBox="1"/>
+          <p:nvPr/>
+        </p:nvSpPr>
+        <p:spPr>
+          <a:xfrm>
+            <a:off x="3349033" y="3423514"/>
+            <a:ext cx="466518" cy="369332"/>
+          </a:xfrm>
+          <a:prstGeom prst="rect">
+            <a:avLst/>
+          </a:prstGeom>
+          <a:noFill/>
+        </p:spPr>
+        <p:txBody>
+          <a:bodyPr wrap="square" rtlCol="0">
+            <a:spAutoFit/>
+          </a:bodyPr>
+          <a:lstStyle/>
+          <a:p>
+            <a:r>
+              <a:rPr lang="en-AU" dirty="0"/>
+              <a:t>O6</a:t>
+            </a:r>
+          </a:p>
+        </p:txBody>
+      </p:sp>
+      <p:sp>
+        <p:nvSpPr>
+          <p:cNvPr id="20" name="TextBox 19">
+            <a:extLst>
+              <a:ext uri="{FF2B5EF4-FFF2-40B4-BE49-F238E27FC236}">
+                <a16:creationId xmlns:a16="http://schemas.microsoft.com/office/drawing/2014/main" id="{3B025EB7-D319-3540-8105-6009DDC47831}"/>
+              </a:ext>
+            </a:extLst>
+          </p:cNvPr>
+          <p:cNvSpPr txBox="1"/>
+          <p:nvPr/>
+        </p:nvSpPr>
+        <p:spPr>
+          <a:xfrm>
+            <a:off x="1903841" y="4553690"/>
+            <a:ext cx="466518" cy="369332"/>
+          </a:xfrm>
+          <a:prstGeom prst="rect">
+            <a:avLst/>
+          </a:prstGeom>
+          <a:noFill/>
+        </p:spPr>
+        <p:txBody>
+          <a:bodyPr wrap="square" rtlCol="0">
+            <a:spAutoFit/>
+          </a:bodyPr>
+          <a:lstStyle/>
+          <a:p>
+            <a:r>
+              <a:rPr lang="en-AU" dirty="0"/>
+              <a:t>O7</a:t>
+            </a:r>
+          </a:p>
+        </p:txBody>
+      </p:sp>
+      <p:sp>
+        <p:nvSpPr>
+          <p:cNvPr id="21" name="TextBox 20">
+            <a:extLst>
+              <a:ext uri="{FF2B5EF4-FFF2-40B4-BE49-F238E27FC236}">
+                <a16:creationId xmlns:a16="http://schemas.microsoft.com/office/drawing/2014/main" id="{52AF208C-DBD1-3640-80BB-BFEF6E67AA82}"/>
+              </a:ext>
+            </a:extLst>
+          </p:cNvPr>
+          <p:cNvSpPr txBox="1"/>
+          <p:nvPr/>
+        </p:nvSpPr>
+        <p:spPr>
+          <a:xfrm>
+            <a:off x="3376672" y="6515556"/>
+            <a:ext cx="466518" cy="369332"/>
+          </a:xfrm>
+          <a:prstGeom prst="rect">
+            <a:avLst/>
+          </a:prstGeom>
+          <a:noFill/>
+        </p:spPr>
+        <p:txBody>
+          <a:bodyPr wrap="square" rtlCol="0">
+            <a:spAutoFit/>
+          </a:bodyPr>
+          <a:lstStyle/>
+          <a:p>
+            <a:r>
+              <a:rPr lang="en-AU" dirty="0">
+                <a:solidFill>
+                  <a:srgbClr val="0070C0"/>
+                </a:solidFill>
+              </a:rPr>
+              <a:t>D8</a:t>
+            </a:r>
+          </a:p>
+        </p:txBody>
+      </p:sp>
+      <p:sp>
+        <p:nvSpPr>
+          <p:cNvPr id="22" name="TextBox 21">
+            <a:extLst>
+              <a:ext uri="{FF2B5EF4-FFF2-40B4-BE49-F238E27FC236}">
+                <a16:creationId xmlns:a16="http://schemas.microsoft.com/office/drawing/2014/main" id="{329C0760-F363-5D42-B231-1684AA9C118C}"/>
+              </a:ext>
+            </a:extLst>
+          </p:cNvPr>
+          <p:cNvSpPr txBox="1"/>
+          <p:nvPr/>
+        </p:nvSpPr>
+        <p:spPr>
+          <a:xfrm>
+            <a:off x="4322370" y="5089673"/>
+            <a:ext cx="466518" cy="369332"/>
+          </a:xfrm>
+          <a:prstGeom prst="rect">
+            <a:avLst/>
+          </a:prstGeom>
+          <a:noFill/>
+        </p:spPr>
+        <p:txBody>
+          <a:bodyPr wrap="square" rtlCol="0">
+            <a:spAutoFit/>
+          </a:bodyPr>
+          <a:lstStyle/>
+          <a:p>
+            <a:r>
+              <a:rPr lang="en-AU" dirty="0">
+                <a:solidFill>
+                  <a:srgbClr val="0070C0"/>
+                </a:solidFill>
+              </a:rPr>
+              <a:t>D9</a:t>
+            </a:r>
+          </a:p>
+        </p:txBody>
+      </p:sp>
+      <p:sp>
+        <p:nvSpPr>
+          <p:cNvPr id="23" name="TextBox 22">
+            <a:extLst>
+              <a:ext uri="{FF2B5EF4-FFF2-40B4-BE49-F238E27FC236}">
+                <a16:creationId xmlns:a16="http://schemas.microsoft.com/office/drawing/2014/main" id="{7D0E6BA3-DC58-5548-9512-A62D90CF5E98}"/>
+              </a:ext>
+            </a:extLst>
+          </p:cNvPr>
+          <p:cNvSpPr txBox="1"/>
+          <p:nvPr/>
+        </p:nvSpPr>
+        <p:spPr>
+          <a:xfrm>
+            <a:off x="3422865" y="4849436"/>
+            <a:ext cx="616526" cy="369332"/>
+          </a:xfrm>
+          <a:prstGeom prst="rect">
+            <a:avLst/>
+          </a:prstGeom>
+          <a:noFill/>
+        </p:spPr>
+        <p:txBody>
+          <a:bodyPr wrap="square" rtlCol="0">
+            <a:spAutoFit/>
+          </a:bodyPr>
+          <a:lstStyle/>
+          <a:p>
+            <a:r>
+              <a:rPr lang="en-AU" dirty="0">
+                <a:solidFill>
+                  <a:srgbClr val="0070C0"/>
+                </a:solidFill>
+              </a:rPr>
+              <a:t>D10</a:t>
+            </a:r>
+          </a:p>
+        </p:txBody>
+      </p:sp>
+      <p:sp>
+        <p:nvSpPr>
+          <p:cNvPr id="24" name="TextBox 23">
+            <a:extLst>
+              <a:ext uri="{FF2B5EF4-FFF2-40B4-BE49-F238E27FC236}">
+                <a16:creationId xmlns:a16="http://schemas.microsoft.com/office/drawing/2014/main" id="{2F07E686-35A4-4245-871F-DFF71870B7E2}"/>
+              </a:ext>
+            </a:extLst>
+          </p:cNvPr>
+          <p:cNvSpPr txBox="1"/>
+          <p:nvPr/>
+        </p:nvSpPr>
+        <p:spPr>
+          <a:xfrm>
+            <a:off x="2165870" y="5972073"/>
+            <a:ext cx="616526" cy="369332"/>
+          </a:xfrm>
+          <a:prstGeom prst="rect">
+            <a:avLst/>
+          </a:prstGeom>
+          <a:noFill/>
+        </p:spPr>
+        <p:txBody>
+          <a:bodyPr wrap="square" rtlCol="0">
+            <a:spAutoFit/>
+          </a:bodyPr>
+          <a:lstStyle/>
+          <a:p>
+            <a:r>
+              <a:rPr lang="en-AU" dirty="0">
+                <a:solidFill>
+                  <a:srgbClr val="0070C0"/>
+                </a:solidFill>
+              </a:rPr>
+              <a:t>D11</a:t>
+            </a:r>
+          </a:p>
+        </p:txBody>
+      </p:sp>
+      <p:sp>
+        <p:nvSpPr>
+          <p:cNvPr id="25" name="TextBox 24">
+            <a:extLst>
+              <a:ext uri="{FF2B5EF4-FFF2-40B4-BE49-F238E27FC236}">
+                <a16:creationId xmlns:a16="http://schemas.microsoft.com/office/drawing/2014/main" id="{0752D762-AB6E-314A-9593-3121603F88E7}"/>
+              </a:ext>
+            </a:extLst>
+          </p:cNvPr>
+          <p:cNvSpPr txBox="1"/>
+          <p:nvPr/>
+        </p:nvSpPr>
+        <p:spPr>
+          <a:xfrm>
+            <a:off x="3754792" y="3659430"/>
+            <a:ext cx="616526" cy="369332"/>
+          </a:xfrm>
+          <a:prstGeom prst="rect">
+            <a:avLst/>
+          </a:prstGeom>
+          <a:noFill/>
+        </p:spPr>
+        <p:txBody>
+          <a:bodyPr wrap="square" rtlCol="0">
+            <a:spAutoFit/>
+          </a:bodyPr>
+          <a:lstStyle/>
+          <a:p>
+            <a:r>
+              <a:rPr lang="en-AU" dirty="0">
+                <a:solidFill>
+                  <a:srgbClr val="0070C0"/>
+                </a:solidFill>
+              </a:rPr>
+              <a:t>D12</a:t>
+            </a:r>
+          </a:p>
+        </p:txBody>
+      </p:sp>
+      <p:sp>
+        <p:nvSpPr>
+          <p:cNvPr id="26" name="TextBox 25">
+            <a:extLst>
+              <a:ext uri="{FF2B5EF4-FFF2-40B4-BE49-F238E27FC236}">
+                <a16:creationId xmlns:a16="http://schemas.microsoft.com/office/drawing/2014/main" id="{9DAF916B-52B3-584A-B384-14D8DBA2AF05}"/>
+              </a:ext>
+            </a:extLst>
+          </p:cNvPr>
+          <p:cNvSpPr txBox="1"/>
+          <p:nvPr/>
+        </p:nvSpPr>
+        <p:spPr>
+          <a:xfrm>
+            <a:off x="3622524" y="4003524"/>
+            <a:ext cx="616526" cy="369332"/>
+          </a:xfrm>
+          <a:prstGeom prst="rect">
+            <a:avLst/>
+          </a:prstGeom>
+          <a:noFill/>
+        </p:spPr>
+        <p:txBody>
+          <a:bodyPr wrap="square" rtlCol="0">
+            <a:spAutoFit/>
+          </a:bodyPr>
+          <a:lstStyle/>
+          <a:p>
+            <a:r>
+              <a:rPr lang="en-AU" dirty="0">
+                <a:solidFill>
+                  <a:srgbClr val="0070C0"/>
+                </a:solidFill>
+              </a:rPr>
+              <a:t>D13</a:t>
+            </a:r>
+          </a:p>
+        </p:txBody>
+      </p:sp>
+      <p:sp>
+        <p:nvSpPr>
+          <p:cNvPr id="27" name="TextBox 26">
+            <a:extLst>
+              <a:ext uri="{FF2B5EF4-FFF2-40B4-BE49-F238E27FC236}">
+                <a16:creationId xmlns:a16="http://schemas.microsoft.com/office/drawing/2014/main" id="{4E9E14C7-CBCA-234F-9806-A90D9C1DDF75}"/>
+              </a:ext>
+            </a:extLst>
+          </p:cNvPr>
+          <p:cNvSpPr txBox="1"/>
+          <p:nvPr/>
+        </p:nvSpPr>
+        <p:spPr>
+          <a:xfrm>
+            <a:off x="3161715" y="4283071"/>
+            <a:ext cx="616526" cy="369332"/>
+          </a:xfrm>
+          <a:prstGeom prst="rect">
+            <a:avLst/>
+          </a:prstGeom>
+          <a:noFill/>
+        </p:spPr>
+        <p:txBody>
+          <a:bodyPr wrap="square" rtlCol="0">
+            <a:spAutoFit/>
+          </a:bodyPr>
+          <a:lstStyle/>
+          <a:p>
+            <a:r>
+              <a:rPr lang="en-AU" dirty="0">
+                <a:solidFill>
+                  <a:srgbClr val="0070C0"/>
+                </a:solidFill>
+              </a:rPr>
+              <a:t>D14</a:t>
+            </a:r>
+          </a:p>
+        </p:txBody>
+      </p:sp>
+      <p:sp>
+        <p:nvSpPr>
+          <p:cNvPr id="40" name="Oval 39">
+            <a:extLst>
+              <a:ext uri="{FF2B5EF4-FFF2-40B4-BE49-F238E27FC236}">
+                <a16:creationId xmlns:a16="http://schemas.microsoft.com/office/drawing/2014/main" id="{F7991E49-51E5-B144-BF2D-90C81A5A6344}"/>
+              </a:ext>
+            </a:extLst>
+          </p:cNvPr>
+          <p:cNvSpPr/>
+          <p:nvPr/>
+        </p:nvSpPr>
+        <p:spPr>
+          <a:xfrm>
+            <a:off x="3314650" y="3685674"/>
+            <a:ext cx="180000" cy="180000"/>
+          </a:xfrm>
+          <a:prstGeom prst="ellipse">
+            <a:avLst/>
+          </a:prstGeom>
+          <a:solidFill>
+            <a:schemeClr val="tx1"/>
+          </a:solidFill>
+        </p:spPr>
+        <p:style>
+          <a:lnRef idx="2">
+            <a:schemeClr val="accent1">
+              <a:shade val="50000"/>
+            </a:schemeClr>
+          </a:lnRef>
+          <a:fillRef idx="1">
+            <a:schemeClr val="accent1"/>
+          </a:fillRef>
+          <a:effectRef idx="0">
+            <a:schemeClr val="accent1"/>
+          </a:effectRef>
+          <a:fontRef idx="minor">
+            <a:schemeClr val="lt1"/>
+          </a:fontRef>
+        </p:style>
+        <p:txBody>
+          <a:bodyPr rtlCol="0" anchor="ctr"/>
+          <a:lstStyle/>
+          <a:p>
+            <a:pPr algn="ctr"/>
+            <a:endParaRPr lang="en-AU"/>
+          </a:p>
+        </p:txBody>
+      </p:sp>
+      <p:sp>
+        <p:nvSpPr>
+          <p:cNvPr id="38" name="Arc 37">
+            <a:extLst>
+              <a:ext uri="{FF2B5EF4-FFF2-40B4-BE49-F238E27FC236}">
+                <a16:creationId xmlns:a16="http://schemas.microsoft.com/office/drawing/2014/main" id="{85BC15C3-9853-644A-A16D-0122200998AA}"/>
+              </a:ext>
+            </a:extLst>
+          </p:cNvPr>
+          <p:cNvSpPr/>
+          <p:nvPr/>
+        </p:nvSpPr>
+        <p:spPr>
+          <a:xfrm rot="17983725" flipH="1">
+            <a:off x="4296247" y="2647615"/>
+            <a:ext cx="2387143" cy="5343324"/>
+          </a:xfrm>
+          <a:prstGeom prst="arc">
+            <a:avLst>
+              <a:gd name="adj1" fmla="val 16131872"/>
+              <a:gd name="adj2" fmla="val 20258141"/>
+            </a:avLst>
+          </a:prstGeom>
+          <a:ln w="82550">
+            <a:solidFill>
+              <a:schemeClr val="tx1"/>
+            </a:solidFill>
+            <a:prstDash val="sysDot"/>
+            <a:tailEnd type="stealth"/>
+          </a:ln>
+        </p:spPr>
+        <p:style>
+          <a:lnRef idx="1">
+            <a:schemeClr val="accent1"/>
+          </a:lnRef>
+          <a:fillRef idx="0">
+            <a:schemeClr val="accent1"/>
+          </a:fillRef>
+          <a:effectRef idx="0">
+            <a:schemeClr val="accent1"/>
+          </a:effectRef>
+          <a:fontRef idx="minor">
+            <a:schemeClr val="tx1"/>
+          </a:fontRef>
+        </p:style>
+        <p:txBody>
+          <a:bodyPr rtlCol="0" anchor="ctr"/>
+          <a:lstStyle/>
+          <a:p>
+            <a:pPr algn="ctr"/>
+            <a:endParaRPr lang="en-AU"/>
+          </a:p>
+        </p:txBody>
+      </p:sp>
+      <p:cxnSp>
+        <p:nvCxnSpPr>
+          <p:cNvPr id="41" name="Straight Connector 40">
+            <a:extLst>
+              <a:ext uri="{FF2B5EF4-FFF2-40B4-BE49-F238E27FC236}">
+                <a16:creationId xmlns:a16="http://schemas.microsoft.com/office/drawing/2014/main" id="{0DA6ECE3-5073-1A4A-8AB8-7EEBEADCE3B9}"/>
+              </a:ext>
+            </a:extLst>
+          </p:cNvPr>
+          <p:cNvCxnSpPr>
+            <a:cxnSpLocks/>
+          </p:cNvCxnSpPr>
+          <p:nvPr/>
+        </p:nvCxnSpPr>
+        <p:spPr>
+          <a:xfrm>
+            <a:off x="5373127" y="294245"/>
+            <a:ext cx="0" cy="839561"/>
+          </a:xfrm>
+          <a:prstGeom prst="line">
+            <a:avLst/>
+          </a:prstGeom>
+          <a:ln w="60325">
+            <a:solidFill>
+              <a:srgbClr val="C00000"/>
+            </a:solidFill>
+            <a:headEnd type="stealth" w="lg" len="lg"/>
+          </a:ln>
+        </p:spPr>
+        <p:style>
+          <a:lnRef idx="1">
+            <a:schemeClr val="accent1"/>
+          </a:lnRef>
+          <a:fillRef idx="0">
+            <a:schemeClr val="accent1"/>
+          </a:fillRef>
+          <a:effectRef idx="0">
+            <a:schemeClr val="accent1"/>
+          </a:effectRef>
+          <a:fontRef idx="minor">
+            <a:schemeClr val="tx1"/>
+          </a:fontRef>
+        </p:style>
+      </p:cxnSp>
+      <p:sp>
+        <p:nvSpPr>
+          <p:cNvPr id="42" name="TextBox 41">
+            <a:extLst>
+              <a:ext uri="{FF2B5EF4-FFF2-40B4-BE49-F238E27FC236}">
+                <a16:creationId xmlns:a16="http://schemas.microsoft.com/office/drawing/2014/main" id="{202F7DA6-28E9-A14D-B2F3-6A88F109DF56}"/>
+              </a:ext>
+            </a:extLst>
+          </p:cNvPr>
+          <p:cNvSpPr txBox="1"/>
+          <p:nvPr/>
+        </p:nvSpPr>
+        <p:spPr>
+          <a:xfrm>
+            <a:off x="4446628" y="168836"/>
+            <a:ext cx="961755" cy="369332"/>
+          </a:xfrm>
+          <a:prstGeom prst="rect">
+            <a:avLst/>
+          </a:prstGeom>
+          <a:noFill/>
+        </p:spPr>
+        <p:txBody>
+          <a:bodyPr wrap="square" rtlCol="0">
+            <a:spAutoFit/>
+          </a:bodyPr>
+          <a:lstStyle/>
+          <a:p>
+            <a:r>
+              <a:rPr lang="en-AU" dirty="0">
+                <a:solidFill>
+                  <a:srgbClr val="C00000"/>
+                </a:solidFill>
+              </a:rPr>
+              <a:t>Upfield</a:t>
+            </a:r>
+          </a:p>
+        </p:txBody>
+      </p:sp>
+      <p:sp>
+        <p:nvSpPr>
+          <p:cNvPr id="43" name="TextBox 42">
+            <a:extLst>
+              <a:ext uri="{FF2B5EF4-FFF2-40B4-BE49-F238E27FC236}">
+                <a16:creationId xmlns:a16="http://schemas.microsoft.com/office/drawing/2014/main" id="{DD1EC9A5-79C9-1242-B6F2-E5E224E388FB}"/>
+              </a:ext>
+            </a:extLst>
+          </p:cNvPr>
+          <p:cNvSpPr txBox="1"/>
+          <p:nvPr/>
+        </p:nvSpPr>
+        <p:spPr>
+          <a:xfrm>
+            <a:off x="4288814" y="9291052"/>
+            <a:ext cx="1210561" cy="369332"/>
+          </a:xfrm>
+          <a:prstGeom prst="rect">
+            <a:avLst/>
+          </a:prstGeom>
+          <a:noFill/>
+        </p:spPr>
+        <p:txBody>
+          <a:bodyPr wrap="square" rtlCol="0">
+            <a:spAutoFit/>
+          </a:bodyPr>
+          <a:lstStyle/>
+          <a:p>
+            <a:r>
+              <a:rPr lang="en-AU" dirty="0">
+                <a:solidFill>
+                  <a:schemeClr val="accent6"/>
+                </a:solidFill>
+              </a:rPr>
+              <a:t>Downfield</a:t>
+            </a:r>
+          </a:p>
+        </p:txBody>
+      </p:sp>
+      <p:cxnSp>
+        <p:nvCxnSpPr>
+          <p:cNvPr id="44" name="Straight Connector 43">
+            <a:extLst>
+              <a:ext uri="{FF2B5EF4-FFF2-40B4-BE49-F238E27FC236}">
+                <a16:creationId xmlns:a16="http://schemas.microsoft.com/office/drawing/2014/main" id="{0F30EF98-D099-6B42-AC9C-D6A71369EEC9}"/>
+              </a:ext>
+            </a:extLst>
+          </p:cNvPr>
+          <p:cNvCxnSpPr>
+            <a:cxnSpLocks/>
+          </p:cNvCxnSpPr>
+          <p:nvPr/>
+        </p:nvCxnSpPr>
+        <p:spPr>
+          <a:xfrm flipV="1">
+            <a:off x="5373127" y="8373862"/>
+            <a:ext cx="0" cy="938269"/>
+          </a:xfrm>
+          <a:prstGeom prst="line">
+            <a:avLst/>
+          </a:prstGeom>
+          <a:ln w="60325">
+            <a:solidFill>
+              <a:srgbClr val="00B050"/>
+            </a:solidFill>
+            <a:headEnd type="stealth" w="lg" len="lg"/>
+          </a:ln>
+        </p:spPr>
+        <p:style>
+          <a:lnRef idx="1">
+            <a:schemeClr val="accent1"/>
+          </a:lnRef>
+          <a:fillRef idx="0">
+            <a:schemeClr val="accent1"/>
+          </a:fillRef>
+          <a:effectRef idx="0">
+            <a:schemeClr val="accent1"/>
+          </a:effectRef>
+          <a:fontRef idx="minor">
+            <a:schemeClr val="tx1"/>
+          </a:fontRef>
+        </p:style>
+      </p:cxnSp>
+      <p:sp>
+        <p:nvSpPr>
+          <p:cNvPr id="48" name="TextBox 47">
+            <a:extLst>
+              <a:ext uri="{FF2B5EF4-FFF2-40B4-BE49-F238E27FC236}">
+                <a16:creationId xmlns:a16="http://schemas.microsoft.com/office/drawing/2014/main" id="{64124B02-1C66-374E-B873-2B829CE5EE7B}"/>
+              </a:ext>
+            </a:extLst>
+          </p:cNvPr>
+          <p:cNvSpPr txBox="1"/>
+          <p:nvPr/>
+        </p:nvSpPr>
+        <p:spPr>
+          <a:xfrm>
+            <a:off x="4743488" y="8214170"/>
+            <a:ext cx="301212" cy="369332"/>
+          </a:xfrm>
+          <a:prstGeom prst="rect">
+            <a:avLst/>
+          </a:prstGeom>
+          <a:solidFill>
+            <a:schemeClr val="tx1"/>
+          </a:solidFill>
+        </p:spPr>
+        <p:txBody>
+          <a:bodyPr wrap="square" rtlCol="0">
+            <a:spAutoFit/>
+          </a:bodyPr>
+          <a:lstStyle/>
+          <a:p>
+            <a:r>
+              <a:rPr lang="en-AU" dirty="0">
+                <a:solidFill>
+                  <a:schemeClr val="bg1"/>
+                </a:solidFill>
+              </a:rPr>
+              <a:t>A</a:t>
+            </a:r>
+          </a:p>
+        </p:txBody>
+      </p:sp>
+      <p:sp>
+        <p:nvSpPr>
+          <p:cNvPr id="3" name="Arc 2">
+            <a:extLst>
+              <a:ext uri="{FF2B5EF4-FFF2-40B4-BE49-F238E27FC236}">
+                <a16:creationId xmlns:a16="http://schemas.microsoft.com/office/drawing/2014/main" id="{FD25C454-65A8-EA43-BA64-A2BA9DCFCA80}"/>
+              </a:ext>
+            </a:extLst>
+          </p:cNvPr>
+          <p:cNvSpPr/>
+          <p:nvPr/>
+        </p:nvSpPr>
+        <p:spPr>
+          <a:xfrm rot="5012082">
+            <a:off x="2217714" y="2730299"/>
+            <a:ext cx="1877363" cy="1440983"/>
+          </a:xfrm>
+          <a:prstGeom prst="arc">
+            <a:avLst/>
+          </a:prstGeom>
+        </p:spPr>
+        <p:style>
+          <a:lnRef idx="1">
+            <a:schemeClr val="accent1"/>
+          </a:lnRef>
+          <a:fillRef idx="0">
+            <a:schemeClr val="accent1"/>
+          </a:fillRef>
+          <a:effectRef idx="0">
+            <a:schemeClr val="accent1"/>
+          </a:effectRef>
+          <a:fontRef idx="minor">
+            <a:schemeClr val="tx1"/>
+          </a:fontRef>
+        </p:style>
+        <p:txBody>
+          <a:bodyPr rtlCol="0" anchor="ctr"/>
+          <a:lstStyle/>
+          <a:p>
+            <a:pPr algn="ctr"/>
+            <a:endParaRPr lang="en-AU"/>
+          </a:p>
+        </p:txBody>
+      </p:sp>
+      <p:sp>
+        <p:nvSpPr>
+          <p:cNvPr id="49" name="Arc 48">
+            <a:extLst>
+              <a:ext uri="{FF2B5EF4-FFF2-40B4-BE49-F238E27FC236}">
+                <a16:creationId xmlns:a16="http://schemas.microsoft.com/office/drawing/2014/main" id="{FEA17E22-D46D-2348-A5AF-C3BB9CA8DB7B}"/>
+              </a:ext>
+            </a:extLst>
+          </p:cNvPr>
+          <p:cNvSpPr/>
+          <p:nvPr/>
+        </p:nvSpPr>
+        <p:spPr>
+          <a:xfrm rot="17983725" flipH="1">
+            <a:off x="4170795" y="2708158"/>
+            <a:ext cx="4636080" cy="8000140"/>
+          </a:xfrm>
+          <a:prstGeom prst="arc">
+            <a:avLst>
+              <a:gd name="adj1" fmla="val 16131872"/>
+              <a:gd name="adj2" fmla="val 20258141"/>
+            </a:avLst>
+          </a:prstGeom>
+          <a:ln w="82550">
+            <a:solidFill>
+              <a:schemeClr val="tx1"/>
+            </a:solidFill>
+            <a:prstDash val="sysDot"/>
+            <a:tailEnd type="stealth"/>
+          </a:ln>
+        </p:spPr>
+        <p:style>
+          <a:lnRef idx="1">
+            <a:schemeClr val="accent1"/>
+          </a:lnRef>
+          <a:fillRef idx="0">
+            <a:schemeClr val="accent1"/>
+          </a:fillRef>
+          <a:effectRef idx="0">
+            <a:schemeClr val="accent1"/>
+          </a:effectRef>
+          <a:fontRef idx="minor">
+            <a:schemeClr val="tx1"/>
+          </a:fontRef>
+        </p:style>
+        <p:txBody>
+          <a:bodyPr rtlCol="0" anchor="ctr"/>
+          <a:lstStyle/>
+          <a:p>
+            <a:pPr algn="ctr"/>
+            <a:endParaRPr lang="en-AU"/>
+          </a:p>
+        </p:txBody>
+      </p:sp>
+      <p:cxnSp>
+        <p:nvCxnSpPr>
+          <p:cNvPr id="51" name="Straight Arrow Connector 50">
+            <a:extLst>
+              <a:ext uri="{FF2B5EF4-FFF2-40B4-BE49-F238E27FC236}">
+                <a16:creationId xmlns:a16="http://schemas.microsoft.com/office/drawing/2014/main" id="{58F9ED4B-F0B9-FF4F-8ABD-F40072E20DC3}"/>
+              </a:ext>
+            </a:extLst>
+          </p:cNvPr>
+          <p:cNvCxnSpPr>
+            <a:cxnSpLocks/>
+            <a:endCxn id="18" idx="1"/>
+          </p:cNvCxnSpPr>
+          <p:nvPr/>
+        </p:nvCxnSpPr>
+        <p:spPr>
+          <a:xfrm flipV="1">
+            <a:off x="3843190" y="3423514"/>
+            <a:ext cx="955819" cy="184666"/>
+          </a:xfrm>
+          <a:prstGeom prst="straightConnector1">
+            <a:avLst/>
+          </a:prstGeom>
+          <a:ln w="60325">
+            <a:solidFill>
+              <a:schemeClr val="bg1">
+                <a:lumMod val="50000"/>
+              </a:schemeClr>
+            </a:solidFill>
+            <a:prstDash val="sysDash"/>
+            <a:tailEnd type="triangle"/>
+          </a:ln>
+        </p:spPr>
+        <p:style>
+          <a:lnRef idx="1">
+            <a:schemeClr val="accent1"/>
+          </a:lnRef>
+          <a:fillRef idx="0">
+            <a:schemeClr val="accent1"/>
+          </a:fillRef>
+          <a:effectRef idx="0">
+            <a:schemeClr val="accent1"/>
+          </a:effectRef>
+          <a:fontRef idx="minor">
+            <a:schemeClr val="tx1"/>
+          </a:fontRef>
+        </p:style>
+      </p:cxnSp>
+      <p:cxnSp>
+        <p:nvCxnSpPr>
+          <p:cNvPr id="52" name="Straight Arrow Connector 51">
+            <a:extLst>
+              <a:ext uri="{FF2B5EF4-FFF2-40B4-BE49-F238E27FC236}">
+                <a16:creationId xmlns:a16="http://schemas.microsoft.com/office/drawing/2014/main" id="{02C569C0-B0AE-0647-A698-B455BC4E61BA}"/>
+              </a:ext>
+            </a:extLst>
+          </p:cNvPr>
+          <p:cNvCxnSpPr>
+            <a:cxnSpLocks/>
+          </p:cNvCxnSpPr>
+          <p:nvPr/>
+        </p:nvCxnSpPr>
+        <p:spPr>
+          <a:xfrm flipH="1">
+            <a:off x="4487468" y="3659430"/>
+            <a:ext cx="311542" cy="436357"/>
+          </a:xfrm>
+          <a:prstGeom prst="straightConnector1">
+            <a:avLst/>
+          </a:prstGeom>
+          <a:ln w="60325">
+            <a:solidFill>
+              <a:schemeClr val="bg1">
+                <a:lumMod val="50000"/>
+              </a:schemeClr>
+            </a:solidFill>
+            <a:prstDash val="sysDash"/>
+            <a:tailEnd type="triangle"/>
+          </a:ln>
+        </p:spPr>
+        <p:style>
+          <a:lnRef idx="1">
+            <a:schemeClr val="accent1"/>
+          </a:lnRef>
+          <a:fillRef idx="0">
+            <a:schemeClr val="accent1"/>
+          </a:fillRef>
+          <a:effectRef idx="0">
+            <a:schemeClr val="accent1"/>
+          </a:effectRef>
+          <a:fontRef idx="minor">
+            <a:schemeClr val="tx1"/>
+          </a:fontRef>
+        </p:style>
+      </p:cxnSp>
+      <p:cxnSp>
+        <p:nvCxnSpPr>
+          <p:cNvPr id="53" name="Straight Arrow Connector 52">
+            <a:extLst>
+              <a:ext uri="{FF2B5EF4-FFF2-40B4-BE49-F238E27FC236}">
+                <a16:creationId xmlns:a16="http://schemas.microsoft.com/office/drawing/2014/main" id="{2A9C5EA3-B2EB-2C4A-BAD8-DF85AA780E5F}"/>
+              </a:ext>
+            </a:extLst>
+          </p:cNvPr>
+          <p:cNvCxnSpPr>
+            <a:cxnSpLocks/>
+            <a:stCxn id="18" idx="2"/>
+            <a:endCxn id="15" idx="0"/>
+          </p:cNvCxnSpPr>
+          <p:nvPr/>
+        </p:nvCxnSpPr>
+        <p:spPr>
+          <a:xfrm>
+            <a:off x="5032268" y="3608180"/>
+            <a:ext cx="3720" cy="2372786"/>
+          </a:xfrm>
+          <a:prstGeom prst="straightConnector1">
+            <a:avLst/>
+          </a:prstGeom>
+          <a:ln w="60325">
+            <a:solidFill>
+              <a:schemeClr val="bg1">
+                <a:lumMod val="50000"/>
+              </a:schemeClr>
+            </a:solidFill>
+            <a:prstDash val="sysDash"/>
+            <a:tailEnd type="triangle"/>
+          </a:ln>
+        </p:spPr>
+        <p:style>
+          <a:lnRef idx="1">
+            <a:schemeClr val="accent1"/>
+          </a:lnRef>
+          <a:fillRef idx="0">
+            <a:schemeClr val="accent1"/>
+          </a:fillRef>
+          <a:effectRef idx="0">
+            <a:schemeClr val="accent1"/>
+          </a:effectRef>
+          <a:fontRef idx="minor">
+            <a:schemeClr val="tx1"/>
+          </a:fontRef>
+        </p:style>
+      </p:cxnSp>
+      <p:cxnSp>
+        <p:nvCxnSpPr>
+          <p:cNvPr id="54" name="Straight Arrow Connector 53">
+            <a:extLst>
+              <a:ext uri="{FF2B5EF4-FFF2-40B4-BE49-F238E27FC236}">
+                <a16:creationId xmlns:a16="http://schemas.microsoft.com/office/drawing/2014/main" id="{6B9CAAA3-CC30-C24F-93F7-B20E22330AF9}"/>
+              </a:ext>
+            </a:extLst>
+          </p:cNvPr>
+          <p:cNvCxnSpPr>
+            <a:cxnSpLocks/>
+          </p:cNvCxnSpPr>
+          <p:nvPr/>
+        </p:nvCxnSpPr>
+        <p:spPr>
+          <a:xfrm>
+            <a:off x="3560631" y="3844096"/>
+            <a:ext cx="713218" cy="334123"/>
+          </a:xfrm>
+          <a:prstGeom prst="straightConnector1">
+            <a:avLst/>
+          </a:prstGeom>
+          <a:ln w="60325">
+            <a:solidFill>
+              <a:schemeClr val="bg1">
+                <a:lumMod val="50000"/>
+              </a:schemeClr>
+            </a:solidFill>
+            <a:prstDash val="sysDash"/>
+            <a:tailEnd type="triangle"/>
+          </a:ln>
+        </p:spPr>
+        <p:style>
+          <a:lnRef idx="1">
+            <a:schemeClr val="accent1"/>
+          </a:lnRef>
+          <a:fillRef idx="0">
+            <a:schemeClr val="accent1"/>
+          </a:fillRef>
+          <a:effectRef idx="0">
+            <a:schemeClr val="accent1"/>
+          </a:effectRef>
+          <a:fontRef idx="minor">
+            <a:schemeClr val="tx1"/>
+          </a:fontRef>
+        </p:style>
+      </p:cxnSp>
+      <p:cxnSp>
+        <p:nvCxnSpPr>
+          <p:cNvPr id="55" name="Straight Arrow Connector 54">
+            <a:extLst>
+              <a:ext uri="{FF2B5EF4-FFF2-40B4-BE49-F238E27FC236}">
+                <a16:creationId xmlns:a16="http://schemas.microsoft.com/office/drawing/2014/main" id="{AB5F2E03-9FD8-4D4F-8FA4-0FCB78A41E6F}"/>
+              </a:ext>
+            </a:extLst>
+          </p:cNvPr>
+          <p:cNvCxnSpPr>
+            <a:cxnSpLocks/>
+            <a:endCxn id="16" idx="3"/>
+          </p:cNvCxnSpPr>
+          <p:nvPr/>
+        </p:nvCxnSpPr>
+        <p:spPr>
+          <a:xfrm flipH="1">
+            <a:off x="3867006" y="4461841"/>
+            <a:ext cx="392958" cy="351733"/>
+          </a:xfrm>
+          <a:prstGeom prst="straightConnector1">
+            <a:avLst/>
+          </a:prstGeom>
+          <a:ln w="60325">
+            <a:solidFill>
+              <a:schemeClr val="bg1">
+                <a:lumMod val="50000"/>
+              </a:schemeClr>
+            </a:solidFill>
+            <a:prstDash val="sysDash"/>
+            <a:tailEnd type="triangle"/>
+          </a:ln>
+        </p:spPr>
+        <p:style>
+          <a:lnRef idx="1">
+            <a:schemeClr val="accent1"/>
+          </a:lnRef>
+          <a:fillRef idx="0">
+            <a:schemeClr val="accent1"/>
+          </a:fillRef>
+          <a:effectRef idx="0">
+            <a:schemeClr val="accent1"/>
+          </a:effectRef>
+          <a:fontRef idx="minor">
+            <a:schemeClr val="tx1"/>
+          </a:fontRef>
+        </p:style>
+      </p:cxnSp>
+      <p:cxnSp>
+        <p:nvCxnSpPr>
+          <p:cNvPr id="59" name="Straight Arrow Connector 58">
+            <a:extLst>
+              <a:ext uri="{FF2B5EF4-FFF2-40B4-BE49-F238E27FC236}">
+                <a16:creationId xmlns:a16="http://schemas.microsoft.com/office/drawing/2014/main" id="{4A796488-3ABE-9840-AA9F-7A3FAF84712D}"/>
+              </a:ext>
+            </a:extLst>
+          </p:cNvPr>
+          <p:cNvCxnSpPr>
+            <a:cxnSpLocks/>
+          </p:cNvCxnSpPr>
+          <p:nvPr/>
+        </p:nvCxnSpPr>
+        <p:spPr>
+          <a:xfrm>
+            <a:off x="3824951" y="4817204"/>
+            <a:ext cx="987854" cy="1145432"/>
+          </a:xfrm>
+          <a:prstGeom prst="straightConnector1">
+            <a:avLst/>
+          </a:prstGeom>
+          <a:ln w="60325">
+            <a:solidFill>
+              <a:schemeClr val="bg1">
+                <a:lumMod val="50000"/>
+              </a:schemeClr>
+            </a:solidFill>
+            <a:prstDash val="sysDash"/>
+            <a:tailEnd type="triangle"/>
+          </a:ln>
+        </p:spPr>
+        <p:style>
+          <a:lnRef idx="1">
+            <a:schemeClr val="accent1"/>
+          </a:lnRef>
+          <a:fillRef idx="0">
+            <a:schemeClr val="accent1"/>
+          </a:fillRef>
+          <a:effectRef idx="0">
+            <a:schemeClr val="accent1"/>
+          </a:effectRef>
+          <a:fontRef idx="minor">
+            <a:schemeClr val="tx1"/>
+          </a:fontRef>
+        </p:style>
+      </p:cxnSp>
+      <p:cxnSp>
+        <p:nvCxnSpPr>
+          <p:cNvPr id="62" name="Straight Arrow Connector 61">
+            <a:extLst>
+              <a:ext uri="{FF2B5EF4-FFF2-40B4-BE49-F238E27FC236}">
+                <a16:creationId xmlns:a16="http://schemas.microsoft.com/office/drawing/2014/main" id="{D4EB2A2C-FE63-E24F-9999-DED7695BF0D9}"/>
+              </a:ext>
+            </a:extLst>
+          </p:cNvPr>
+          <p:cNvCxnSpPr>
+            <a:cxnSpLocks/>
+          </p:cNvCxnSpPr>
+          <p:nvPr/>
+        </p:nvCxnSpPr>
+        <p:spPr>
+          <a:xfrm>
+            <a:off x="3580219" y="3810206"/>
+            <a:ext cx="120482" cy="953822"/>
+          </a:xfrm>
+          <a:prstGeom prst="straightConnector1">
+            <a:avLst/>
+          </a:prstGeom>
+          <a:ln w="60325">
+            <a:solidFill>
+              <a:schemeClr val="bg1">
+                <a:lumMod val="50000"/>
+              </a:schemeClr>
+            </a:solidFill>
+            <a:prstDash val="sysDash"/>
+            <a:tailEnd type="triangle"/>
+          </a:ln>
+        </p:spPr>
+        <p:style>
+          <a:lnRef idx="1">
+            <a:schemeClr val="accent1"/>
+          </a:lnRef>
+          <a:fillRef idx="0">
+            <a:schemeClr val="accent1"/>
+          </a:fillRef>
+          <a:effectRef idx="0">
+            <a:schemeClr val="accent1"/>
+          </a:effectRef>
+          <a:fontRef idx="minor">
+            <a:schemeClr val="tx1"/>
+          </a:fontRef>
+        </p:style>
+      </p:cxnSp>
+      <p:cxnSp>
+        <p:nvCxnSpPr>
+          <p:cNvPr id="66" name="Straight Arrow Connector 65">
+            <a:extLst>
+              <a:ext uri="{FF2B5EF4-FFF2-40B4-BE49-F238E27FC236}">
+                <a16:creationId xmlns:a16="http://schemas.microsoft.com/office/drawing/2014/main" id="{24036167-ECE3-3140-BFE7-E5AE87915316}"/>
+              </a:ext>
+            </a:extLst>
+          </p:cNvPr>
+          <p:cNvCxnSpPr>
+            <a:cxnSpLocks/>
+          </p:cNvCxnSpPr>
+          <p:nvPr/>
+        </p:nvCxnSpPr>
+        <p:spPr>
+          <a:xfrm>
+            <a:off x="4588448" y="4270463"/>
+            <a:ext cx="328313" cy="1638421"/>
+          </a:xfrm>
+          <a:prstGeom prst="straightConnector1">
+            <a:avLst/>
+          </a:prstGeom>
+          <a:ln w="60325">
+            <a:solidFill>
+              <a:schemeClr val="bg1">
+                <a:lumMod val="50000"/>
+              </a:schemeClr>
+            </a:solidFill>
+            <a:prstDash val="sysDash"/>
+            <a:tailEnd type="triangle"/>
+          </a:ln>
+        </p:spPr>
+        <p:style>
+          <a:lnRef idx="1">
+            <a:schemeClr val="accent1"/>
+          </a:lnRef>
+          <a:fillRef idx="0">
+            <a:schemeClr val="accent1"/>
+          </a:fillRef>
+          <a:effectRef idx="0">
+            <a:schemeClr val="accent1"/>
+          </a:effectRef>
+          <a:fontRef idx="minor">
+            <a:schemeClr val="tx1"/>
+          </a:fontRef>
+        </p:style>
+      </p:cxnSp>
+      <p:sp>
+        <p:nvSpPr>
+          <p:cNvPr id="69" name="TextBox 68">
+            <a:extLst>
+              <a:ext uri="{FF2B5EF4-FFF2-40B4-BE49-F238E27FC236}">
+                <a16:creationId xmlns:a16="http://schemas.microsoft.com/office/drawing/2014/main" id="{1EE19450-6D4D-D244-9FB3-5698DCDD3FB6}"/>
+              </a:ext>
+            </a:extLst>
+          </p:cNvPr>
+          <p:cNvSpPr txBox="1"/>
+          <p:nvPr/>
+        </p:nvSpPr>
+        <p:spPr>
+          <a:xfrm>
+            <a:off x="2006368" y="8193699"/>
+            <a:ext cx="301212" cy="369332"/>
+          </a:xfrm>
+          <a:prstGeom prst="rect">
+            <a:avLst/>
+          </a:prstGeom>
+          <a:solidFill>
+            <a:schemeClr val="bg1">
+              <a:lumMod val="50000"/>
+            </a:schemeClr>
+          </a:solidFill>
+        </p:spPr>
+        <p:txBody>
+          <a:bodyPr wrap="square" rtlCol="0">
+            <a:spAutoFit/>
+          </a:bodyPr>
+          <a:lstStyle/>
+          <a:p>
+            <a:r>
+              <a:rPr lang="en-AU" dirty="0">
+                <a:solidFill>
+                  <a:schemeClr val="bg1"/>
+                </a:solidFill>
+              </a:rPr>
+              <a:t>B</a:t>
+            </a:r>
+          </a:p>
+        </p:txBody>
+      </p:sp>
+    </p:spTree>
+    <p:extLst>
+      <p:ext uri="{BB962C8B-B14F-4D97-AF65-F5344CB8AC3E}">
+        <p14:creationId xmlns:p14="http://schemas.microsoft.com/office/powerpoint/2010/main" val="3751403076"/>
+      </p:ext>
+    </p:extLst>
+  </p:cSld>
+  <p:clrMapOvr>
+    <a:masterClrMapping/>
+  </p:clrMapOvr>
+</p:sld>
+</file>
+
+<file path=ppt/slides/slide9.xml><?xml version="1.0" encoding="utf-8"?>
+<p:sld xmlns:a="http://schemas.openxmlformats.org/drawingml/2006/main" xmlns:r="http://schemas.openxmlformats.org/officeDocument/2006/relationships" xmlns:p="http://schemas.openxmlformats.org/presentationml/2006/main">
+  <p:cSld>
+    <p:spTree>
+      <p:nvGrpSpPr>
+        <p:cNvPr id="1" name=""/>
+        <p:cNvGrpSpPr/>
+        <p:nvPr/>
+      </p:nvGrpSpPr>
+      <p:grpSpPr>
+        <a:xfrm>
+          <a:off x="0" y="0"/>
+          <a:ext cx="0" cy="0"/>
+          <a:chOff x="0" y="0"/>
+          <a:chExt cx="0" cy="0"/>
+        </a:xfrm>
+      </p:grpSpPr>
+      <p:sp>
+        <p:nvSpPr>
+          <p:cNvPr id="4" name="Rounded Rectangle 3">
+            <a:extLst>
+              <a:ext uri="{FF2B5EF4-FFF2-40B4-BE49-F238E27FC236}">
+                <a16:creationId xmlns:a16="http://schemas.microsoft.com/office/drawing/2014/main" id="{70652F4E-8EA6-2C4D-A4F0-52433013FDED}"/>
+              </a:ext>
+            </a:extLst>
+          </p:cNvPr>
+          <p:cNvSpPr>
+            <a:spLocks noChangeAspect="1"/>
+          </p:cNvSpPr>
+          <p:nvPr/>
+        </p:nvSpPr>
+        <p:spPr>
+          <a:xfrm>
+            <a:off x="1953463" y="2114322"/>
+            <a:ext cx="3240000" cy="5604325"/>
+          </a:xfrm>
+          <a:prstGeom prst="roundRect">
+            <a:avLst/>
+          </a:prstGeom>
+          <a:noFill/>
+          <a:ln w="38100">
+            <a:solidFill>
+              <a:schemeClr val="tx1"/>
+            </a:solidFill>
+          </a:ln>
+        </p:spPr>
+        <p:style>
+          <a:lnRef idx="2">
+            <a:schemeClr val="accent1">
+              <a:shade val="50000"/>
+            </a:schemeClr>
+          </a:lnRef>
+          <a:fillRef idx="1">
+            <a:schemeClr val="accent1"/>
+          </a:fillRef>
+          <a:effectRef idx="0">
+            <a:schemeClr val="accent1"/>
+          </a:effectRef>
+          <a:fontRef idx="minor">
+            <a:schemeClr val="lt1"/>
+          </a:fontRef>
+        </p:style>
+        <p:txBody>
+          <a:bodyPr rtlCol="0" anchor="ctr"/>
+          <a:lstStyle/>
+          <a:p>
+            <a:pPr algn="ctr"/>
+            <a:endParaRPr lang="en-AU"/>
+          </a:p>
+        </p:txBody>
+      </p:sp>
+      <p:sp>
+        <p:nvSpPr>
+          <p:cNvPr id="5" name="Rounded Rectangle 4">
+            <a:extLst>
+              <a:ext uri="{FF2B5EF4-FFF2-40B4-BE49-F238E27FC236}">
+                <a16:creationId xmlns:a16="http://schemas.microsoft.com/office/drawing/2014/main" id="{3C953649-ED7C-3742-AAEA-8B243B81C427}"/>
+              </a:ext>
+            </a:extLst>
+          </p:cNvPr>
+          <p:cNvSpPr>
+            <a:spLocks noChangeAspect="1"/>
+          </p:cNvSpPr>
+          <p:nvPr/>
+        </p:nvSpPr>
+        <p:spPr>
+          <a:xfrm>
+            <a:off x="1953463" y="7718649"/>
+            <a:ext cx="3240000" cy="1576217"/>
+          </a:xfrm>
+          <a:prstGeom prst="roundRect">
+            <a:avLst/>
+          </a:prstGeom>
+          <a:solidFill>
+            <a:schemeClr val="accent6">
+              <a:lumMod val="40000"/>
+              <a:lumOff val="60000"/>
+            </a:schemeClr>
+          </a:solidFill>
+          <a:ln w="38100">
+            <a:solidFill>
+              <a:schemeClr val="tx1"/>
+            </a:solidFill>
+          </a:ln>
+        </p:spPr>
+        <p:style>
+          <a:lnRef idx="2">
+            <a:schemeClr val="accent1">
+              <a:shade val="50000"/>
+            </a:schemeClr>
+          </a:lnRef>
+          <a:fillRef idx="1">
+            <a:schemeClr val="accent1"/>
+          </a:fillRef>
+          <a:effectRef idx="0">
+            <a:schemeClr val="accent1"/>
+          </a:effectRef>
+          <a:fontRef idx="minor">
+            <a:schemeClr val="lt1"/>
+          </a:fontRef>
+        </p:style>
+        <p:txBody>
+          <a:bodyPr rtlCol="0" anchor="ctr"/>
+          <a:lstStyle/>
+          <a:p>
+            <a:pPr algn="ctr"/>
+            <a:endParaRPr lang="en-AU"/>
+          </a:p>
+        </p:txBody>
+      </p:sp>
+      <p:sp>
+        <p:nvSpPr>
+          <p:cNvPr id="6" name="Rounded Rectangle 5">
+            <a:extLst>
+              <a:ext uri="{FF2B5EF4-FFF2-40B4-BE49-F238E27FC236}">
+                <a16:creationId xmlns:a16="http://schemas.microsoft.com/office/drawing/2014/main" id="{781AE066-2F6F-CD4A-8C9D-2174A5C270BE}"/>
+              </a:ext>
+            </a:extLst>
+          </p:cNvPr>
+          <p:cNvSpPr>
+            <a:spLocks noChangeAspect="1"/>
+          </p:cNvSpPr>
+          <p:nvPr/>
+        </p:nvSpPr>
+        <p:spPr>
+          <a:xfrm>
+            <a:off x="1953463" y="520745"/>
+            <a:ext cx="3240000" cy="1576217"/>
+          </a:xfrm>
+          <a:prstGeom prst="roundRect">
+            <a:avLst/>
+          </a:prstGeom>
+          <a:solidFill>
+            <a:srgbClr val="FF0000"/>
+          </a:solidFill>
+          <a:ln w="38100">
+            <a:solidFill>
+              <a:schemeClr val="tx1"/>
+            </a:solidFill>
+          </a:ln>
+        </p:spPr>
+        <p:style>
+          <a:lnRef idx="2">
+            <a:schemeClr val="accent1">
+              <a:shade val="50000"/>
+            </a:schemeClr>
+          </a:lnRef>
+          <a:fillRef idx="1">
+            <a:schemeClr val="accent1"/>
+          </a:fillRef>
+          <a:effectRef idx="0">
+            <a:schemeClr val="accent1"/>
+          </a:effectRef>
+          <a:fontRef idx="minor">
+            <a:schemeClr val="lt1"/>
+          </a:fontRef>
+        </p:style>
+        <p:txBody>
+          <a:bodyPr rtlCol="0" anchor="ctr"/>
+          <a:lstStyle/>
+          <a:p>
+            <a:pPr algn="ctr"/>
+            <a:endParaRPr lang="en-AU" dirty="0"/>
+          </a:p>
+        </p:txBody>
+      </p:sp>
+      <p:sp>
+        <p:nvSpPr>
+          <p:cNvPr id="7" name="Rounded Rectangle 6">
+            <a:extLst>
+              <a:ext uri="{FF2B5EF4-FFF2-40B4-BE49-F238E27FC236}">
+                <a16:creationId xmlns:a16="http://schemas.microsoft.com/office/drawing/2014/main" id="{58A277D1-08DF-1A43-AFBF-E7F4DE2FD6BB}"/>
+              </a:ext>
+            </a:extLst>
+          </p:cNvPr>
+          <p:cNvSpPr>
+            <a:spLocks noChangeAspect="1"/>
+          </p:cNvSpPr>
+          <p:nvPr/>
+        </p:nvSpPr>
+        <p:spPr>
+          <a:xfrm>
+            <a:off x="1524892" y="101296"/>
+            <a:ext cx="4114800" cy="9630383"/>
+          </a:xfrm>
+          <a:prstGeom prst="roundRect">
+            <a:avLst/>
+          </a:prstGeom>
+          <a:noFill/>
+          <a:ln w="38100">
+            <a:solidFill>
+              <a:schemeClr val="bg1">
+                <a:lumMod val="50000"/>
+              </a:schemeClr>
+            </a:solidFill>
+            <a:prstDash val="sysDot"/>
+          </a:ln>
+        </p:spPr>
+        <p:style>
+          <a:lnRef idx="2">
+            <a:schemeClr val="accent1">
+              <a:shade val="50000"/>
+            </a:schemeClr>
+          </a:lnRef>
+          <a:fillRef idx="1">
+            <a:schemeClr val="accent1"/>
+          </a:fillRef>
+          <a:effectRef idx="0">
+            <a:schemeClr val="accent1"/>
+          </a:effectRef>
+          <a:fontRef idx="minor">
+            <a:schemeClr val="lt1"/>
+          </a:fontRef>
+        </p:style>
+        <p:txBody>
+          <a:bodyPr rtlCol="0" anchor="ctr"/>
+          <a:lstStyle/>
+          <a:p>
+            <a:pPr algn="ctr"/>
+            <a:endParaRPr lang="en-AU"/>
+          </a:p>
+        </p:txBody>
+      </p:sp>
+      <p:sp>
+        <p:nvSpPr>
+          <p:cNvPr id="12" name="Multiply 11">
+            <a:extLst>
+              <a:ext uri="{FF2B5EF4-FFF2-40B4-BE49-F238E27FC236}">
+                <a16:creationId xmlns:a16="http://schemas.microsoft.com/office/drawing/2014/main" id="{782966C4-8BAB-EC4A-B3CC-ECB9FD404B1E}"/>
+              </a:ext>
+            </a:extLst>
+          </p:cNvPr>
+          <p:cNvSpPr/>
+          <p:nvPr/>
+        </p:nvSpPr>
+        <p:spPr>
+          <a:xfrm>
+            <a:off x="3198571" y="5737186"/>
+            <a:ext cx="767443" cy="849086"/>
+          </a:xfrm>
+          <a:prstGeom prst="mathMultiply">
+            <a:avLst/>
+          </a:prstGeom>
+          <a:noFill/>
+        </p:spPr>
+        <p:style>
+          <a:lnRef idx="2">
+            <a:schemeClr val="accent1">
+              <a:shade val="50000"/>
+            </a:schemeClr>
+          </a:lnRef>
+          <a:fillRef idx="1">
+            <a:schemeClr val="accent1"/>
+          </a:fillRef>
+          <a:effectRef idx="0">
+            <a:schemeClr val="accent1"/>
+          </a:effectRef>
+          <a:fontRef idx="minor">
+            <a:schemeClr val="lt1"/>
+          </a:fontRef>
+        </p:style>
+        <p:txBody>
+          <a:bodyPr rtlCol="0" anchor="ctr"/>
+          <a:lstStyle/>
+          <a:p>
+            <a:pPr algn="ctr"/>
+            <a:endParaRPr lang="en-AU"/>
+          </a:p>
+        </p:txBody>
+      </p:sp>
+      <p:sp>
+        <p:nvSpPr>
+          <p:cNvPr id="13" name="Multiply 12">
+            <a:extLst>
+              <a:ext uri="{FF2B5EF4-FFF2-40B4-BE49-F238E27FC236}">
+                <a16:creationId xmlns:a16="http://schemas.microsoft.com/office/drawing/2014/main" id="{711FF500-E426-0D44-916C-B24A7A610DF5}"/>
+              </a:ext>
+            </a:extLst>
+          </p:cNvPr>
+          <p:cNvSpPr/>
+          <p:nvPr/>
+        </p:nvSpPr>
+        <p:spPr>
+          <a:xfrm>
+            <a:off x="3192236" y="3246701"/>
+            <a:ext cx="767443" cy="849086"/>
+          </a:xfrm>
+          <a:prstGeom prst="mathMultiply">
+            <a:avLst/>
+          </a:prstGeom>
+          <a:noFill/>
+        </p:spPr>
+        <p:style>
+          <a:lnRef idx="2">
+            <a:schemeClr val="accent1">
+              <a:shade val="50000"/>
+            </a:schemeClr>
+          </a:lnRef>
+          <a:fillRef idx="1">
+            <a:schemeClr val="accent1"/>
+          </a:fillRef>
+          <a:effectRef idx="0">
+            <a:schemeClr val="accent1"/>
+          </a:effectRef>
+          <a:fontRef idx="minor">
+            <a:schemeClr val="lt1"/>
+          </a:fontRef>
+        </p:style>
+        <p:txBody>
+          <a:bodyPr rtlCol="0" anchor="ctr"/>
+          <a:lstStyle/>
+          <a:p>
+            <a:pPr algn="ctr"/>
+            <a:endParaRPr lang="en-AU"/>
+          </a:p>
+        </p:txBody>
+      </p:sp>
+      <p:sp>
+        <p:nvSpPr>
+          <p:cNvPr id="14" name="TextBox 13">
+            <a:extLst>
+              <a:ext uri="{FF2B5EF4-FFF2-40B4-BE49-F238E27FC236}">
+                <a16:creationId xmlns:a16="http://schemas.microsoft.com/office/drawing/2014/main" id="{CC9FDAD2-F231-6B43-92F7-C2C2863676C2}"/>
+              </a:ext>
+            </a:extLst>
+          </p:cNvPr>
+          <p:cNvSpPr txBox="1"/>
+          <p:nvPr/>
+        </p:nvSpPr>
+        <p:spPr>
+          <a:xfrm>
+            <a:off x="3582292" y="7938242"/>
+            <a:ext cx="517182" cy="369332"/>
+          </a:xfrm>
+          <a:prstGeom prst="rect">
+            <a:avLst/>
+          </a:prstGeom>
+          <a:noFill/>
+        </p:spPr>
+        <p:txBody>
+          <a:bodyPr wrap="square" rtlCol="0">
+            <a:spAutoFit/>
+          </a:bodyPr>
+          <a:lstStyle/>
+          <a:p>
+            <a:r>
+              <a:rPr lang="en-AU" dirty="0"/>
+              <a:t>O2</a:t>
+            </a:r>
+          </a:p>
+        </p:txBody>
+      </p:sp>
+      <p:sp>
+        <p:nvSpPr>
+          <p:cNvPr id="15" name="TextBox 14">
+            <a:extLst>
+              <a:ext uri="{FF2B5EF4-FFF2-40B4-BE49-F238E27FC236}">
+                <a16:creationId xmlns:a16="http://schemas.microsoft.com/office/drawing/2014/main" id="{3986F052-18AA-4443-A26B-C88FE17F207D}"/>
+              </a:ext>
+            </a:extLst>
+          </p:cNvPr>
+          <p:cNvSpPr txBox="1"/>
+          <p:nvPr/>
+        </p:nvSpPr>
+        <p:spPr>
+          <a:xfrm>
+            <a:off x="4712539" y="8939728"/>
+            <a:ext cx="466518" cy="369332"/>
+          </a:xfrm>
+          <a:prstGeom prst="rect">
+            <a:avLst/>
+          </a:prstGeom>
+          <a:solidFill>
+            <a:schemeClr val="tx1"/>
+          </a:solidFill>
+        </p:spPr>
+        <p:txBody>
+          <a:bodyPr wrap="square" rtlCol="0">
+            <a:spAutoFit/>
+          </a:bodyPr>
+          <a:lstStyle/>
+          <a:p>
+            <a:r>
+              <a:rPr lang="en-AU" dirty="0">
+                <a:solidFill>
+                  <a:schemeClr val="bg1"/>
+                </a:solidFill>
+              </a:rPr>
+              <a:t>O1</a:t>
+            </a:r>
+          </a:p>
+        </p:txBody>
+      </p:sp>
+      <p:sp>
+        <p:nvSpPr>
+          <p:cNvPr id="16" name="TextBox 15">
+            <a:extLst>
+              <a:ext uri="{FF2B5EF4-FFF2-40B4-BE49-F238E27FC236}">
+                <a16:creationId xmlns:a16="http://schemas.microsoft.com/office/drawing/2014/main" id="{EEF04ED5-E466-A243-9D27-7184F13C1262}"/>
+              </a:ext>
+            </a:extLst>
+          </p:cNvPr>
+          <p:cNvSpPr txBox="1"/>
+          <p:nvPr/>
+        </p:nvSpPr>
+        <p:spPr>
+          <a:xfrm>
+            <a:off x="2737609" y="7753576"/>
+            <a:ext cx="517182" cy="369332"/>
+          </a:xfrm>
+          <a:prstGeom prst="rect">
+            <a:avLst/>
+          </a:prstGeom>
+          <a:noFill/>
+        </p:spPr>
+        <p:txBody>
+          <a:bodyPr wrap="square" rtlCol="0">
+            <a:spAutoFit/>
+          </a:bodyPr>
+          <a:lstStyle/>
+          <a:p>
+            <a:r>
+              <a:rPr lang="en-AU" dirty="0"/>
+              <a:t>O3</a:t>
+            </a:r>
+          </a:p>
+        </p:txBody>
+      </p:sp>
+      <p:sp>
+        <p:nvSpPr>
+          <p:cNvPr id="17" name="TextBox 16">
+            <a:extLst>
+              <a:ext uri="{FF2B5EF4-FFF2-40B4-BE49-F238E27FC236}">
+                <a16:creationId xmlns:a16="http://schemas.microsoft.com/office/drawing/2014/main" id="{7AB684D8-9879-0C4A-9489-F87A8809D064}"/>
+              </a:ext>
+            </a:extLst>
+          </p:cNvPr>
+          <p:cNvSpPr txBox="1"/>
+          <p:nvPr/>
+        </p:nvSpPr>
+        <p:spPr>
+          <a:xfrm>
+            <a:off x="1921464" y="8904742"/>
+            <a:ext cx="466518" cy="369332"/>
+          </a:xfrm>
+          <a:prstGeom prst="rect">
+            <a:avLst/>
+          </a:prstGeom>
+          <a:noFill/>
+        </p:spPr>
+        <p:txBody>
+          <a:bodyPr wrap="square" rtlCol="0">
+            <a:spAutoFit/>
+          </a:bodyPr>
+          <a:lstStyle/>
+          <a:p>
+            <a:r>
+              <a:rPr lang="en-AU" dirty="0"/>
+              <a:t>O4</a:t>
+            </a:r>
+          </a:p>
+        </p:txBody>
+      </p:sp>
+      <p:sp>
+        <p:nvSpPr>
+          <p:cNvPr id="18" name="TextBox 17">
+            <a:extLst>
+              <a:ext uri="{FF2B5EF4-FFF2-40B4-BE49-F238E27FC236}">
+                <a16:creationId xmlns:a16="http://schemas.microsoft.com/office/drawing/2014/main" id="{F387E253-DCE8-A344-84ED-5DB76FED00C0}"/>
+              </a:ext>
+            </a:extLst>
+          </p:cNvPr>
+          <p:cNvSpPr txBox="1"/>
+          <p:nvPr/>
+        </p:nvSpPr>
+        <p:spPr>
+          <a:xfrm>
+            <a:off x="4631644" y="7295849"/>
+            <a:ext cx="466518" cy="369332"/>
+          </a:xfrm>
+          <a:prstGeom prst="rect">
+            <a:avLst/>
+          </a:prstGeom>
+          <a:noFill/>
+        </p:spPr>
+        <p:txBody>
+          <a:bodyPr wrap="square" rtlCol="0">
+            <a:spAutoFit/>
+          </a:bodyPr>
+          <a:lstStyle/>
+          <a:p>
+            <a:r>
+              <a:rPr lang="en-AU" dirty="0"/>
+              <a:t>O5</a:t>
+            </a:r>
+          </a:p>
+        </p:txBody>
+      </p:sp>
+      <p:sp>
+        <p:nvSpPr>
+          <p:cNvPr id="19" name="TextBox 18">
+            <a:extLst>
+              <a:ext uri="{FF2B5EF4-FFF2-40B4-BE49-F238E27FC236}">
+                <a16:creationId xmlns:a16="http://schemas.microsoft.com/office/drawing/2014/main" id="{A2087CBC-C5DF-574A-BDD6-786E46B4A1F8}"/>
+              </a:ext>
+            </a:extLst>
+          </p:cNvPr>
+          <p:cNvSpPr txBox="1"/>
+          <p:nvPr/>
+        </p:nvSpPr>
+        <p:spPr>
+          <a:xfrm>
+            <a:off x="3392984" y="6723584"/>
+            <a:ext cx="466518" cy="369332"/>
+          </a:xfrm>
+          <a:prstGeom prst="rect">
+            <a:avLst/>
+          </a:prstGeom>
+          <a:noFill/>
+        </p:spPr>
+        <p:txBody>
+          <a:bodyPr wrap="square" rtlCol="0">
+            <a:spAutoFit/>
+          </a:bodyPr>
+          <a:lstStyle/>
+          <a:p>
+            <a:r>
+              <a:rPr lang="en-AU" dirty="0"/>
+              <a:t>O6</a:t>
+            </a:r>
+          </a:p>
+        </p:txBody>
+      </p:sp>
+      <p:sp>
+        <p:nvSpPr>
+          <p:cNvPr id="20" name="TextBox 19">
+            <a:extLst>
+              <a:ext uri="{FF2B5EF4-FFF2-40B4-BE49-F238E27FC236}">
+                <a16:creationId xmlns:a16="http://schemas.microsoft.com/office/drawing/2014/main" id="{3B025EB7-D319-3540-8105-6009DDC47831}"/>
+              </a:ext>
+            </a:extLst>
+          </p:cNvPr>
+          <p:cNvSpPr txBox="1"/>
+          <p:nvPr/>
+        </p:nvSpPr>
+        <p:spPr>
+          <a:xfrm>
+            <a:off x="2098322" y="7281836"/>
+            <a:ext cx="466518" cy="369332"/>
+          </a:xfrm>
+          <a:prstGeom prst="rect">
+            <a:avLst/>
+          </a:prstGeom>
+          <a:noFill/>
+        </p:spPr>
+        <p:txBody>
+          <a:bodyPr wrap="square" rtlCol="0">
+            <a:spAutoFit/>
+          </a:bodyPr>
+          <a:lstStyle/>
+          <a:p>
+            <a:r>
+              <a:rPr lang="en-AU" dirty="0"/>
+              <a:t>O7</a:t>
+            </a:r>
+          </a:p>
+        </p:txBody>
+      </p:sp>
+      <p:sp>
+        <p:nvSpPr>
+          <p:cNvPr id="21" name="TextBox 20">
+            <a:extLst>
+              <a:ext uri="{FF2B5EF4-FFF2-40B4-BE49-F238E27FC236}">
+                <a16:creationId xmlns:a16="http://schemas.microsoft.com/office/drawing/2014/main" id="{52AF208C-DBD1-3640-80BB-BFEF6E67AA82}"/>
+              </a:ext>
+            </a:extLst>
+          </p:cNvPr>
+          <p:cNvSpPr txBox="1"/>
+          <p:nvPr/>
+        </p:nvSpPr>
+        <p:spPr>
+          <a:xfrm>
+            <a:off x="2446466" y="8720076"/>
+            <a:ext cx="466518" cy="369332"/>
+          </a:xfrm>
+          <a:prstGeom prst="rect">
+            <a:avLst/>
+          </a:prstGeom>
+          <a:noFill/>
+        </p:spPr>
+        <p:txBody>
+          <a:bodyPr wrap="square" rtlCol="0">
+            <a:spAutoFit/>
+          </a:bodyPr>
+          <a:lstStyle/>
+          <a:p>
+            <a:r>
+              <a:rPr lang="en-AU" dirty="0">
+                <a:solidFill>
+                  <a:srgbClr val="0070C0"/>
+                </a:solidFill>
+              </a:rPr>
+              <a:t>D8</a:t>
+            </a:r>
+          </a:p>
+        </p:txBody>
+      </p:sp>
+      <p:sp>
+        <p:nvSpPr>
+          <p:cNvPr id="22" name="TextBox 21">
+            <a:extLst>
+              <a:ext uri="{FF2B5EF4-FFF2-40B4-BE49-F238E27FC236}">
+                <a16:creationId xmlns:a16="http://schemas.microsoft.com/office/drawing/2014/main" id="{329C0760-F363-5D42-B231-1684AA9C118C}"/>
+              </a:ext>
+            </a:extLst>
+          </p:cNvPr>
+          <p:cNvSpPr txBox="1"/>
+          <p:nvPr/>
+        </p:nvSpPr>
+        <p:spPr>
+          <a:xfrm>
+            <a:off x="4479280" y="8300655"/>
+            <a:ext cx="466518" cy="369332"/>
+          </a:xfrm>
+          <a:prstGeom prst="rect">
+            <a:avLst/>
+          </a:prstGeom>
+          <a:noFill/>
+        </p:spPr>
+        <p:txBody>
+          <a:bodyPr wrap="square" rtlCol="0">
+            <a:spAutoFit/>
+          </a:bodyPr>
+          <a:lstStyle/>
+          <a:p>
+            <a:r>
+              <a:rPr lang="en-AU" dirty="0">
+                <a:solidFill>
+                  <a:srgbClr val="0070C0"/>
+                </a:solidFill>
+              </a:rPr>
+              <a:t>D9</a:t>
+            </a:r>
+          </a:p>
+        </p:txBody>
+      </p:sp>
+      <p:sp>
+        <p:nvSpPr>
+          <p:cNvPr id="23" name="TextBox 22">
+            <a:extLst>
+              <a:ext uri="{FF2B5EF4-FFF2-40B4-BE49-F238E27FC236}">
+                <a16:creationId xmlns:a16="http://schemas.microsoft.com/office/drawing/2014/main" id="{7D0E6BA3-DC58-5548-9512-A62D90CF5E98}"/>
+              </a:ext>
+            </a:extLst>
+          </p:cNvPr>
+          <p:cNvSpPr txBox="1"/>
+          <p:nvPr/>
+        </p:nvSpPr>
+        <p:spPr>
+          <a:xfrm>
+            <a:off x="3107054" y="8001845"/>
+            <a:ext cx="616526" cy="369332"/>
+          </a:xfrm>
+          <a:prstGeom prst="rect">
+            <a:avLst/>
+          </a:prstGeom>
+          <a:noFill/>
+        </p:spPr>
+        <p:txBody>
+          <a:bodyPr wrap="square" rtlCol="0">
+            <a:spAutoFit/>
+          </a:bodyPr>
+          <a:lstStyle/>
+          <a:p>
+            <a:r>
+              <a:rPr lang="en-AU" dirty="0">
+                <a:solidFill>
+                  <a:srgbClr val="0070C0"/>
+                </a:solidFill>
+              </a:rPr>
+              <a:t>D10</a:t>
+            </a:r>
+          </a:p>
+        </p:txBody>
+      </p:sp>
+      <p:sp>
+        <p:nvSpPr>
+          <p:cNvPr id="24" name="TextBox 23">
+            <a:extLst>
+              <a:ext uri="{FF2B5EF4-FFF2-40B4-BE49-F238E27FC236}">
+                <a16:creationId xmlns:a16="http://schemas.microsoft.com/office/drawing/2014/main" id="{2F07E686-35A4-4245-871F-DFF71870B7E2}"/>
+              </a:ext>
+            </a:extLst>
+          </p:cNvPr>
+          <p:cNvSpPr txBox="1"/>
+          <p:nvPr/>
+        </p:nvSpPr>
+        <p:spPr>
+          <a:xfrm>
+            <a:off x="2296458" y="7779338"/>
+            <a:ext cx="616526" cy="369332"/>
+          </a:xfrm>
+          <a:prstGeom prst="rect">
+            <a:avLst/>
+          </a:prstGeom>
+          <a:noFill/>
+        </p:spPr>
+        <p:txBody>
+          <a:bodyPr wrap="square" rtlCol="0">
+            <a:spAutoFit/>
+          </a:bodyPr>
+          <a:lstStyle/>
+          <a:p>
+            <a:r>
+              <a:rPr lang="en-AU" dirty="0">
+                <a:solidFill>
+                  <a:srgbClr val="0070C0"/>
+                </a:solidFill>
+              </a:rPr>
+              <a:t>D11</a:t>
+            </a:r>
+          </a:p>
+        </p:txBody>
+      </p:sp>
+      <p:sp>
+        <p:nvSpPr>
+          <p:cNvPr id="25" name="TextBox 24">
+            <a:extLst>
+              <a:ext uri="{FF2B5EF4-FFF2-40B4-BE49-F238E27FC236}">
+                <a16:creationId xmlns:a16="http://schemas.microsoft.com/office/drawing/2014/main" id="{0752D762-AB6E-314A-9593-3121603F88E7}"/>
+              </a:ext>
+            </a:extLst>
+          </p:cNvPr>
+          <p:cNvSpPr txBox="1"/>
+          <p:nvPr/>
+        </p:nvSpPr>
+        <p:spPr>
+          <a:xfrm>
+            <a:off x="3707495" y="6796769"/>
+            <a:ext cx="616526" cy="369332"/>
+          </a:xfrm>
+          <a:prstGeom prst="rect">
+            <a:avLst/>
+          </a:prstGeom>
+          <a:noFill/>
+        </p:spPr>
+        <p:txBody>
+          <a:bodyPr wrap="square" rtlCol="0">
+            <a:spAutoFit/>
+          </a:bodyPr>
+          <a:lstStyle/>
+          <a:p>
+            <a:r>
+              <a:rPr lang="en-AU" dirty="0">
+                <a:solidFill>
+                  <a:srgbClr val="0070C0"/>
+                </a:solidFill>
+              </a:rPr>
+              <a:t>D12</a:t>
+            </a:r>
+          </a:p>
+        </p:txBody>
+      </p:sp>
+      <p:sp>
+        <p:nvSpPr>
+          <p:cNvPr id="26" name="TextBox 25">
+            <a:extLst>
+              <a:ext uri="{FF2B5EF4-FFF2-40B4-BE49-F238E27FC236}">
+                <a16:creationId xmlns:a16="http://schemas.microsoft.com/office/drawing/2014/main" id="{9DAF916B-52B3-584A-B384-14D8DBA2AF05}"/>
+              </a:ext>
+            </a:extLst>
+          </p:cNvPr>
+          <p:cNvSpPr txBox="1"/>
+          <p:nvPr/>
+        </p:nvSpPr>
+        <p:spPr>
+          <a:xfrm>
+            <a:off x="3527850" y="7238950"/>
+            <a:ext cx="616526" cy="369332"/>
+          </a:xfrm>
+          <a:prstGeom prst="rect">
+            <a:avLst/>
+          </a:prstGeom>
+          <a:noFill/>
+        </p:spPr>
+        <p:txBody>
+          <a:bodyPr wrap="square" rtlCol="0">
+            <a:spAutoFit/>
+          </a:bodyPr>
+          <a:lstStyle/>
+          <a:p>
+            <a:r>
+              <a:rPr lang="en-AU" dirty="0">
+                <a:solidFill>
+                  <a:srgbClr val="0070C0"/>
+                </a:solidFill>
+              </a:rPr>
+              <a:t>D13</a:t>
+            </a:r>
+          </a:p>
+        </p:txBody>
+      </p:sp>
+      <p:sp>
+        <p:nvSpPr>
+          <p:cNvPr id="27" name="TextBox 26">
+            <a:extLst>
+              <a:ext uri="{FF2B5EF4-FFF2-40B4-BE49-F238E27FC236}">
+                <a16:creationId xmlns:a16="http://schemas.microsoft.com/office/drawing/2014/main" id="{4E9E14C7-CBCA-234F-9806-A90D9C1DDF75}"/>
+              </a:ext>
+            </a:extLst>
+          </p:cNvPr>
+          <p:cNvSpPr txBox="1"/>
+          <p:nvPr/>
+        </p:nvSpPr>
+        <p:spPr>
+          <a:xfrm>
+            <a:off x="3051354" y="7436176"/>
+            <a:ext cx="616526" cy="369332"/>
+          </a:xfrm>
+          <a:prstGeom prst="rect">
+            <a:avLst/>
+          </a:prstGeom>
+          <a:noFill/>
+        </p:spPr>
+        <p:txBody>
+          <a:bodyPr wrap="square" rtlCol="0">
+            <a:spAutoFit/>
+          </a:bodyPr>
+          <a:lstStyle/>
+          <a:p>
+            <a:r>
+              <a:rPr lang="en-AU" dirty="0">
+                <a:solidFill>
+                  <a:srgbClr val="0070C0"/>
+                </a:solidFill>
+              </a:rPr>
+              <a:t>D14</a:t>
+            </a:r>
+          </a:p>
+        </p:txBody>
+      </p:sp>
+      <p:sp>
+        <p:nvSpPr>
+          <p:cNvPr id="40" name="Oval 39">
+            <a:extLst>
+              <a:ext uri="{FF2B5EF4-FFF2-40B4-BE49-F238E27FC236}">
+                <a16:creationId xmlns:a16="http://schemas.microsoft.com/office/drawing/2014/main" id="{F7991E49-51E5-B144-BF2D-90C81A5A6344}"/>
+              </a:ext>
+            </a:extLst>
+          </p:cNvPr>
+          <p:cNvSpPr/>
+          <p:nvPr/>
+        </p:nvSpPr>
+        <p:spPr>
+          <a:xfrm>
+            <a:off x="3314650" y="6980671"/>
+            <a:ext cx="180000" cy="180000"/>
+          </a:xfrm>
+          <a:prstGeom prst="ellipse">
+            <a:avLst/>
+          </a:prstGeom>
+          <a:solidFill>
+            <a:schemeClr val="tx1"/>
+          </a:solidFill>
+        </p:spPr>
+        <p:style>
+          <a:lnRef idx="2">
+            <a:schemeClr val="accent1">
+              <a:shade val="50000"/>
+            </a:schemeClr>
+          </a:lnRef>
+          <a:fillRef idx="1">
+            <a:schemeClr val="accent1"/>
+          </a:fillRef>
+          <a:effectRef idx="0">
+            <a:schemeClr val="accent1"/>
+          </a:effectRef>
+          <a:fontRef idx="minor">
+            <a:schemeClr val="lt1"/>
+          </a:fontRef>
+        </p:style>
+        <p:txBody>
+          <a:bodyPr rtlCol="0" anchor="ctr"/>
+          <a:lstStyle/>
+          <a:p>
+            <a:pPr algn="ctr"/>
+            <a:endParaRPr lang="en-AU"/>
+          </a:p>
+        </p:txBody>
+      </p:sp>
+      <p:cxnSp>
+        <p:nvCxnSpPr>
+          <p:cNvPr id="41" name="Straight Connector 40">
+            <a:extLst>
+              <a:ext uri="{FF2B5EF4-FFF2-40B4-BE49-F238E27FC236}">
+                <a16:creationId xmlns:a16="http://schemas.microsoft.com/office/drawing/2014/main" id="{0DA6ECE3-5073-1A4A-8AB8-7EEBEADCE3B9}"/>
+              </a:ext>
+            </a:extLst>
+          </p:cNvPr>
+          <p:cNvCxnSpPr>
+            <a:cxnSpLocks/>
+          </p:cNvCxnSpPr>
+          <p:nvPr/>
+        </p:nvCxnSpPr>
+        <p:spPr>
+          <a:xfrm>
+            <a:off x="5373127" y="294245"/>
+            <a:ext cx="0" cy="839561"/>
+          </a:xfrm>
+          <a:prstGeom prst="line">
+            <a:avLst/>
+          </a:prstGeom>
+          <a:ln w="60325">
+            <a:solidFill>
+              <a:srgbClr val="C00000"/>
+            </a:solidFill>
+            <a:headEnd type="stealth" w="lg" len="lg"/>
+          </a:ln>
+        </p:spPr>
+        <p:style>
+          <a:lnRef idx="1">
+            <a:schemeClr val="accent1"/>
+          </a:lnRef>
+          <a:fillRef idx="0">
+            <a:schemeClr val="accent1"/>
+          </a:fillRef>
+          <a:effectRef idx="0">
+            <a:schemeClr val="accent1"/>
+          </a:effectRef>
+          <a:fontRef idx="minor">
+            <a:schemeClr val="tx1"/>
+          </a:fontRef>
+        </p:style>
+      </p:cxnSp>
+      <p:sp>
+        <p:nvSpPr>
+          <p:cNvPr id="42" name="TextBox 41">
+            <a:extLst>
+              <a:ext uri="{FF2B5EF4-FFF2-40B4-BE49-F238E27FC236}">
+                <a16:creationId xmlns:a16="http://schemas.microsoft.com/office/drawing/2014/main" id="{202F7DA6-28E9-A14D-B2F3-6A88F109DF56}"/>
+              </a:ext>
+            </a:extLst>
+          </p:cNvPr>
+          <p:cNvSpPr txBox="1"/>
+          <p:nvPr/>
+        </p:nvSpPr>
+        <p:spPr>
+          <a:xfrm>
+            <a:off x="4446628" y="168836"/>
+            <a:ext cx="961755" cy="369332"/>
+          </a:xfrm>
+          <a:prstGeom prst="rect">
+            <a:avLst/>
+          </a:prstGeom>
+          <a:noFill/>
+        </p:spPr>
+        <p:txBody>
+          <a:bodyPr wrap="square" rtlCol="0">
+            <a:spAutoFit/>
+          </a:bodyPr>
+          <a:lstStyle/>
+          <a:p>
+            <a:r>
+              <a:rPr lang="en-AU" dirty="0">
+                <a:solidFill>
+                  <a:srgbClr val="C00000"/>
+                </a:solidFill>
+              </a:rPr>
+              <a:t>Upfield</a:t>
+            </a:r>
+          </a:p>
+        </p:txBody>
+      </p:sp>
+      <p:sp>
+        <p:nvSpPr>
+          <p:cNvPr id="43" name="TextBox 42">
+            <a:extLst>
+              <a:ext uri="{FF2B5EF4-FFF2-40B4-BE49-F238E27FC236}">
+                <a16:creationId xmlns:a16="http://schemas.microsoft.com/office/drawing/2014/main" id="{DD1EC9A5-79C9-1242-B6F2-E5E224E388FB}"/>
+              </a:ext>
+            </a:extLst>
+          </p:cNvPr>
+          <p:cNvSpPr txBox="1"/>
+          <p:nvPr/>
+        </p:nvSpPr>
+        <p:spPr>
+          <a:xfrm>
+            <a:off x="4288814" y="9291052"/>
+            <a:ext cx="1210561" cy="369332"/>
+          </a:xfrm>
+          <a:prstGeom prst="rect">
+            <a:avLst/>
+          </a:prstGeom>
+          <a:noFill/>
+        </p:spPr>
+        <p:txBody>
+          <a:bodyPr wrap="square" rtlCol="0">
+            <a:spAutoFit/>
+          </a:bodyPr>
+          <a:lstStyle/>
+          <a:p>
+            <a:r>
+              <a:rPr lang="en-AU" dirty="0">
+                <a:solidFill>
+                  <a:schemeClr val="accent6"/>
+                </a:solidFill>
+              </a:rPr>
+              <a:t>Downfield</a:t>
+            </a:r>
+          </a:p>
+        </p:txBody>
+      </p:sp>
+      <p:cxnSp>
+        <p:nvCxnSpPr>
+          <p:cNvPr id="44" name="Straight Connector 43">
+            <a:extLst>
+              <a:ext uri="{FF2B5EF4-FFF2-40B4-BE49-F238E27FC236}">
+                <a16:creationId xmlns:a16="http://schemas.microsoft.com/office/drawing/2014/main" id="{0F30EF98-D099-6B42-AC9C-D6A71369EEC9}"/>
+              </a:ext>
+            </a:extLst>
+          </p:cNvPr>
+          <p:cNvCxnSpPr>
+            <a:cxnSpLocks/>
+          </p:cNvCxnSpPr>
+          <p:nvPr/>
+        </p:nvCxnSpPr>
+        <p:spPr>
+          <a:xfrm flipV="1">
+            <a:off x="5373127" y="8373862"/>
+            <a:ext cx="0" cy="938269"/>
+          </a:xfrm>
+          <a:prstGeom prst="line">
+            <a:avLst/>
+          </a:prstGeom>
+          <a:ln w="60325">
+            <a:solidFill>
+              <a:srgbClr val="00B050"/>
+            </a:solidFill>
+            <a:headEnd type="stealth" w="lg" len="lg"/>
+          </a:ln>
+        </p:spPr>
+        <p:style>
+          <a:lnRef idx="1">
+            <a:schemeClr val="accent1"/>
+          </a:lnRef>
+          <a:fillRef idx="0">
+            <a:schemeClr val="accent1"/>
+          </a:fillRef>
+          <a:effectRef idx="0">
+            <a:schemeClr val="accent1"/>
+          </a:effectRef>
+          <a:fontRef idx="minor">
+            <a:schemeClr val="tx1"/>
+          </a:fontRef>
+        </p:style>
+      </p:cxnSp>
+      <p:sp>
+        <p:nvSpPr>
+          <p:cNvPr id="3" name="Arc 2">
+            <a:extLst>
+              <a:ext uri="{FF2B5EF4-FFF2-40B4-BE49-F238E27FC236}">
+                <a16:creationId xmlns:a16="http://schemas.microsoft.com/office/drawing/2014/main" id="{FD25C454-65A8-EA43-BA64-A2BA9DCFCA80}"/>
+              </a:ext>
+            </a:extLst>
+          </p:cNvPr>
+          <p:cNvSpPr/>
+          <p:nvPr/>
+        </p:nvSpPr>
+        <p:spPr>
+          <a:xfrm rot="6095834">
+            <a:off x="2560850" y="6238577"/>
+            <a:ext cx="1669383" cy="866793"/>
+          </a:xfrm>
+          <a:prstGeom prst="arc">
+            <a:avLst/>
+          </a:prstGeom>
+        </p:spPr>
+        <p:style>
+          <a:lnRef idx="1">
+            <a:schemeClr val="accent1"/>
+          </a:lnRef>
+          <a:fillRef idx="0">
+            <a:schemeClr val="accent1"/>
+          </a:fillRef>
+          <a:effectRef idx="0">
+            <a:schemeClr val="accent1"/>
+          </a:effectRef>
+          <a:fontRef idx="minor">
+            <a:schemeClr val="tx1"/>
+          </a:fontRef>
+        </p:style>
+        <p:txBody>
+          <a:bodyPr rtlCol="0" anchor="ctr"/>
+          <a:lstStyle/>
+          <a:p>
+            <a:pPr algn="ctr"/>
+            <a:endParaRPr lang="en-AU"/>
+          </a:p>
+        </p:txBody>
+      </p:sp>
+      <p:cxnSp>
+        <p:nvCxnSpPr>
+          <p:cNvPr id="54" name="Straight Arrow Connector 53">
+            <a:extLst>
+              <a:ext uri="{FF2B5EF4-FFF2-40B4-BE49-F238E27FC236}">
+                <a16:creationId xmlns:a16="http://schemas.microsoft.com/office/drawing/2014/main" id="{6B9CAAA3-CC30-C24F-93F7-B20E22330AF9}"/>
+              </a:ext>
+            </a:extLst>
+          </p:cNvPr>
+          <p:cNvCxnSpPr>
+            <a:cxnSpLocks/>
+          </p:cNvCxnSpPr>
+          <p:nvPr/>
+        </p:nvCxnSpPr>
+        <p:spPr>
+          <a:xfrm>
+            <a:off x="3608698" y="7092075"/>
+            <a:ext cx="1165170" cy="613949"/>
+          </a:xfrm>
+          <a:prstGeom prst="straightConnector1">
+            <a:avLst/>
+          </a:prstGeom>
+          <a:ln w="60325">
+            <a:solidFill>
+              <a:schemeClr val="bg1">
+                <a:lumMod val="50000"/>
+              </a:schemeClr>
+            </a:solidFill>
+            <a:prstDash val="sysDash"/>
+            <a:tailEnd type="triangle"/>
+          </a:ln>
+        </p:spPr>
+        <p:style>
+          <a:lnRef idx="1">
+            <a:schemeClr val="accent1"/>
+          </a:lnRef>
+          <a:fillRef idx="0">
+            <a:schemeClr val="accent1"/>
+          </a:fillRef>
+          <a:effectRef idx="0">
+            <a:schemeClr val="accent1"/>
+          </a:effectRef>
+          <a:fontRef idx="minor">
+            <a:schemeClr val="tx1"/>
+          </a:fontRef>
+        </p:style>
+      </p:cxnSp>
+      <p:cxnSp>
+        <p:nvCxnSpPr>
+          <p:cNvPr id="62" name="Straight Arrow Connector 61">
+            <a:extLst>
+              <a:ext uri="{FF2B5EF4-FFF2-40B4-BE49-F238E27FC236}">
+                <a16:creationId xmlns:a16="http://schemas.microsoft.com/office/drawing/2014/main" id="{D4EB2A2C-FE63-E24F-9999-DED7695BF0D9}"/>
+              </a:ext>
+            </a:extLst>
+          </p:cNvPr>
+          <p:cNvCxnSpPr>
+            <a:cxnSpLocks/>
+          </p:cNvCxnSpPr>
+          <p:nvPr/>
+        </p:nvCxnSpPr>
+        <p:spPr>
+          <a:xfrm>
+            <a:off x="3439535" y="7181451"/>
+            <a:ext cx="309193" cy="832502"/>
+          </a:xfrm>
+          <a:prstGeom prst="straightConnector1">
+            <a:avLst/>
+          </a:prstGeom>
+          <a:ln w="60325">
+            <a:solidFill>
+              <a:schemeClr val="bg1">
+                <a:lumMod val="50000"/>
+              </a:schemeClr>
+            </a:solidFill>
+            <a:prstDash val="sysDash"/>
+            <a:tailEnd type="triangle"/>
           </a:ln>
         </p:spPr>
         <p:style>
@@ -13311,7 +17550,7 @@
     </p:spTree>
     <p:extLst>
       <p:ext uri="{BB962C8B-B14F-4D97-AF65-F5344CB8AC3E}">
-        <p14:creationId xmlns:p14="http://schemas.microsoft.com/office/powerpoint/2010/main" val="799718895"/>
+        <p14:creationId xmlns:p14="http://schemas.microsoft.com/office/powerpoint/2010/main" val="3014409582"/>
       </p:ext>
     </p:extLst>
   </p:cSld>

</xml_diff>

<commit_message>
Continue draft O4, first draft vert
</commit_message>
<xml_diff>
--- a/graphics/Graphics.pptx
+++ b/graphics/Graphics.pptx
@@ -121,7 +121,7 @@
   <p:extLst>
     <p:ext uri="{EFAFB233-063F-42B5-8137-9DF3F51BA10A}">
       <p15:sldGuideLst xmlns:p15="http://schemas.microsoft.com/office/powerpoint/2012/main">
-        <p15:guide id="1" orient="horz" pos="3120" userDrawn="1">
+        <p15:guide id="1" orient="horz" pos="3097" userDrawn="1">
           <p15:clr>
             <a:srgbClr val="A4A3A4"/>
           </p15:clr>
@@ -219,7 +219,7 @@
           <a:p>
             <a:fld id="{45933B21-E436-3A46-ADDA-424A82352920}" type="datetimeFigureOut">
               <a:rPr lang="en-AU" smtClean="0"/>
-              <a:t>31/12/22</a:t>
+              <a:t>1/1/23</a:t>
             </a:fld>
             <a:endParaRPr lang="en-AU"/>
           </a:p>
@@ -618,7 +618,7 @@
           <a:p>
             <a:fld id="{84CBB076-2C69-DC49-A9FF-99213B15956D}" type="datetimeFigureOut">
               <a:rPr lang="en-AU" smtClean="0"/>
-              <a:t>31/12/22</a:t>
+              <a:t>1/1/23</a:t>
             </a:fld>
             <a:endParaRPr lang="en-AU"/>
           </a:p>
@@ -788,7 +788,7 @@
           <a:p>
             <a:fld id="{84CBB076-2C69-DC49-A9FF-99213B15956D}" type="datetimeFigureOut">
               <a:rPr lang="en-AU" smtClean="0"/>
-              <a:t>31/12/22</a:t>
+              <a:t>1/1/23</a:t>
             </a:fld>
             <a:endParaRPr lang="en-AU"/>
           </a:p>
@@ -968,7 +968,7 @@
           <a:p>
             <a:fld id="{84CBB076-2C69-DC49-A9FF-99213B15956D}" type="datetimeFigureOut">
               <a:rPr lang="en-AU" smtClean="0"/>
-              <a:t>31/12/22</a:t>
+              <a:t>1/1/23</a:t>
             </a:fld>
             <a:endParaRPr lang="en-AU"/>
           </a:p>
@@ -1138,7 +1138,7 @@
           <a:p>
             <a:fld id="{84CBB076-2C69-DC49-A9FF-99213B15956D}" type="datetimeFigureOut">
               <a:rPr lang="en-AU" smtClean="0"/>
-              <a:t>31/12/22</a:t>
+              <a:t>1/1/23</a:t>
             </a:fld>
             <a:endParaRPr lang="en-AU"/>
           </a:p>
@@ -1382,7 +1382,7 @@
           <a:p>
             <a:fld id="{84CBB076-2C69-DC49-A9FF-99213B15956D}" type="datetimeFigureOut">
               <a:rPr lang="en-AU" smtClean="0"/>
-              <a:t>31/12/22</a:t>
+              <a:t>1/1/23</a:t>
             </a:fld>
             <a:endParaRPr lang="en-AU"/>
           </a:p>
@@ -1614,7 +1614,7 @@
           <a:p>
             <a:fld id="{84CBB076-2C69-DC49-A9FF-99213B15956D}" type="datetimeFigureOut">
               <a:rPr lang="en-AU" smtClean="0"/>
-              <a:t>31/12/22</a:t>
+              <a:t>1/1/23</a:t>
             </a:fld>
             <a:endParaRPr lang="en-AU"/>
           </a:p>
@@ -1981,7 +1981,7 @@
           <a:p>
             <a:fld id="{84CBB076-2C69-DC49-A9FF-99213B15956D}" type="datetimeFigureOut">
               <a:rPr lang="en-AU" smtClean="0"/>
-              <a:t>31/12/22</a:t>
+              <a:t>1/1/23</a:t>
             </a:fld>
             <a:endParaRPr lang="en-AU"/>
           </a:p>
@@ -2099,7 +2099,7 @@
           <a:p>
             <a:fld id="{84CBB076-2C69-DC49-A9FF-99213B15956D}" type="datetimeFigureOut">
               <a:rPr lang="en-AU" smtClean="0"/>
-              <a:t>31/12/22</a:t>
+              <a:t>1/1/23</a:t>
             </a:fld>
             <a:endParaRPr lang="en-AU"/>
           </a:p>
@@ -2194,7 +2194,7 @@
           <a:p>
             <a:fld id="{84CBB076-2C69-DC49-A9FF-99213B15956D}" type="datetimeFigureOut">
               <a:rPr lang="en-AU" smtClean="0"/>
-              <a:t>31/12/22</a:t>
+              <a:t>1/1/23</a:t>
             </a:fld>
             <a:endParaRPr lang="en-AU"/>
           </a:p>
@@ -2471,7 +2471,7 @@
           <a:p>
             <a:fld id="{84CBB076-2C69-DC49-A9FF-99213B15956D}" type="datetimeFigureOut">
               <a:rPr lang="en-AU" smtClean="0"/>
-              <a:t>31/12/22</a:t>
+              <a:t>1/1/23</a:t>
             </a:fld>
             <a:endParaRPr lang="en-AU"/>
           </a:p>
@@ -2728,7 +2728,7 @@
           <a:p>
             <a:fld id="{84CBB076-2C69-DC49-A9FF-99213B15956D}" type="datetimeFigureOut">
               <a:rPr lang="en-AU" smtClean="0"/>
-              <a:t>31/12/22</a:t>
+              <a:t>1/1/23</a:t>
             </a:fld>
             <a:endParaRPr lang="en-AU"/>
           </a:p>
@@ -2941,7 +2941,7 @@
           <a:p>
             <a:fld id="{84CBB076-2C69-DC49-A9FF-99213B15956D}" type="datetimeFigureOut">
               <a:rPr lang="en-AU" smtClean="0"/>
-              <a:t>31/12/22</a:t>
+              <a:t>1/1/23</a:t>
             </a:fld>
             <a:endParaRPr lang="en-AU"/>
           </a:p>
@@ -6548,10 +6548,54 @@
       </p:grpSpPr>
       <p:sp>
         <p:nvSpPr>
-          <p:cNvPr id="5" name="Rounded Rectangle 4">
-            <a:extLst>
-              <a:ext uri="{FF2B5EF4-FFF2-40B4-BE49-F238E27FC236}">
-                <a16:creationId xmlns:a16="http://schemas.microsoft.com/office/drawing/2014/main" id="{3C953649-ED7C-3742-AAEA-8B243B81C427}"/>
+          <p:cNvPr id="177" name="TextBox 176">
+            <a:extLst>
+              <a:ext uri="{FF2B5EF4-FFF2-40B4-BE49-F238E27FC236}">
+                <a16:creationId xmlns:a16="http://schemas.microsoft.com/office/drawing/2014/main" id="{A8F28B68-A42C-9D49-8A58-716CD97FFA87}"/>
+              </a:ext>
+            </a:extLst>
+          </p:cNvPr>
+          <p:cNvSpPr txBox="1"/>
+          <p:nvPr/>
+        </p:nvSpPr>
+        <p:spPr>
+          <a:xfrm>
+            <a:off x="3862271" y="4904470"/>
+            <a:ext cx="409152" cy="461665"/>
+          </a:xfrm>
+          <a:prstGeom prst="rect">
+            <a:avLst/>
+          </a:prstGeom>
+          <a:solidFill>
+            <a:schemeClr val="bg1">
+              <a:lumMod val="50000"/>
+            </a:schemeClr>
+          </a:solidFill>
+        </p:spPr>
+        <p:txBody>
+          <a:bodyPr wrap="square" rtlCol="0">
+            <a:spAutoFit/>
+          </a:bodyPr>
+          <a:lstStyle/>
+          <a:p>
+            <a:pPr algn="ctr"/>
+            <a:r>
+              <a:rPr lang="en-AU" sz="2400" dirty="0">
+                <a:solidFill>
+                  <a:schemeClr val="bg1"/>
+                </a:solidFill>
+              </a:rPr>
+              <a:t>C</a:t>
+            </a:r>
+          </a:p>
+        </p:txBody>
+      </p:sp>
+      <p:sp>
+        <p:nvSpPr>
+          <p:cNvPr id="126" name="Rounded Rectangle 125">
+            <a:extLst>
+              <a:ext uri="{FF2B5EF4-FFF2-40B4-BE49-F238E27FC236}">
+                <a16:creationId xmlns:a16="http://schemas.microsoft.com/office/drawing/2014/main" id="{B29459B4-8365-3E48-A41A-56417A273601}"/>
               </a:ext>
             </a:extLst>
           </p:cNvPr>
@@ -6562,7 +6606,117 @@
         </p:nvSpPr>
         <p:spPr>
           <a:xfrm>
-            <a:off x="59477" y="7708143"/>
+            <a:off x="3412295" y="3517585"/>
+            <a:ext cx="3224922" cy="4745928"/>
+          </a:xfrm>
+          <a:prstGeom prst="roundRect">
+            <a:avLst/>
+          </a:prstGeom>
+          <a:noFill/>
+          <a:ln w="38100">
+            <a:solidFill>
+              <a:schemeClr val="tx1"/>
+            </a:solidFill>
+          </a:ln>
+        </p:spPr>
+        <p:style>
+          <a:lnRef idx="2">
+            <a:schemeClr val="accent1">
+              <a:shade val="50000"/>
+            </a:schemeClr>
+          </a:lnRef>
+          <a:fillRef idx="1">
+            <a:schemeClr val="accent1"/>
+          </a:fillRef>
+          <a:effectRef idx="0">
+            <a:schemeClr val="accent1"/>
+          </a:effectRef>
+          <a:fontRef idx="minor">
+            <a:schemeClr val="lt1"/>
+          </a:fontRef>
+        </p:style>
+        <p:txBody>
+          <a:bodyPr rtlCol="0" anchor="ctr"/>
+          <a:lstStyle/>
+          <a:p>
+            <a:pPr algn="ctr"/>
+            <a:endParaRPr lang="en-AU" sz="2400"/>
+          </a:p>
+        </p:txBody>
+      </p:sp>
+      <p:sp>
+        <p:nvSpPr>
+          <p:cNvPr id="85" name="Rounded Rectangle 84">
+            <a:extLst>
+              <a:ext uri="{FF2B5EF4-FFF2-40B4-BE49-F238E27FC236}">
+                <a16:creationId xmlns:a16="http://schemas.microsoft.com/office/drawing/2014/main" id="{034ABB30-A824-7248-A201-177CFC37B0C3}"/>
+              </a:ext>
+            </a:extLst>
+          </p:cNvPr>
+          <p:cNvSpPr>
+            <a:spLocks noChangeAspect="1"/>
+          </p:cNvSpPr>
+          <p:nvPr/>
+        </p:nvSpPr>
+        <p:spPr>
+          <a:xfrm>
+            <a:off x="3401789" y="204951"/>
+            <a:ext cx="3240000" cy="4573644"/>
+          </a:xfrm>
+          <a:prstGeom prst="roundRect">
+            <a:avLst/>
+          </a:prstGeom>
+          <a:solidFill>
+            <a:schemeClr val="bg1"/>
+          </a:solidFill>
+          <a:ln w="38100">
+            <a:solidFill>
+              <a:schemeClr val="tx1"/>
+            </a:solidFill>
+          </a:ln>
+        </p:spPr>
+        <p:style>
+          <a:lnRef idx="2">
+            <a:schemeClr val="accent1">
+              <a:shade val="50000"/>
+            </a:schemeClr>
+          </a:lnRef>
+          <a:fillRef idx="1">
+            <a:schemeClr val="accent1"/>
+          </a:fillRef>
+          <a:effectRef idx="0">
+            <a:schemeClr val="accent1"/>
+          </a:effectRef>
+          <a:fontRef idx="minor">
+            <a:schemeClr val="lt1"/>
+          </a:fontRef>
+        </p:style>
+        <p:txBody>
+          <a:bodyPr rtlCol="0" anchor="ctr"/>
+          <a:lstStyle/>
+          <a:p>
+            <a:pPr algn="ctr"/>
+            <a:endParaRPr lang="en-AU" sz="2400"/>
+          </a:p>
+        </p:txBody>
+      </p:sp>
+      <p:sp>
+        <p:nvSpPr>
+          <p:cNvPr id="173" name="Rounded Rectangle 172">
+            <a:extLst>
+              <a:ext uri="{FF2B5EF4-FFF2-40B4-BE49-F238E27FC236}">
+                <a16:creationId xmlns:a16="http://schemas.microsoft.com/office/drawing/2014/main" id="{D8FADE35-45BC-6544-A89C-4CF58475104A}"/>
+              </a:ext>
+            </a:extLst>
+          </p:cNvPr>
+          <p:cNvSpPr>
+            <a:spLocks noChangeAspect="1"/>
+          </p:cNvSpPr>
+          <p:nvPr/>
+        </p:nvSpPr>
+        <p:spPr>
+          <a:xfrm>
+            <a:off x="3397217" y="8239335"/>
             <a:ext cx="3240000" cy="1576217"/>
           </a:xfrm>
           <a:prstGeom prst="roundRect">
@@ -6604,10 +6758,62 @@
       </p:sp>
       <p:sp>
         <p:nvSpPr>
-          <p:cNvPr id="6" name="Rounded Rectangle 5">
-            <a:extLst>
-              <a:ext uri="{FF2B5EF4-FFF2-40B4-BE49-F238E27FC236}">
-                <a16:creationId xmlns:a16="http://schemas.microsoft.com/office/drawing/2014/main" id="{781AE066-2F6F-CD4A-8C9D-2174A5C270BE}"/>
+          <p:cNvPr id="2" name="Rectangle 1">
+            <a:extLst>
+              <a:ext uri="{FF2B5EF4-FFF2-40B4-BE49-F238E27FC236}">
+                <a16:creationId xmlns:a16="http://schemas.microsoft.com/office/drawing/2014/main" id="{2A4BB3D5-DDB3-0346-BB2C-B5A1CAB77844}"/>
+              </a:ext>
+            </a:extLst>
+          </p:cNvPr>
+          <p:cNvSpPr/>
+          <p:nvPr/>
+        </p:nvSpPr>
+        <p:spPr>
+          <a:xfrm>
+            <a:off x="3370628" y="4175905"/>
+            <a:ext cx="3379648" cy="629703"/>
+          </a:xfrm>
+          <a:prstGeom prst="rect">
+            <a:avLst/>
+          </a:prstGeom>
+          <a:solidFill>
+            <a:schemeClr val="bg1"/>
+          </a:solidFill>
+          <a:ln>
+            <a:noFill/>
+          </a:ln>
+        </p:spPr>
+        <p:style>
+          <a:lnRef idx="2">
+            <a:schemeClr val="accent1">
+              <a:shade val="50000"/>
+            </a:schemeClr>
+          </a:lnRef>
+          <a:fillRef idx="1">
+            <a:schemeClr val="accent1"/>
+          </a:fillRef>
+          <a:effectRef idx="0">
+            <a:schemeClr val="accent1"/>
+          </a:effectRef>
+          <a:fontRef idx="minor">
+            <a:schemeClr val="lt1"/>
+          </a:fontRef>
+        </p:style>
+        <p:txBody>
+          <a:bodyPr rtlCol="0" anchor="ctr"/>
+          <a:lstStyle/>
+          <a:p>
+            <a:pPr algn="ctr"/>
+            <a:endParaRPr lang="en-AU"/>
+          </a:p>
+        </p:txBody>
+      </p:sp>
+      <p:sp>
+        <p:nvSpPr>
+          <p:cNvPr id="5" name="Rounded Rectangle 4">
+            <a:extLst>
+              <a:ext uri="{FF2B5EF4-FFF2-40B4-BE49-F238E27FC236}">
+                <a16:creationId xmlns:a16="http://schemas.microsoft.com/office/drawing/2014/main" id="{3C953649-ED7C-3742-AAEA-8B243B81C427}"/>
               </a:ext>
             </a:extLst>
           </p:cNvPr>
@@ -6618,7 +6824,63 @@
         </p:nvSpPr>
         <p:spPr>
           <a:xfrm>
-            <a:off x="77259" y="520745"/>
+            <a:off x="59477" y="8212648"/>
+            <a:ext cx="3240000" cy="1576217"/>
+          </a:xfrm>
+          <a:prstGeom prst="roundRect">
+            <a:avLst/>
+          </a:prstGeom>
+          <a:solidFill>
+            <a:srgbClr val="00B050"/>
+          </a:solidFill>
+          <a:ln w="38100">
+            <a:solidFill>
+              <a:schemeClr val="tx1"/>
+            </a:solidFill>
+          </a:ln>
+        </p:spPr>
+        <p:style>
+          <a:lnRef idx="2">
+            <a:schemeClr val="accent1">
+              <a:shade val="50000"/>
+            </a:schemeClr>
+          </a:lnRef>
+          <a:fillRef idx="1">
+            <a:schemeClr val="accent1"/>
+          </a:fillRef>
+          <a:effectRef idx="0">
+            <a:schemeClr val="accent1"/>
+          </a:effectRef>
+          <a:fontRef idx="minor">
+            <a:schemeClr val="lt1"/>
+          </a:fontRef>
+        </p:style>
+        <p:txBody>
+          <a:bodyPr rtlCol="0" anchor="ctr"/>
+          <a:lstStyle/>
+          <a:p>
+            <a:pPr algn="ctr"/>
+            <a:endParaRPr lang="en-AU"/>
+          </a:p>
+        </p:txBody>
+      </p:sp>
+      <p:sp>
+        <p:nvSpPr>
+          <p:cNvPr id="6" name="Rounded Rectangle 5">
+            <a:extLst>
+              <a:ext uri="{FF2B5EF4-FFF2-40B4-BE49-F238E27FC236}">
+                <a16:creationId xmlns:a16="http://schemas.microsoft.com/office/drawing/2014/main" id="{781AE066-2F6F-CD4A-8C9D-2174A5C270BE}"/>
+              </a:ext>
+            </a:extLst>
+          </p:cNvPr>
+          <p:cNvSpPr>
+            <a:spLocks noChangeAspect="1"/>
+          </p:cNvSpPr>
+          <p:nvPr/>
+        </p:nvSpPr>
+        <p:spPr>
+          <a:xfrm>
+            <a:off x="77259" y="1025250"/>
             <a:ext cx="3240000" cy="1576217"/>
           </a:xfrm>
           <a:prstGeom prst="roundRect">
@@ -6674,7 +6936,7 @@
         </p:nvSpPr>
         <p:spPr>
           <a:xfrm>
-            <a:off x="79415" y="2096962"/>
+            <a:off x="79415" y="2601467"/>
             <a:ext cx="3240000" cy="5604325"/>
           </a:xfrm>
           <a:prstGeom prst="roundRect">
@@ -6726,7 +6988,7 @@
         </p:nvSpPr>
         <p:spPr>
           <a:xfrm>
-            <a:off x="1261630" y="5722133"/>
+            <a:off x="1261630" y="6226638"/>
             <a:ext cx="922494" cy="849086"/>
           </a:xfrm>
           <a:prstGeom prst="mathMultiply">
@@ -6773,7 +7035,7 @@
         </p:nvSpPr>
         <p:spPr>
           <a:xfrm>
-            <a:off x="1302146" y="3126523"/>
+            <a:off x="1302146" y="3631028"/>
             <a:ext cx="948581" cy="951904"/>
           </a:xfrm>
           <a:prstGeom prst="mathMultiply">
@@ -6820,7 +7082,7 @@
         </p:nvSpPr>
         <p:spPr>
           <a:xfrm>
-            <a:off x="1551195" y="4920210"/>
+            <a:off x="1551195" y="5424715"/>
             <a:ext cx="721268" cy="461665"/>
           </a:xfrm>
           <a:prstGeom prst="rect">
@@ -6861,7 +7123,7 @@
         </p:nvSpPr>
         <p:spPr>
           <a:xfrm>
-            <a:off x="1571439" y="5183511"/>
+            <a:off x="1571439" y="5688016"/>
             <a:ext cx="577693" cy="461665"/>
           </a:xfrm>
           <a:prstGeom prst="rect">
@@ -6902,7 +7164,7 @@
         </p:nvSpPr>
         <p:spPr>
           <a:xfrm>
-            <a:off x="1551195" y="4668079"/>
+            <a:off x="1551195" y="5204116"/>
             <a:ext cx="721268" cy="461665"/>
           </a:xfrm>
           <a:prstGeom prst="rect">
@@ -6943,7 +7205,7 @@
         </p:nvSpPr>
         <p:spPr>
           <a:xfrm>
-            <a:off x="1578031" y="4325329"/>
+            <a:off x="1578031" y="4845600"/>
             <a:ext cx="547204" cy="461665"/>
           </a:xfrm>
           <a:prstGeom prst="rect">
@@ -6984,7 +7246,7 @@
         </p:nvSpPr>
         <p:spPr>
           <a:xfrm>
-            <a:off x="1487793" y="3366023"/>
+            <a:off x="1487793" y="3870528"/>
             <a:ext cx="843406" cy="463885"/>
           </a:xfrm>
           <a:prstGeom prst="rect">
@@ -7025,7 +7287,7 @@
         </p:nvSpPr>
         <p:spPr>
           <a:xfrm>
-            <a:off x="307804" y="2669118"/>
+            <a:off x="307804" y="3173623"/>
             <a:ext cx="762342" cy="461665"/>
           </a:xfrm>
           <a:prstGeom prst="rect">
@@ -7066,7 +7328,7 @@
         </p:nvSpPr>
         <p:spPr>
           <a:xfrm>
-            <a:off x="1149499" y="5360611"/>
+            <a:off x="1149499" y="5865116"/>
             <a:ext cx="721268" cy="461665"/>
           </a:xfrm>
           <a:prstGeom prst="rect">
@@ -7105,7 +7367,7 @@
         </p:nvSpPr>
         <p:spPr>
           <a:xfrm>
-            <a:off x="1118064" y="4924774"/>
+            <a:off x="1196946" y="5381409"/>
             <a:ext cx="721268" cy="461665"/>
           </a:xfrm>
           <a:prstGeom prst="rect">
@@ -7144,7 +7406,7 @@
         </p:nvSpPr>
         <p:spPr>
           <a:xfrm>
-            <a:off x="1017987" y="4528573"/>
+            <a:off x="986455" y="5033078"/>
             <a:ext cx="682864" cy="461665"/>
           </a:xfrm>
           <a:prstGeom prst="rect">
@@ -7183,7 +7445,7 @@
         </p:nvSpPr>
         <p:spPr>
           <a:xfrm>
-            <a:off x="1010996" y="4292175"/>
+            <a:off x="1010996" y="4623254"/>
             <a:ext cx="704537" cy="461665"/>
           </a:xfrm>
           <a:prstGeom prst="rect">
@@ -7222,7 +7484,7 @@
         </p:nvSpPr>
         <p:spPr>
           <a:xfrm>
-            <a:off x="2437813" y="3533870"/>
+            <a:off x="2437813" y="4038375"/>
             <a:ext cx="703537" cy="461665"/>
           </a:xfrm>
           <a:prstGeom prst="rect">
@@ -7261,7 +7523,7 @@
         </p:nvSpPr>
         <p:spPr>
           <a:xfrm>
-            <a:off x="1640550" y="3821721"/>
+            <a:off x="1640550" y="4326226"/>
             <a:ext cx="731983" cy="461665"/>
           </a:xfrm>
           <a:prstGeom prst="rect">
@@ -7300,7 +7562,7 @@
         </p:nvSpPr>
         <p:spPr>
           <a:xfrm>
-            <a:off x="720743" y="2927659"/>
+            <a:off x="720743" y="3432164"/>
             <a:ext cx="948581" cy="461665"/>
           </a:xfrm>
           <a:prstGeom prst="rect">
@@ -7341,7 +7603,7 @@
         </p:nvCxnSpPr>
         <p:spPr>
           <a:xfrm>
-            <a:off x="1206727" y="2425803"/>
+            <a:off x="1206727" y="2930308"/>
             <a:ext cx="985375" cy="0"/>
           </a:xfrm>
           <a:prstGeom prst="line">
@@ -7380,7 +7642,7 @@
         </p:nvSpPr>
         <p:spPr>
           <a:xfrm>
-            <a:off x="866654" y="2446200"/>
+            <a:off x="866654" y="2950705"/>
             <a:ext cx="2600940" cy="461665"/>
           </a:xfrm>
           <a:prstGeom prst="rect">
@@ -7419,7 +7681,7 @@
         </p:nvSpPr>
         <p:spPr>
           <a:xfrm>
-            <a:off x="1478698" y="3713388"/>
+            <a:off x="1478698" y="4217893"/>
             <a:ext cx="180000" cy="180000"/>
           </a:xfrm>
           <a:prstGeom prst="ellipse">
@@ -7470,7 +7732,7 @@
         </p:nvCxnSpPr>
         <p:spPr>
           <a:xfrm>
-            <a:off x="88823" y="6469056"/>
+            <a:off x="88823" y="6973561"/>
             <a:ext cx="3238092" cy="0"/>
           </a:xfrm>
           <a:prstGeom prst="line">
@@ -7514,7 +7776,7 @@
         </p:nvCxnSpPr>
         <p:spPr>
           <a:xfrm flipV="1">
-            <a:off x="85045" y="4191053"/>
+            <a:off x="85045" y="4695558"/>
             <a:ext cx="3240000" cy="0"/>
           </a:xfrm>
           <a:prstGeom prst="line">
@@ -7556,7 +7818,7 @@
         </p:nvSpPr>
         <p:spPr>
           <a:xfrm rot="19454438" flipH="1">
-            <a:off x="3960522" y="2543038"/>
+            <a:off x="3960522" y="3047543"/>
             <a:ext cx="3433966" cy="15317356"/>
           </a:xfrm>
           <a:prstGeom prst="arc">
@@ -7613,7 +7875,7 @@
         </p:nvCxnSpPr>
         <p:spPr>
           <a:xfrm flipH="1">
-            <a:off x="1062536" y="5645176"/>
+            <a:off x="1062536" y="6149681"/>
             <a:ext cx="797750" cy="779536"/>
           </a:xfrm>
           <a:prstGeom prst="straightConnector1">
@@ -7660,8 +7922,8 @@
         </p:nvCxnSpPr>
         <p:spPr>
           <a:xfrm flipH="1" flipV="1">
-            <a:off x="844216" y="5218026"/>
-            <a:ext cx="237145" cy="1023242"/>
+            <a:off x="654562" y="5329377"/>
+            <a:ext cx="352919" cy="1478818"/>
           </a:xfrm>
           <a:prstGeom prst="straightConnector1">
             <a:avLst/>
@@ -7707,7 +7969,7 @@
         </p:nvCxnSpPr>
         <p:spPr>
           <a:xfrm flipV="1">
-            <a:off x="2125235" y="4350198"/>
+            <a:off x="2125235" y="4870469"/>
             <a:ext cx="396997" cy="205964"/>
           </a:xfrm>
           <a:prstGeom prst="straightConnector1">
@@ -7751,8 +8013,8 @@
         </p:nvCxnSpPr>
         <p:spPr>
           <a:xfrm>
-            <a:off x="2697969" y="4863689"/>
-            <a:ext cx="59694" cy="1647504"/>
+            <a:off x="2697969" y="5368194"/>
+            <a:ext cx="74474" cy="1464510"/>
           </a:xfrm>
           <a:prstGeom prst="straightConnector1">
             <a:avLst/>
@@ -7793,7 +8055,7 @@
         </p:nvSpPr>
         <p:spPr>
           <a:xfrm>
-            <a:off x="2765584" y="8721484"/>
+            <a:off x="2765584" y="9225989"/>
             <a:ext cx="404594" cy="461665"/>
           </a:xfrm>
           <a:prstGeom prst="rect">
@@ -7837,7 +8099,7 @@
         </p:nvSpPr>
         <p:spPr>
           <a:xfrm>
-            <a:off x="204104" y="8721484"/>
+            <a:off x="204104" y="9225989"/>
             <a:ext cx="435536" cy="466759"/>
           </a:xfrm>
           <a:prstGeom prst="rect">
@@ -7881,7 +8143,7 @@
         </p:nvSpPr>
         <p:spPr>
           <a:xfrm>
-            <a:off x="639640" y="4756361"/>
+            <a:off x="449986" y="4867712"/>
             <a:ext cx="409152" cy="461665"/>
           </a:xfrm>
           <a:prstGeom prst="rect">
@@ -7925,7 +8187,7 @@
         </p:nvSpPr>
         <p:spPr>
           <a:xfrm>
-            <a:off x="2674832" y="3304892"/>
+            <a:off x="2674832" y="3809397"/>
             <a:ext cx="609575" cy="461665"/>
           </a:xfrm>
           <a:prstGeom prst="rect">
@@ -7966,7 +8228,7 @@
         </p:nvSpPr>
         <p:spPr>
           <a:xfrm>
-            <a:off x="2488493" y="4369673"/>
+            <a:off x="2488493" y="4874178"/>
             <a:ext cx="420691" cy="461665"/>
           </a:xfrm>
           <a:prstGeom prst="rect">
@@ -7998,10 +8260,10 @@
       </p:sp>
       <p:sp>
         <p:nvSpPr>
-          <p:cNvPr id="97" name="TextBox 96">
-            <a:extLst>
-              <a:ext uri="{FF2B5EF4-FFF2-40B4-BE49-F238E27FC236}">
-                <a16:creationId xmlns:a16="http://schemas.microsoft.com/office/drawing/2014/main" id="{A516A99E-F4BB-0E41-9D9B-24E523A4BDCA}"/>
+          <p:cNvPr id="98" name="TextBox 97">
+            <a:extLst>
+              <a:ext uri="{FF2B5EF4-FFF2-40B4-BE49-F238E27FC236}">
+                <a16:creationId xmlns:a16="http://schemas.microsoft.com/office/drawing/2014/main" id="{CD32752A-C6F2-934A-89D9-EC3B29B2B007}"/>
               </a:ext>
             </a:extLst>
           </p:cNvPr>
@@ -8010,46 +8272,7 @@
         </p:nvSpPr>
         <p:spPr>
           <a:xfrm rot="5400000">
-            <a:off x="5868063" y="2819047"/>
-            <a:ext cx="1223757" cy="461665"/>
-          </a:xfrm>
-          <a:prstGeom prst="rect">
-            <a:avLst/>
-          </a:prstGeom>
-          <a:noFill/>
-        </p:spPr>
-        <p:txBody>
-          <a:bodyPr wrap="square" rtlCol="0">
-            <a:spAutoFit/>
-          </a:bodyPr>
-          <a:lstStyle/>
-          <a:p>
-            <a:r>
-              <a:rPr lang="en-AU" sz="2400" dirty="0">
-                <a:solidFill>
-                  <a:srgbClr val="C00000"/>
-                </a:solidFill>
-              </a:rPr>
-              <a:t>Upfield</a:t>
-            </a:r>
-          </a:p>
-        </p:txBody>
-      </p:sp>
-      <p:sp>
-        <p:nvSpPr>
-          <p:cNvPr id="98" name="TextBox 97">
-            <a:extLst>
-              <a:ext uri="{FF2B5EF4-FFF2-40B4-BE49-F238E27FC236}">
-                <a16:creationId xmlns:a16="http://schemas.microsoft.com/office/drawing/2014/main" id="{CD32752A-C6F2-934A-89D9-EC3B29B2B007}"/>
-              </a:ext>
-            </a:extLst>
-          </p:cNvPr>
-          <p:cNvSpPr txBox="1"/>
-          <p:nvPr/>
-        </p:nvSpPr>
-        <p:spPr>
-          <a:xfrm rot="5400000">
-            <a:off x="5698346" y="6586871"/>
+            <a:off x="5718752" y="2226885"/>
             <a:ext cx="1576217" cy="461665"/>
           </a:xfrm>
           <a:prstGeom prst="rect">
@@ -8076,10 +8299,10 @@
       </p:sp>
       <p:cxnSp>
         <p:nvCxnSpPr>
-          <p:cNvPr id="99" name="Straight Connector 98">
-            <a:extLst>
-              <a:ext uri="{FF2B5EF4-FFF2-40B4-BE49-F238E27FC236}">
-                <a16:creationId xmlns:a16="http://schemas.microsoft.com/office/drawing/2014/main" id="{A62AE494-A388-5A4C-8BF9-3746139D669E}"/>
+          <p:cNvPr id="94" name="Straight Arrow Connector 93">
+            <a:extLst>
+              <a:ext uri="{FF2B5EF4-FFF2-40B4-BE49-F238E27FC236}">
+                <a16:creationId xmlns:a16="http://schemas.microsoft.com/office/drawing/2014/main" id="{3B287D34-3D6D-CC4B-B270-1450905D2ADB}"/>
               </a:ext>
             </a:extLst>
           </p:cNvPr>
@@ -8089,96 +8312,8 @@
           <p:nvPr/>
         </p:nvCxnSpPr>
         <p:spPr>
-          <a:xfrm flipV="1">
-            <a:off x="6462954" y="5121894"/>
-            <a:ext cx="0" cy="938269"/>
-          </a:xfrm>
-          <a:prstGeom prst="line">
-            <a:avLst/>
-          </a:prstGeom>
-          <a:ln w="60325">
-            <a:solidFill>
-              <a:srgbClr val="00B050"/>
-            </a:solidFill>
-            <a:headEnd type="stealth" w="lg" len="lg"/>
-          </a:ln>
-        </p:spPr>
-        <p:style>
-          <a:lnRef idx="1">
-            <a:schemeClr val="accent1"/>
-          </a:lnRef>
-          <a:fillRef idx="0">
-            <a:schemeClr val="accent1"/>
-          </a:fillRef>
-          <a:effectRef idx="0">
-            <a:schemeClr val="accent1"/>
-          </a:effectRef>
-          <a:fontRef idx="minor">
-            <a:schemeClr val="tx1"/>
-          </a:fontRef>
-        </p:style>
-      </p:cxnSp>
-      <p:cxnSp>
-        <p:nvCxnSpPr>
-          <p:cNvPr id="123" name="Straight Connector 122">
-            <a:extLst>
-              <a:ext uri="{FF2B5EF4-FFF2-40B4-BE49-F238E27FC236}">
-                <a16:creationId xmlns:a16="http://schemas.microsoft.com/office/drawing/2014/main" id="{5AC45312-D409-B341-8CF8-6DE2A01B6087}"/>
-              </a:ext>
-            </a:extLst>
-          </p:cNvPr>
-          <p:cNvCxnSpPr>
-            <a:cxnSpLocks/>
-          </p:cNvCxnSpPr>
-          <p:nvPr/>
-        </p:nvCxnSpPr>
-        <p:spPr>
-          <a:xfrm>
-            <a:off x="6502172" y="3486566"/>
-            <a:ext cx="0" cy="839561"/>
-          </a:xfrm>
-          <a:prstGeom prst="line">
-            <a:avLst/>
-          </a:prstGeom>
-          <a:ln w="60325">
-            <a:solidFill>
-              <a:srgbClr val="C00000"/>
-            </a:solidFill>
-            <a:headEnd type="stealth" w="lg" len="lg"/>
-          </a:ln>
-        </p:spPr>
-        <p:style>
-          <a:lnRef idx="1">
-            <a:schemeClr val="accent1"/>
-          </a:lnRef>
-          <a:fillRef idx="0">
-            <a:schemeClr val="accent1"/>
-          </a:fillRef>
-          <a:effectRef idx="0">
-            <a:schemeClr val="accent1"/>
-          </a:effectRef>
-          <a:fontRef idx="minor">
-            <a:schemeClr val="tx1"/>
-          </a:fontRef>
-        </p:style>
-      </p:cxnSp>
-      <p:cxnSp>
-        <p:nvCxnSpPr>
-          <p:cNvPr id="94" name="Straight Arrow Connector 93">
-            <a:extLst>
-              <a:ext uri="{FF2B5EF4-FFF2-40B4-BE49-F238E27FC236}">
-                <a16:creationId xmlns:a16="http://schemas.microsoft.com/office/drawing/2014/main" id="{3B287D34-3D6D-CC4B-B270-1450905D2ADB}"/>
-              </a:ext>
-            </a:extLst>
-          </p:cNvPr>
-          <p:cNvCxnSpPr>
-            <a:cxnSpLocks/>
-          </p:cNvCxnSpPr>
-          <p:nvPr/>
-        </p:nvCxnSpPr>
-        <p:spPr>
           <a:xfrm flipH="1" flipV="1">
-            <a:off x="2131087" y="6060163"/>
+            <a:off x="2131087" y="6564668"/>
             <a:ext cx="470011" cy="303048"/>
           </a:xfrm>
           <a:prstGeom prst="straightConnector1">
@@ -8222,7 +8357,7 @@
         </p:nvCxnSpPr>
         <p:spPr>
           <a:xfrm>
-            <a:off x="1977454" y="3702329"/>
+            <a:off x="1977454" y="4206834"/>
             <a:ext cx="592204" cy="573037"/>
           </a:xfrm>
           <a:prstGeom prst="straightConnector1">
@@ -8253,34 +8388,25 @@
       </p:cxnSp>
       <p:sp>
         <p:nvSpPr>
-          <p:cNvPr id="77" name="Rounded Rectangle 76">
-            <a:extLst>
-              <a:ext uri="{FF2B5EF4-FFF2-40B4-BE49-F238E27FC236}">
-                <a16:creationId xmlns:a16="http://schemas.microsoft.com/office/drawing/2014/main" id="{A203BD46-E277-DC4B-898D-255DE305CD08}"/>
-              </a:ext>
-            </a:extLst>
-          </p:cNvPr>
-          <p:cNvSpPr>
-            <a:spLocks noChangeAspect="1"/>
-          </p:cNvSpPr>
-          <p:nvPr/>
-        </p:nvSpPr>
-        <p:spPr>
-          <a:xfrm>
-            <a:off x="3395899" y="7708143"/>
-            <a:ext cx="3240000" cy="1576217"/>
-          </a:xfrm>
-          <a:prstGeom prst="roundRect">
-            <a:avLst/>
-          </a:prstGeom>
-          <a:solidFill>
-            <a:srgbClr val="00B050"/>
-          </a:solidFill>
-          <a:ln w="38100">
-            <a:solidFill>
-              <a:schemeClr val="tx1"/>
-            </a:solidFill>
-          </a:ln>
+          <p:cNvPr id="87" name="Multiply 86">
+            <a:extLst>
+              <a:ext uri="{FF2B5EF4-FFF2-40B4-BE49-F238E27FC236}">
+                <a16:creationId xmlns:a16="http://schemas.microsoft.com/office/drawing/2014/main" id="{99234C1F-4633-CC4B-8E97-8F896EA2F623}"/>
+              </a:ext>
+            </a:extLst>
+          </p:cNvPr>
+          <p:cNvSpPr/>
+          <p:nvPr/>
+        </p:nvSpPr>
+        <p:spPr>
+          <a:xfrm>
+            <a:off x="4584004" y="2931461"/>
+            <a:ext cx="922494" cy="849086"/>
+          </a:xfrm>
+          <a:prstGeom prst="mathMultiply">
+            <a:avLst/>
+          </a:prstGeom>
+          <a:noFill/>
         </p:spPr>
         <p:style>
           <a:lnRef idx="2">
@@ -8303,40 +8429,31 @@
           <a:lstStyle/>
           <a:p>
             <a:pPr algn="ctr"/>
-            <a:endParaRPr lang="en-AU"/>
-          </a:p>
-        </p:txBody>
-      </p:sp>
-      <p:sp>
-        <p:nvSpPr>
-          <p:cNvPr id="84" name="Rounded Rectangle 83">
-            <a:extLst>
-              <a:ext uri="{FF2B5EF4-FFF2-40B4-BE49-F238E27FC236}">
-                <a16:creationId xmlns:a16="http://schemas.microsoft.com/office/drawing/2014/main" id="{A45E27BA-EF0A-7445-8548-54192A6C27E0}"/>
-              </a:ext>
-            </a:extLst>
-          </p:cNvPr>
-          <p:cNvSpPr>
-            <a:spLocks noChangeAspect="1"/>
-          </p:cNvSpPr>
-          <p:nvPr/>
-        </p:nvSpPr>
-        <p:spPr>
-          <a:xfrm>
-            <a:off x="3413681" y="520745"/>
-            <a:ext cx="3240000" cy="1576217"/>
-          </a:xfrm>
-          <a:prstGeom prst="roundRect">
-            <a:avLst/>
-          </a:prstGeom>
-          <a:solidFill>
-            <a:srgbClr val="FF0000"/>
-          </a:solidFill>
-          <a:ln w="38100">
-            <a:solidFill>
-              <a:schemeClr val="tx1"/>
-            </a:solidFill>
-          </a:ln>
+            <a:endParaRPr lang="en-AU" sz="2400"/>
+          </a:p>
+        </p:txBody>
+      </p:sp>
+      <p:sp>
+        <p:nvSpPr>
+          <p:cNvPr id="88" name="Multiply 87">
+            <a:extLst>
+              <a:ext uri="{FF2B5EF4-FFF2-40B4-BE49-F238E27FC236}">
+                <a16:creationId xmlns:a16="http://schemas.microsoft.com/office/drawing/2014/main" id="{45403133-B221-124E-8CA7-8B3672E67FBE}"/>
+              </a:ext>
+            </a:extLst>
+          </p:cNvPr>
+          <p:cNvSpPr/>
+          <p:nvPr/>
+        </p:nvSpPr>
+        <p:spPr>
+          <a:xfrm>
+            <a:off x="4624520" y="335851"/>
+            <a:ext cx="948581" cy="951904"/>
+          </a:xfrm>
+          <a:prstGeom prst="mathMultiply">
+            <a:avLst/>
+          </a:prstGeom>
+          <a:noFill/>
         </p:spPr>
         <p:style>
           <a:lnRef idx="2">
@@ -8359,160 +8476,12 @@
           <a:lstStyle/>
           <a:p>
             <a:pPr algn="ctr"/>
-            <a:endParaRPr lang="en-AU" dirty="0"/>
-          </a:p>
-        </p:txBody>
-      </p:sp>
-      <p:sp>
-        <p:nvSpPr>
-          <p:cNvPr id="85" name="Rounded Rectangle 84">
-            <a:extLst>
-              <a:ext uri="{FF2B5EF4-FFF2-40B4-BE49-F238E27FC236}">
-                <a16:creationId xmlns:a16="http://schemas.microsoft.com/office/drawing/2014/main" id="{034ABB30-A824-7248-A201-177CFC37B0C3}"/>
-              </a:ext>
-            </a:extLst>
-          </p:cNvPr>
-          <p:cNvSpPr>
-            <a:spLocks noChangeAspect="1"/>
-          </p:cNvSpPr>
-          <p:nvPr/>
-        </p:nvSpPr>
-        <p:spPr>
-          <a:xfrm>
-            <a:off x="3415837" y="2096962"/>
-            <a:ext cx="3240000" cy="5604325"/>
-          </a:xfrm>
-          <a:prstGeom prst="roundRect">
-            <a:avLst/>
-          </a:prstGeom>
-          <a:noFill/>
-          <a:ln w="38100">
-            <a:solidFill>
-              <a:schemeClr val="tx1"/>
-            </a:solidFill>
-          </a:ln>
-        </p:spPr>
-        <p:style>
-          <a:lnRef idx="2">
-            <a:schemeClr val="accent1">
-              <a:shade val="50000"/>
-            </a:schemeClr>
-          </a:lnRef>
-          <a:fillRef idx="1">
-            <a:schemeClr val="accent1"/>
-          </a:fillRef>
-          <a:effectRef idx="0">
-            <a:schemeClr val="accent1"/>
-          </a:effectRef>
-          <a:fontRef idx="minor">
-            <a:schemeClr val="lt1"/>
-          </a:fontRef>
-        </p:style>
-        <p:txBody>
-          <a:bodyPr rtlCol="0" anchor="ctr"/>
-          <a:lstStyle/>
-          <a:p>
-            <a:pPr algn="ctr"/>
             <a:endParaRPr lang="en-AU" sz="2400"/>
           </a:p>
         </p:txBody>
       </p:sp>
       <p:sp>
         <p:nvSpPr>
-          <p:cNvPr id="87" name="Multiply 86">
-            <a:extLst>
-              <a:ext uri="{FF2B5EF4-FFF2-40B4-BE49-F238E27FC236}">
-                <a16:creationId xmlns:a16="http://schemas.microsoft.com/office/drawing/2014/main" id="{99234C1F-4633-CC4B-8E97-8F896EA2F623}"/>
-              </a:ext>
-            </a:extLst>
-          </p:cNvPr>
-          <p:cNvSpPr/>
-          <p:nvPr/>
-        </p:nvSpPr>
-        <p:spPr>
-          <a:xfrm>
-            <a:off x="4598052" y="5722133"/>
-            <a:ext cx="922494" cy="849086"/>
-          </a:xfrm>
-          <a:prstGeom prst="mathMultiply">
-            <a:avLst/>
-          </a:prstGeom>
-          <a:noFill/>
-        </p:spPr>
-        <p:style>
-          <a:lnRef idx="2">
-            <a:schemeClr val="accent1">
-              <a:shade val="50000"/>
-            </a:schemeClr>
-          </a:lnRef>
-          <a:fillRef idx="1">
-            <a:schemeClr val="accent1"/>
-          </a:fillRef>
-          <a:effectRef idx="0">
-            <a:schemeClr val="accent1"/>
-          </a:effectRef>
-          <a:fontRef idx="minor">
-            <a:schemeClr val="lt1"/>
-          </a:fontRef>
-        </p:style>
-        <p:txBody>
-          <a:bodyPr rtlCol="0" anchor="ctr"/>
-          <a:lstStyle/>
-          <a:p>
-            <a:pPr algn="ctr"/>
-            <a:endParaRPr lang="en-AU" sz="2400"/>
-          </a:p>
-        </p:txBody>
-      </p:sp>
-      <p:sp>
-        <p:nvSpPr>
-          <p:cNvPr id="88" name="Multiply 87">
-            <a:extLst>
-              <a:ext uri="{FF2B5EF4-FFF2-40B4-BE49-F238E27FC236}">
-                <a16:creationId xmlns:a16="http://schemas.microsoft.com/office/drawing/2014/main" id="{45403133-B221-124E-8CA7-8B3672E67FBE}"/>
-              </a:ext>
-            </a:extLst>
-          </p:cNvPr>
-          <p:cNvSpPr/>
-          <p:nvPr/>
-        </p:nvSpPr>
-        <p:spPr>
-          <a:xfrm>
-            <a:off x="4638568" y="3126523"/>
-            <a:ext cx="948581" cy="951904"/>
-          </a:xfrm>
-          <a:prstGeom prst="mathMultiply">
-            <a:avLst/>
-          </a:prstGeom>
-          <a:noFill/>
-        </p:spPr>
-        <p:style>
-          <a:lnRef idx="2">
-            <a:schemeClr val="accent1">
-              <a:shade val="50000"/>
-            </a:schemeClr>
-          </a:lnRef>
-          <a:fillRef idx="1">
-            <a:schemeClr val="accent1"/>
-          </a:fillRef>
-          <a:effectRef idx="0">
-            <a:schemeClr val="accent1"/>
-          </a:effectRef>
-          <a:fontRef idx="minor">
-            <a:schemeClr val="lt1"/>
-          </a:fontRef>
-        </p:style>
-        <p:txBody>
-          <a:bodyPr rtlCol="0" anchor="ctr"/>
-          <a:lstStyle/>
-          <a:p>
-            <a:pPr algn="ctr"/>
-            <a:endParaRPr lang="en-AU" sz="2400"/>
-          </a:p>
-        </p:txBody>
-      </p:sp>
-      <p:sp>
-        <p:nvSpPr>
           <p:cNvPr id="89" name="TextBox 88">
             <a:extLst>
               <a:ext uri="{FF2B5EF4-FFF2-40B4-BE49-F238E27FC236}">
@@ -8525,7 +8494,7 @@
         </p:nvSpPr>
         <p:spPr>
           <a:xfrm>
-            <a:off x="4887617" y="4920210"/>
+            <a:off x="4873569" y="2129538"/>
             <a:ext cx="721268" cy="461665"/>
           </a:xfrm>
           <a:prstGeom prst="rect">
@@ -8566,7 +8535,7 @@
         </p:nvSpPr>
         <p:spPr>
           <a:xfrm>
-            <a:off x="4937097" y="5342410"/>
+            <a:off x="4010610" y="2111751"/>
             <a:ext cx="577693" cy="461665"/>
           </a:xfrm>
           <a:prstGeom prst="rect">
@@ -8607,7 +8576,7 @@
         </p:nvSpPr>
         <p:spPr>
           <a:xfrm>
-            <a:off x="4887617" y="4668079"/>
+            <a:off x="4815590" y="1718960"/>
             <a:ext cx="721268" cy="461665"/>
           </a:xfrm>
           <a:prstGeom prst="rect">
@@ -8648,7 +8617,7 @@
         </p:nvSpPr>
         <p:spPr>
           <a:xfrm>
-            <a:off x="5335283" y="7194752"/>
+            <a:off x="5841225" y="4073226"/>
             <a:ext cx="547204" cy="461665"/>
           </a:xfrm>
           <a:prstGeom prst="rect">
@@ -8689,7 +8658,7 @@
         </p:nvSpPr>
         <p:spPr>
           <a:xfrm>
-            <a:off x="4824215" y="3366023"/>
+            <a:off x="4810167" y="575351"/>
             <a:ext cx="843406" cy="463885"/>
           </a:xfrm>
           <a:prstGeom prst="rect">
@@ -8718,20 +8687,347 @@
       </p:sp>
       <p:sp>
         <p:nvSpPr>
-          <p:cNvPr id="106" name="TextBox 105">
-            <a:extLst>
-              <a:ext uri="{FF2B5EF4-FFF2-40B4-BE49-F238E27FC236}">
-                <a16:creationId xmlns:a16="http://schemas.microsoft.com/office/drawing/2014/main" id="{8DD5C217-D760-474A-A618-C0BB008DB910}"/>
-              </a:ext>
-            </a:extLst>
-          </p:cNvPr>
-          <p:cNvSpPr txBox="1"/>
-          <p:nvPr/>
-        </p:nvSpPr>
-        <p:spPr>
-          <a:xfrm>
-            <a:off x="3644226" y="2669118"/>
-            <a:ext cx="762342" cy="461665"/>
+          <p:cNvPr id="107" name="TextBox 106">
+            <a:extLst>
+              <a:ext uri="{FF2B5EF4-FFF2-40B4-BE49-F238E27FC236}">
+                <a16:creationId xmlns:a16="http://schemas.microsoft.com/office/drawing/2014/main" id="{C236B1E9-DD84-2E48-9E6D-42517A2D3E5A}"/>
+              </a:ext>
+            </a:extLst>
+          </p:cNvPr>
+          <p:cNvSpPr txBox="1"/>
+          <p:nvPr/>
+        </p:nvSpPr>
+        <p:spPr>
+          <a:xfrm>
+            <a:off x="4094322" y="1872822"/>
+            <a:ext cx="721268" cy="461665"/>
+          </a:xfrm>
+          <a:prstGeom prst="rect">
+            <a:avLst/>
+          </a:prstGeom>
+          <a:noFill/>
+        </p:spPr>
+        <p:txBody>
+          <a:bodyPr wrap="square" rtlCol="0">
+            <a:spAutoFit/>
+          </a:bodyPr>
+          <a:lstStyle/>
+          <a:p>
+            <a:r>
+              <a:rPr lang="en-AU" sz="2400" dirty="0">
+                <a:solidFill>
+                  <a:srgbClr val="0070C0"/>
+                </a:solidFill>
+              </a:rPr>
+              <a:t>D8</a:t>
+            </a:r>
+          </a:p>
+        </p:txBody>
+      </p:sp>
+      <p:sp>
+        <p:nvSpPr>
+          <p:cNvPr id="111" name="TextBox 110">
+            <a:extLst>
+              <a:ext uri="{FF2B5EF4-FFF2-40B4-BE49-F238E27FC236}">
+                <a16:creationId xmlns:a16="http://schemas.microsoft.com/office/drawing/2014/main" id="{AFED50A8-2D2E-E94C-8202-8AE74BE296DA}"/>
+              </a:ext>
+            </a:extLst>
+          </p:cNvPr>
+          <p:cNvSpPr txBox="1"/>
+          <p:nvPr/>
+        </p:nvSpPr>
+        <p:spPr>
+          <a:xfrm>
+            <a:off x="4652651" y="1944767"/>
+            <a:ext cx="721268" cy="461665"/>
+          </a:xfrm>
+          <a:prstGeom prst="rect">
+            <a:avLst/>
+          </a:prstGeom>
+          <a:noFill/>
+        </p:spPr>
+        <p:txBody>
+          <a:bodyPr wrap="square" rtlCol="0">
+            <a:spAutoFit/>
+          </a:bodyPr>
+          <a:lstStyle/>
+          <a:p>
+            <a:r>
+              <a:rPr lang="en-AU" sz="2400" dirty="0">
+                <a:solidFill>
+                  <a:srgbClr val="0070C0"/>
+                </a:solidFill>
+              </a:rPr>
+              <a:t>D9</a:t>
+            </a:r>
+          </a:p>
+        </p:txBody>
+      </p:sp>
+      <p:sp>
+        <p:nvSpPr>
+          <p:cNvPr id="112" name="TextBox 111">
+            <a:extLst>
+              <a:ext uri="{FF2B5EF4-FFF2-40B4-BE49-F238E27FC236}">
+                <a16:creationId xmlns:a16="http://schemas.microsoft.com/office/drawing/2014/main" id="{26814751-F8DB-8340-9A4E-02F138EBE751}"/>
+              </a:ext>
+            </a:extLst>
+          </p:cNvPr>
+          <p:cNvSpPr txBox="1"/>
+          <p:nvPr/>
+        </p:nvSpPr>
+        <p:spPr>
+          <a:xfrm>
+            <a:off x="4621199" y="1501503"/>
+            <a:ext cx="682864" cy="461665"/>
+          </a:xfrm>
+          <a:prstGeom prst="rect">
+            <a:avLst/>
+          </a:prstGeom>
+          <a:noFill/>
+        </p:spPr>
+        <p:txBody>
+          <a:bodyPr wrap="square" rtlCol="0">
+            <a:spAutoFit/>
+          </a:bodyPr>
+          <a:lstStyle/>
+          <a:p>
+            <a:r>
+              <a:rPr lang="en-AU" sz="2400" dirty="0">
+                <a:solidFill>
+                  <a:srgbClr val="0070C0"/>
+                </a:solidFill>
+              </a:rPr>
+              <a:t>D10</a:t>
+            </a:r>
+          </a:p>
+        </p:txBody>
+      </p:sp>
+      <p:sp>
+        <p:nvSpPr>
+          <p:cNvPr id="113" name="TextBox 112">
+            <a:extLst>
+              <a:ext uri="{FF2B5EF4-FFF2-40B4-BE49-F238E27FC236}">
+                <a16:creationId xmlns:a16="http://schemas.microsoft.com/office/drawing/2014/main" id="{97D869DA-A75D-8A48-9251-3301C7B87164}"/>
+              </a:ext>
+            </a:extLst>
+          </p:cNvPr>
+          <p:cNvSpPr txBox="1"/>
+          <p:nvPr/>
+        </p:nvSpPr>
+        <p:spPr>
+          <a:xfrm>
+            <a:off x="4679657" y="3722510"/>
+            <a:ext cx="704537" cy="461665"/>
+          </a:xfrm>
+          <a:prstGeom prst="rect">
+            <a:avLst/>
+          </a:prstGeom>
+          <a:noFill/>
+        </p:spPr>
+        <p:txBody>
+          <a:bodyPr wrap="square" rtlCol="0">
+            <a:spAutoFit/>
+          </a:bodyPr>
+          <a:lstStyle/>
+          <a:p>
+            <a:r>
+              <a:rPr lang="en-AU" sz="2400" dirty="0">
+                <a:solidFill>
+                  <a:srgbClr val="0070C0"/>
+                </a:solidFill>
+              </a:rPr>
+              <a:t>D11</a:t>
+            </a:r>
+          </a:p>
+        </p:txBody>
+      </p:sp>
+      <p:sp>
+        <p:nvSpPr>
+          <p:cNvPr id="118" name="TextBox 117">
+            <a:extLst>
+              <a:ext uri="{FF2B5EF4-FFF2-40B4-BE49-F238E27FC236}">
+                <a16:creationId xmlns:a16="http://schemas.microsoft.com/office/drawing/2014/main" id="{DC992D4E-F746-CA4B-A7AF-5294B3B9E2C5}"/>
+              </a:ext>
+            </a:extLst>
+          </p:cNvPr>
+          <p:cNvSpPr txBox="1"/>
+          <p:nvPr/>
+        </p:nvSpPr>
+        <p:spPr>
+          <a:xfrm>
+            <a:off x="5760187" y="743198"/>
+            <a:ext cx="703537" cy="461665"/>
+          </a:xfrm>
+          <a:prstGeom prst="rect">
+            <a:avLst/>
+          </a:prstGeom>
+          <a:noFill/>
+        </p:spPr>
+        <p:txBody>
+          <a:bodyPr wrap="square" rtlCol="0">
+            <a:spAutoFit/>
+          </a:bodyPr>
+          <a:lstStyle/>
+          <a:p>
+            <a:r>
+              <a:rPr lang="en-AU" sz="2400" dirty="0">
+                <a:solidFill>
+                  <a:srgbClr val="0070C0"/>
+                </a:solidFill>
+              </a:rPr>
+              <a:t>D12</a:t>
+            </a:r>
+          </a:p>
+        </p:txBody>
+      </p:sp>
+      <p:sp>
+        <p:nvSpPr>
+          <p:cNvPr id="119" name="TextBox 118">
+            <a:extLst>
+              <a:ext uri="{FF2B5EF4-FFF2-40B4-BE49-F238E27FC236}">
+                <a16:creationId xmlns:a16="http://schemas.microsoft.com/office/drawing/2014/main" id="{05867D7D-6582-1F44-85D2-C4132D680198}"/>
+              </a:ext>
+            </a:extLst>
+          </p:cNvPr>
+          <p:cNvSpPr txBox="1"/>
+          <p:nvPr/>
+        </p:nvSpPr>
+        <p:spPr>
+          <a:xfrm>
+            <a:off x="4962924" y="1031049"/>
+            <a:ext cx="731983" cy="461665"/>
+          </a:xfrm>
+          <a:prstGeom prst="rect">
+            <a:avLst/>
+          </a:prstGeom>
+          <a:noFill/>
+        </p:spPr>
+        <p:txBody>
+          <a:bodyPr wrap="square" rtlCol="0">
+            <a:spAutoFit/>
+          </a:bodyPr>
+          <a:lstStyle/>
+          <a:p>
+            <a:r>
+              <a:rPr lang="en-AU" sz="2400" dirty="0">
+                <a:solidFill>
+                  <a:srgbClr val="0070C0"/>
+                </a:solidFill>
+              </a:rPr>
+              <a:t>D13</a:t>
+            </a:r>
+          </a:p>
+        </p:txBody>
+      </p:sp>
+      <p:sp>
+        <p:nvSpPr>
+          <p:cNvPr id="129" name="Oval 128">
+            <a:extLst>
+              <a:ext uri="{FF2B5EF4-FFF2-40B4-BE49-F238E27FC236}">
+                <a16:creationId xmlns:a16="http://schemas.microsoft.com/office/drawing/2014/main" id="{D3815397-535E-634E-A20F-FE91D9B715D2}"/>
+              </a:ext>
+            </a:extLst>
+          </p:cNvPr>
+          <p:cNvSpPr/>
+          <p:nvPr/>
+        </p:nvSpPr>
+        <p:spPr>
+          <a:xfrm>
+            <a:off x="4801072" y="922716"/>
+            <a:ext cx="180000" cy="180000"/>
+          </a:xfrm>
+          <a:prstGeom prst="ellipse">
+            <a:avLst/>
+          </a:prstGeom>
+          <a:solidFill>
+            <a:schemeClr val="tx1"/>
+          </a:solidFill>
+        </p:spPr>
+        <p:style>
+          <a:lnRef idx="2">
+            <a:schemeClr val="accent1">
+              <a:shade val="50000"/>
+            </a:schemeClr>
+          </a:lnRef>
+          <a:fillRef idx="1">
+            <a:schemeClr val="accent1"/>
+          </a:fillRef>
+          <a:effectRef idx="0">
+            <a:schemeClr val="accent1"/>
+          </a:effectRef>
+          <a:fontRef idx="minor">
+            <a:schemeClr val="lt1"/>
+          </a:fontRef>
+        </p:style>
+        <p:txBody>
+          <a:bodyPr rtlCol="0" anchor="ctr"/>
+          <a:lstStyle/>
+          <a:p>
+            <a:pPr algn="ctr"/>
+            <a:endParaRPr lang="en-AU" sz="2400"/>
+          </a:p>
+        </p:txBody>
+      </p:sp>
+      <p:cxnSp>
+        <p:nvCxnSpPr>
+          <p:cNvPr id="130" name="Straight Connector 129">
+            <a:extLst>
+              <a:ext uri="{FF2B5EF4-FFF2-40B4-BE49-F238E27FC236}">
+                <a16:creationId xmlns:a16="http://schemas.microsoft.com/office/drawing/2014/main" id="{552CEEE9-ADA4-E148-8349-934E58056053}"/>
+              </a:ext>
+            </a:extLst>
+          </p:cNvPr>
+          <p:cNvCxnSpPr>
+            <a:cxnSpLocks/>
+          </p:cNvCxnSpPr>
+          <p:nvPr/>
+        </p:nvCxnSpPr>
+        <p:spPr>
+          <a:xfrm>
+            <a:off x="3411197" y="3678384"/>
+            <a:ext cx="3238092" cy="0"/>
+          </a:xfrm>
+          <a:prstGeom prst="line">
+            <a:avLst/>
+          </a:prstGeom>
+          <a:ln w="38100">
+            <a:solidFill>
+              <a:srgbClr val="FF0000"/>
+            </a:solidFill>
+            <a:prstDash val="sysDash"/>
+          </a:ln>
+        </p:spPr>
+        <p:style>
+          <a:lnRef idx="1">
+            <a:schemeClr val="accent1"/>
+          </a:lnRef>
+          <a:fillRef idx="0">
+            <a:schemeClr val="accent1"/>
+          </a:fillRef>
+          <a:effectRef idx="0">
+            <a:schemeClr val="accent1"/>
+          </a:effectRef>
+          <a:fontRef idx="minor">
+            <a:schemeClr val="tx1"/>
+          </a:fontRef>
+        </p:style>
+      </p:cxnSp>
+      <p:sp>
+        <p:nvSpPr>
+          <p:cNvPr id="139" name="TextBox 138">
+            <a:extLst>
+              <a:ext uri="{FF2B5EF4-FFF2-40B4-BE49-F238E27FC236}">
+                <a16:creationId xmlns:a16="http://schemas.microsoft.com/office/drawing/2014/main" id="{2264E570-3673-2440-8CFD-D3B23F887920}"/>
+              </a:ext>
+            </a:extLst>
+          </p:cNvPr>
+          <p:cNvSpPr txBox="1"/>
+          <p:nvPr/>
+        </p:nvSpPr>
+        <p:spPr>
+          <a:xfrm>
+            <a:off x="5997206" y="514220"/>
+            <a:ext cx="609575" cy="461665"/>
           </a:xfrm>
           <a:prstGeom prst="rect">
             <a:avLst/>
@@ -8752,105 +9048,115 @@
                   </a:schemeClr>
                 </a:solidFill>
               </a:rPr>
-              <a:t>O7</a:t>
-            </a:r>
-          </a:p>
-        </p:txBody>
-      </p:sp>
-      <p:sp>
-        <p:nvSpPr>
-          <p:cNvPr id="107" name="TextBox 106">
-            <a:extLst>
-              <a:ext uri="{FF2B5EF4-FFF2-40B4-BE49-F238E27FC236}">
-                <a16:creationId xmlns:a16="http://schemas.microsoft.com/office/drawing/2014/main" id="{C236B1E9-DD84-2E48-9E6D-42517A2D3E5A}"/>
-              </a:ext>
-            </a:extLst>
-          </p:cNvPr>
-          <p:cNvSpPr txBox="1"/>
-          <p:nvPr/>
-        </p:nvSpPr>
-        <p:spPr>
-          <a:xfrm>
-            <a:off x="4710569" y="5121803"/>
-            <a:ext cx="721268" cy="461665"/>
-          </a:xfrm>
-          <a:prstGeom prst="rect">
-            <a:avLst/>
-          </a:prstGeom>
-          <a:noFill/>
-        </p:spPr>
-        <p:txBody>
-          <a:bodyPr wrap="square" rtlCol="0">
-            <a:spAutoFit/>
-          </a:bodyPr>
-          <a:lstStyle/>
-          <a:p>
+              <a:t>O5</a:t>
+            </a:r>
+          </a:p>
+        </p:txBody>
+      </p:sp>
+      <p:sp>
+        <p:nvSpPr>
+          <p:cNvPr id="140" name="TextBox 139">
+            <a:extLst>
+              <a:ext uri="{FF2B5EF4-FFF2-40B4-BE49-F238E27FC236}">
+                <a16:creationId xmlns:a16="http://schemas.microsoft.com/office/drawing/2014/main" id="{66B09938-01A1-2D4A-945F-2C7606F541AB}"/>
+              </a:ext>
+            </a:extLst>
+          </p:cNvPr>
+          <p:cNvSpPr txBox="1"/>
+          <p:nvPr/>
+        </p:nvSpPr>
+        <p:spPr>
+          <a:xfrm>
+            <a:off x="5810867" y="1579001"/>
+            <a:ext cx="420691" cy="461665"/>
+          </a:xfrm>
+          <a:prstGeom prst="rect">
+            <a:avLst/>
+          </a:prstGeom>
+          <a:solidFill>
+            <a:schemeClr val="bg1">
+              <a:lumMod val="50000"/>
+            </a:schemeClr>
+          </a:solidFill>
+        </p:spPr>
+        <p:txBody>
+          <a:bodyPr wrap="square" rtlCol="0">
+            <a:spAutoFit/>
+          </a:bodyPr>
+          <a:lstStyle/>
+          <a:p>
+            <a:pPr algn="ctr"/>
             <a:r>
               <a:rPr lang="en-AU" sz="2400" dirty="0">
                 <a:solidFill>
-                  <a:srgbClr val="0070C0"/>
+                  <a:schemeClr val="bg1"/>
                 </a:solidFill>
               </a:rPr>
-              <a:t>D8</a:t>
-            </a:r>
-          </a:p>
-        </p:txBody>
-      </p:sp>
-      <p:sp>
-        <p:nvSpPr>
-          <p:cNvPr id="111" name="TextBox 110">
-            <a:extLst>
-              <a:ext uri="{FF2B5EF4-FFF2-40B4-BE49-F238E27FC236}">
-                <a16:creationId xmlns:a16="http://schemas.microsoft.com/office/drawing/2014/main" id="{AFED50A8-2D2E-E94C-8202-8AE74BE296DA}"/>
-              </a:ext>
-            </a:extLst>
-          </p:cNvPr>
-          <p:cNvSpPr txBox="1"/>
-          <p:nvPr/>
-        </p:nvSpPr>
-        <p:spPr>
-          <a:xfrm>
-            <a:off x="4585537" y="4800094"/>
-            <a:ext cx="721268" cy="461665"/>
-          </a:xfrm>
-          <a:prstGeom prst="rect">
-            <a:avLst/>
-          </a:prstGeom>
-          <a:noFill/>
-        </p:spPr>
-        <p:txBody>
-          <a:bodyPr wrap="square" rtlCol="0">
-            <a:spAutoFit/>
-          </a:bodyPr>
-          <a:lstStyle/>
-          <a:p>
+              <a:t>D</a:t>
+            </a:r>
+          </a:p>
+        </p:txBody>
+      </p:sp>
+      <p:sp>
+        <p:nvSpPr>
+          <p:cNvPr id="245" name="TextBox 244">
+            <a:extLst>
+              <a:ext uri="{FF2B5EF4-FFF2-40B4-BE49-F238E27FC236}">
+                <a16:creationId xmlns:a16="http://schemas.microsoft.com/office/drawing/2014/main" id="{478A620B-7BAA-C145-9119-3323DA6768E8}"/>
+              </a:ext>
+            </a:extLst>
+          </p:cNvPr>
+          <p:cNvSpPr txBox="1"/>
+          <p:nvPr/>
+        </p:nvSpPr>
+        <p:spPr>
+          <a:xfrm>
+            <a:off x="3913990" y="1488223"/>
+            <a:ext cx="409152" cy="461665"/>
+          </a:xfrm>
+          <a:prstGeom prst="rect">
+            <a:avLst/>
+          </a:prstGeom>
+          <a:solidFill>
+            <a:schemeClr val="bg1">
+              <a:lumMod val="50000"/>
+            </a:schemeClr>
+          </a:solidFill>
+        </p:spPr>
+        <p:txBody>
+          <a:bodyPr wrap="square" rtlCol="0">
+            <a:spAutoFit/>
+          </a:bodyPr>
+          <a:lstStyle/>
+          <a:p>
+            <a:pPr algn="ctr"/>
             <a:r>
               <a:rPr lang="en-AU" sz="2400" dirty="0">
                 <a:solidFill>
-                  <a:srgbClr val="0070C0"/>
+                  <a:schemeClr val="bg1"/>
                 </a:solidFill>
               </a:rPr>
-              <a:t>D9</a:t>
-            </a:r>
-          </a:p>
-        </p:txBody>
-      </p:sp>
-      <p:sp>
-        <p:nvSpPr>
-          <p:cNvPr id="112" name="TextBox 111">
-            <a:extLst>
-              <a:ext uri="{FF2B5EF4-FFF2-40B4-BE49-F238E27FC236}">
-                <a16:creationId xmlns:a16="http://schemas.microsoft.com/office/drawing/2014/main" id="{26814751-F8DB-8340-9A4E-02F138EBE751}"/>
-              </a:ext>
-            </a:extLst>
-          </p:cNvPr>
-          <p:cNvSpPr txBox="1"/>
-          <p:nvPr/>
-        </p:nvSpPr>
-        <p:spPr>
-          <a:xfrm>
-            <a:off x="4505123" y="4482078"/>
-            <a:ext cx="682864" cy="461665"/>
+              <a:t>C</a:t>
+            </a:r>
+          </a:p>
+        </p:txBody>
+      </p:sp>
+      <p:sp>
+        <p:nvSpPr>
+          <p:cNvPr id="117" name="TextBox 116">
+            <a:extLst>
+              <a:ext uri="{FF2B5EF4-FFF2-40B4-BE49-F238E27FC236}">
+                <a16:creationId xmlns:a16="http://schemas.microsoft.com/office/drawing/2014/main" id="{8001F9B2-8B6D-6E4B-9C99-5B1E53775115}"/>
+              </a:ext>
+            </a:extLst>
+          </p:cNvPr>
+          <p:cNvSpPr txBox="1"/>
+          <p:nvPr/>
+        </p:nvSpPr>
+        <p:spPr>
+          <a:xfrm rot="5400000">
+            <a:off x="3010052" y="890113"/>
+            <a:ext cx="1223757" cy="461665"/>
           </a:xfrm>
           <a:prstGeom prst="rect">
             <a:avLst/>
@@ -8866,30 +9172,30 @@
             <a:r>
               <a:rPr lang="en-AU" sz="2400" dirty="0">
                 <a:solidFill>
-                  <a:srgbClr val="0070C0"/>
+                  <a:srgbClr val="C00000"/>
                 </a:solidFill>
               </a:rPr>
-              <a:t>D10</a:t>
-            </a:r>
-          </a:p>
-        </p:txBody>
-      </p:sp>
-      <p:sp>
-        <p:nvSpPr>
-          <p:cNvPr id="113" name="TextBox 112">
-            <a:extLst>
-              <a:ext uri="{FF2B5EF4-FFF2-40B4-BE49-F238E27FC236}">
-                <a16:creationId xmlns:a16="http://schemas.microsoft.com/office/drawing/2014/main" id="{97D869DA-A75D-8A48-9251-3301C7B87164}"/>
-              </a:ext>
-            </a:extLst>
-          </p:cNvPr>
-          <p:cNvSpPr txBox="1"/>
-          <p:nvPr/>
-        </p:nvSpPr>
-        <p:spPr>
-          <a:xfrm>
-            <a:off x="4710569" y="6956501"/>
-            <a:ext cx="704537" cy="461665"/>
+              <a:t>Upfield</a:t>
+            </a:r>
+          </a:p>
+        </p:txBody>
+      </p:sp>
+      <p:sp>
+        <p:nvSpPr>
+          <p:cNvPr id="120" name="TextBox 119">
+            <a:extLst>
+              <a:ext uri="{FF2B5EF4-FFF2-40B4-BE49-F238E27FC236}">
+                <a16:creationId xmlns:a16="http://schemas.microsoft.com/office/drawing/2014/main" id="{81FD8950-DD7F-6549-8787-8AD5A58D46FE}"/>
+              </a:ext>
+            </a:extLst>
+          </p:cNvPr>
+          <p:cNvSpPr txBox="1"/>
+          <p:nvPr/>
+        </p:nvSpPr>
+        <p:spPr>
+          <a:xfrm rot="5400000">
+            <a:off x="5733875" y="6161802"/>
+            <a:ext cx="1576217" cy="461665"/>
           </a:xfrm>
           <a:prstGeom prst="rect">
             <a:avLst/>
@@ -8905,137 +9211,20 @@
             <a:r>
               <a:rPr lang="en-AU" sz="2400" dirty="0">
                 <a:solidFill>
-                  <a:srgbClr val="0070C0"/>
+                  <a:schemeClr val="accent6"/>
                 </a:solidFill>
               </a:rPr>
-              <a:t>D11</a:t>
-            </a:r>
-          </a:p>
-        </p:txBody>
-      </p:sp>
-      <p:sp>
-        <p:nvSpPr>
-          <p:cNvPr id="118" name="TextBox 117">
-            <a:extLst>
-              <a:ext uri="{FF2B5EF4-FFF2-40B4-BE49-F238E27FC236}">
-                <a16:creationId xmlns:a16="http://schemas.microsoft.com/office/drawing/2014/main" id="{DC992D4E-F746-CA4B-A7AF-5294B3B9E2C5}"/>
-              </a:ext>
-            </a:extLst>
-          </p:cNvPr>
-          <p:cNvSpPr txBox="1"/>
-          <p:nvPr/>
-        </p:nvSpPr>
-        <p:spPr>
-          <a:xfrm>
-            <a:off x="5774235" y="3533870"/>
-            <a:ext cx="703537" cy="461665"/>
-          </a:xfrm>
-          <a:prstGeom prst="rect">
-            <a:avLst/>
-          </a:prstGeom>
-          <a:noFill/>
-        </p:spPr>
-        <p:txBody>
-          <a:bodyPr wrap="square" rtlCol="0">
-            <a:spAutoFit/>
-          </a:bodyPr>
-          <a:lstStyle/>
-          <a:p>
-            <a:r>
-              <a:rPr lang="en-AU" sz="2400" dirty="0">
-                <a:solidFill>
-                  <a:srgbClr val="0070C0"/>
-                </a:solidFill>
-              </a:rPr>
-              <a:t>D12</a:t>
-            </a:r>
-          </a:p>
-        </p:txBody>
-      </p:sp>
-      <p:sp>
-        <p:nvSpPr>
-          <p:cNvPr id="119" name="TextBox 118">
-            <a:extLst>
-              <a:ext uri="{FF2B5EF4-FFF2-40B4-BE49-F238E27FC236}">
-                <a16:creationId xmlns:a16="http://schemas.microsoft.com/office/drawing/2014/main" id="{05867D7D-6582-1F44-85D2-C4132D680198}"/>
-              </a:ext>
-            </a:extLst>
-          </p:cNvPr>
-          <p:cNvSpPr txBox="1"/>
-          <p:nvPr/>
-        </p:nvSpPr>
-        <p:spPr>
-          <a:xfrm>
-            <a:off x="4976972" y="3821721"/>
-            <a:ext cx="731983" cy="461665"/>
-          </a:xfrm>
-          <a:prstGeom prst="rect">
-            <a:avLst/>
-          </a:prstGeom>
-          <a:noFill/>
-        </p:spPr>
-        <p:txBody>
-          <a:bodyPr wrap="square" rtlCol="0">
-            <a:spAutoFit/>
-          </a:bodyPr>
-          <a:lstStyle/>
-          <a:p>
-            <a:r>
-              <a:rPr lang="en-AU" sz="2400" dirty="0">
-                <a:solidFill>
-                  <a:srgbClr val="0070C0"/>
-                </a:solidFill>
-              </a:rPr>
-              <a:t>D13</a:t>
-            </a:r>
-          </a:p>
-        </p:txBody>
-      </p:sp>
-      <p:sp>
-        <p:nvSpPr>
-          <p:cNvPr id="124" name="TextBox 123">
-            <a:extLst>
-              <a:ext uri="{FF2B5EF4-FFF2-40B4-BE49-F238E27FC236}">
-                <a16:creationId xmlns:a16="http://schemas.microsoft.com/office/drawing/2014/main" id="{2AC9E2E1-D02D-C445-B6FC-306C8416C29C}"/>
-              </a:ext>
-            </a:extLst>
-          </p:cNvPr>
-          <p:cNvSpPr txBox="1"/>
-          <p:nvPr/>
-        </p:nvSpPr>
-        <p:spPr>
-          <a:xfrm>
-            <a:off x="4057165" y="2927659"/>
-            <a:ext cx="948581" cy="461665"/>
-          </a:xfrm>
-          <a:prstGeom prst="rect">
-            <a:avLst/>
-          </a:prstGeom>
-          <a:noFill/>
-        </p:spPr>
-        <p:txBody>
-          <a:bodyPr wrap="square" rtlCol="0">
-            <a:spAutoFit/>
-          </a:bodyPr>
-          <a:lstStyle/>
-          <a:p>
-            <a:r>
-              <a:rPr lang="en-AU" sz="2400" dirty="0">
-                <a:solidFill>
-                  <a:srgbClr val="0070C0"/>
-                </a:solidFill>
-              </a:rPr>
-              <a:t>D14</a:t>
+              <a:t>Downfield</a:t>
             </a:r>
           </a:p>
         </p:txBody>
       </p:sp>
       <p:cxnSp>
         <p:nvCxnSpPr>
-          <p:cNvPr id="127" name="Straight Connector 126">
-            <a:extLst>
-              <a:ext uri="{FF2B5EF4-FFF2-40B4-BE49-F238E27FC236}">
-                <a16:creationId xmlns:a16="http://schemas.microsoft.com/office/drawing/2014/main" id="{E0AEEAF1-0558-1248-A6C9-43000B989F71}"/>
+          <p:cNvPr id="122" name="Straight Connector 121">
+            <a:extLst>
+              <a:ext uri="{FF2B5EF4-FFF2-40B4-BE49-F238E27FC236}">
+                <a16:creationId xmlns:a16="http://schemas.microsoft.com/office/drawing/2014/main" id="{18FC94DC-96A4-0E42-A5FB-D85AFB8AD98A}"/>
               </a:ext>
             </a:extLst>
           </p:cNvPr>
@@ -9046,13 +9235,16 @@
         </p:nvCxnSpPr>
         <p:spPr>
           <a:xfrm>
-            <a:off x="4543149" y="2425803"/>
-            <a:ext cx="985375" cy="0"/>
+            <a:off x="3601688" y="1640439"/>
+            <a:ext cx="0" cy="839561"/>
           </a:xfrm>
           <a:prstGeom prst="line">
             <a:avLst/>
           </a:prstGeom>
           <a:ln w="60325">
+            <a:solidFill>
+              <a:srgbClr val="C00000"/>
+            </a:solidFill>
             <a:headEnd type="stealth" w="lg" len="lg"/>
           </a:ln>
         </p:spPr>
@@ -9073,49 +9265,10 @@
       </p:cxnSp>
       <p:sp>
         <p:nvSpPr>
-          <p:cNvPr id="128" name="TextBox 127">
-            <a:extLst>
-              <a:ext uri="{FF2B5EF4-FFF2-40B4-BE49-F238E27FC236}">
-                <a16:creationId xmlns:a16="http://schemas.microsoft.com/office/drawing/2014/main" id="{68BDFC10-A055-C644-B796-0C4188E08B34}"/>
-              </a:ext>
-            </a:extLst>
-          </p:cNvPr>
-          <p:cNvSpPr txBox="1"/>
-          <p:nvPr/>
-        </p:nvSpPr>
-        <p:spPr>
-          <a:xfrm>
-            <a:off x="4203076" y="2446200"/>
-            <a:ext cx="2600940" cy="461665"/>
-          </a:xfrm>
-          <a:prstGeom prst="rect">
-            <a:avLst/>
-          </a:prstGeom>
-          <a:noFill/>
-        </p:spPr>
-        <p:txBody>
-          <a:bodyPr wrap="square" rtlCol="0">
-            <a:spAutoFit/>
-          </a:bodyPr>
-          <a:lstStyle/>
-          <a:p>
-            <a:r>
-              <a:rPr lang="en-AU" sz="2400" dirty="0">
-                <a:solidFill>
-                  <a:srgbClr val="0070C0"/>
-                </a:solidFill>
-              </a:rPr>
-              <a:t>Forehand (R) force</a:t>
-            </a:r>
-          </a:p>
-        </p:txBody>
-      </p:sp>
-      <p:sp>
-        <p:nvSpPr>
-          <p:cNvPr id="129" name="Oval 128">
-            <a:extLst>
-              <a:ext uri="{FF2B5EF4-FFF2-40B4-BE49-F238E27FC236}">
-                <a16:creationId xmlns:a16="http://schemas.microsoft.com/office/drawing/2014/main" id="{D3815397-535E-634E-A20F-FE91D9B715D2}"/>
+          <p:cNvPr id="127" name="Multiply 126">
+            <a:extLst>
+              <a:ext uri="{FF2B5EF4-FFF2-40B4-BE49-F238E27FC236}">
+                <a16:creationId xmlns:a16="http://schemas.microsoft.com/office/drawing/2014/main" id="{7C7D288F-74B9-9D4E-9DD1-454987E706B7}"/>
               </a:ext>
             </a:extLst>
           </p:cNvPr>
@@ -9124,15 +9277,13 @@
         </p:nvSpPr>
         <p:spPr>
           <a:xfrm>
-            <a:off x="4815120" y="3713388"/>
-            <a:ext cx="180000" cy="180000"/>
-          </a:xfrm>
-          <a:prstGeom prst="ellipse">
-            <a:avLst/>
-          </a:prstGeom>
-          <a:solidFill>
-            <a:schemeClr val="tx1"/>
-          </a:solidFill>
+            <a:off x="4594510" y="6284359"/>
+            <a:ext cx="922494" cy="849086"/>
+          </a:xfrm>
+          <a:prstGeom prst="mathMultiply">
+            <a:avLst/>
+          </a:prstGeom>
+          <a:noFill/>
         </p:spPr>
         <p:style>
           <a:lnRef idx="2">
@@ -9159,12 +9310,291 @@
           </a:p>
         </p:txBody>
       </p:sp>
+      <p:sp>
+        <p:nvSpPr>
+          <p:cNvPr id="132" name="TextBox 131">
+            <a:extLst>
+              <a:ext uri="{FF2B5EF4-FFF2-40B4-BE49-F238E27FC236}">
+                <a16:creationId xmlns:a16="http://schemas.microsoft.com/office/drawing/2014/main" id="{BCB152F7-AB8E-2341-9682-8023483B5D72}"/>
+              </a:ext>
+            </a:extLst>
+          </p:cNvPr>
+          <p:cNvSpPr txBox="1"/>
+          <p:nvPr/>
+        </p:nvSpPr>
+        <p:spPr>
+          <a:xfrm>
+            <a:off x="4789479" y="6459910"/>
+            <a:ext cx="721268" cy="461665"/>
+          </a:xfrm>
+          <a:prstGeom prst="rect">
+            <a:avLst/>
+          </a:prstGeom>
+          <a:noFill/>
+        </p:spPr>
+        <p:txBody>
+          <a:bodyPr wrap="square" rtlCol="0">
+            <a:spAutoFit/>
+          </a:bodyPr>
+          <a:lstStyle/>
+          <a:p>
+            <a:r>
+              <a:rPr lang="en-AU" sz="2400" dirty="0">
+                <a:solidFill>
+                  <a:schemeClr val="bg1">
+                    <a:lumMod val="50000"/>
+                  </a:schemeClr>
+                </a:solidFill>
+              </a:rPr>
+              <a:t>O2</a:t>
+            </a:r>
+          </a:p>
+        </p:txBody>
+      </p:sp>
+      <p:sp>
+        <p:nvSpPr>
+          <p:cNvPr id="134" name="TextBox 133">
+            <a:extLst>
+              <a:ext uri="{FF2B5EF4-FFF2-40B4-BE49-F238E27FC236}">
+                <a16:creationId xmlns:a16="http://schemas.microsoft.com/office/drawing/2014/main" id="{925313A8-7E29-0840-A164-4357613857BD}"/>
+              </a:ext>
+            </a:extLst>
+          </p:cNvPr>
+          <p:cNvSpPr txBox="1"/>
+          <p:nvPr/>
+        </p:nvSpPr>
+        <p:spPr>
+          <a:xfrm>
+            <a:off x="4794564" y="6049332"/>
+            <a:ext cx="721268" cy="461665"/>
+          </a:xfrm>
+          <a:prstGeom prst="rect">
+            <a:avLst/>
+          </a:prstGeom>
+          <a:noFill/>
+        </p:spPr>
+        <p:txBody>
+          <a:bodyPr wrap="square" rtlCol="0">
+            <a:spAutoFit/>
+          </a:bodyPr>
+          <a:lstStyle/>
+          <a:p>
+            <a:r>
+              <a:rPr lang="en-AU" sz="2400" dirty="0">
+                <a:solidFill>
+                  <a:schemeClr val="bg1">
+                    <a:lumMod val="50000"/>
+                  </a:schemeClr>
+                </a:solidFill>
+              </a:rPr>
+              <a:t>O3</a:t>
+            </a:r>
+          </a:p>
+        </p:txBody>
+      </p:sp>
+      <p:sp>
+        <p:nvSpPr>
+          <p:cNvPr id="135" name="TextBox 134">
+            <a:extLst>
+              <a:ext uri="{FF2B5EF4-FFF2-40B4-BE49-F238E27FC236}">
+                <a16:creationId xmlns:a16="http://schemas.microsoft.com/office/drawing/2014/main" id="{D975B4B0-AC2A-444F-949A-4BA8EEC71E19}"/>
+              </a:ext>
+            </a:extLst>
+          </p:cNvPr>
+          <p:cNvSpPr txBox="1"/>
+          <p:nvPr/>
+        </p:nvSpPr>
+        <p:spPr>
+          <a:xfrm>
+            <a:off x="5821373" y="7393845"/>
+            <a:ext cx="559396" cy="461665"/>
+          </a:xfrm>
+          <a:prstGeom prst="rect">
+            <a:avLst/>
+          </a:prstGeom>
+          <a:solidFill>
+            <a:schemeClr val="tx1"/>
+          </a:solidFill>
+        </p:spPr>
+        <p:txBody>
+          <a:bodyPr wrap="square" rtlCol="0">
+            <a:spAutoFit/>
+          </a:bodyPr>
+          <a:lstStyle/>
+          <a:p>
+            <a:r>
+              <a:rPr lang="en-AU" sz="2400" dirty="0">
+                <a:solidFill>
+                  <a:schemeClr val="bg1"/>
+                </a:solidFill>
+              </a:rPr>
+              <a:t>O4</a:t>
+            </a:r>
+          </a:p>
+        </p:txBody>
+      </p:sp>
+      <p:sp>
+        <p:nvSpPr>
+          <p:cNvPr id="142" name="TextBox 141">
+            <a:extLst>
+              <a:ext uri="{FF2B5EF4-FFF2-40B4-BE49-F238E27FC236}">
+                <a16:creationId xmlns:a16="http://schemas.microsoft.com/office/drawing/2014/main" id="{548B1AFB-3F62-E944-B541-C02A97B516F4}"/>
+              </a:ext>
+            </a:extLst>
+          </p:cNvPr>
+          <p:cNvSpPr txBox="1"/>
+          <p:nvPr/>
+        </p:nvSpPr>
+        <p:spPr>
+          <a:xfrm>
+            <a:off x="4151872" y="5208393"/>
+            <a:ext cx="721268" cy="461665"/>
+          </a:xfrm>
+          <a:prstGeom prst="rect">
+            <a:avLst/>
+          </a:prstGeom>
+          <a:noFill/>
+        </p:spPr>
+        <p:txBody>
+          <a:bodyPr wrap="square" rtlCol="0">
+            <a:spAutoFit/>
+          </a:bodyPr>
+          <a:lstStyle/>
+          <a:p>
+            <a:r>
+              <a:rPr lang="en-AU" sz="2400" dirty="0">
+                <a:solidFill>
+                  <a:srgbClr val="0070C0"/>
+                </a:solidFill>
+              </a:rPr>
+              <a:t>D8</a:t>
+            </a:r>
+          </a:p>
+        </p:txBody>
+      </p:sp>
+      <p:sp>
+        <p:nvSpPr>
+          <p:cNvPr id="143" name="TextBox 142">
+            <a:extLst>
+              <a:ext uri="{FF2B5EF4-FFF2-40B4-BE49-F238E27FC236}">
+                <a16:creationId xmlns:a16="http://schemas.microsoft.com/office/drawing/2014/main" id="{6DFDC295-0765-0247-B490-BC4F47BAD822}"/>
+              </a:ext>
+            </a:extLst>
+          </p:cNvPr>
+          <p:cNvSpPr txBox="1"/>
+          <p:nvPr/>
+        </p:nvSpPr>
+        <p:spPr>
+          <a:xfrm>
+            <a:off x="4363917" y="6479978"/>
+            <a:ext cx="721268" cy="461665"/>
+          </a:xfrm>
+          <a:prstGeom prst="rect">
+            <a:avLst/>
+          </a:prstGeom>
+          <a:noFill/>
+        </p:spPr>
+        <p:txBody>
+          <a:bodyPr wrap="square" rtlCol="0">
+            <a:spAutoFit/>
+          </a:bodyPr>
+          <a:lstStyle/>
+          <a:p>
+            <a:r>
+              <a:rPr lang="en-AU" sz="2400" dirty="0">
+                <a:solidFill>
+                  <a:srgbClr val="0070C0"/>
+                </a:solidFill>
+              </a:rPr>
+              <a:t>D9</a:t>
+            </a:r>
+          </a:p>
+        </p:txBody>
+      </p:sp>
+      <p:sp>
+        <p:nvSpPr>
+          <p:cNvPr id="144" name="TextBox 143">
+            <a:extLst>
+              <a:ext uri="{FF2B5EF4-FFF2-40B4-BE49-F238E27FC236}">
+                <a16:creationId xmlns:a16="http://schemas.microsoft.com/office/drawing/2014/main" id="{4FD8DB6F-4375-934F-96C0-8C508015A771}"/>
+              </a:ext>
+            </a:extLst>
+          </p:cNvPr>
+          <p:cNvSpPr txBox="1"/>
+          <p:nvPr/>
+        </p:nvSpPr>
+        <p:spPr>
+          <a:xfrm>
+            <a:off x="4381451" y="5880731"/>
+            <a:ext cx="682864" cy="461665"/>
+          </a:xfrm>
+          <a:prstGeom prst="rect">
+            <a:avLst/>
+          </a:prstGeom>
+          <a:noFill/>
+        </p:spPr>
+        <p:txBody>
+          <a:bodyPr wrap="square" rtlCol="0">
+            <a:spAutoFit/>
+          </a:bodyPr>
+          <a:lstStyle/>
+          <a:p>
+            <a:r>
+              <a:rPr lang="en-AU" sz="2400" dirty="0">
+                <a:solidFill>
+                  <a:srgbClr val="0070C0"/>
+                </a:solidFill>
+              </a:rPr>
+              <a:t>D10</a:t>
+            </a:r>
+          </a:p>
+        </p:txBody>
+      </p:sp>
+      <p:sp>
+        <p:nvSpPr>
+          <p:cNvPr id="145" name="TextBox 144">
+            <a:extLst>
+              <a:ext uri="{FF2B5EF4-FFF2-40B4-BE49-F238E27FC236}">
+                <a16:creationId xmlns:a16="http://schemas.microsoft.com/office/drawing/2014/main" id="{D1747304-FE4E-794B-A555-C2E8FBCE7F15}"/>
+              </a:ext>
+            </a:extLst>
+          </p:cNvPr>
+          <p:cNvSpPr txBox="1"/>
+          <p:nvPr/>
+        </p:nvSpPr>
+        <p:spPr>
+          <a:xfrm>
+            <a:off x="5242765" y="7189180"/>
+            <a:ext cx="704537" cy="461665"/>
+          </a:xfrm>
+          <a:prstGeom prst="rect">
+            <a:avLst/>
+          </a:prstGeom>
+          <a:noFill/>
+        </p:spPr>
+        <p:txBody>
+          <a:bodyPr wrap="square" rtlCol="0">
+            <a:spAutoFit/>
+          </a:bodyPr>
+          <a:lstStyle/>
+          <a:p>
+            <a:r>
+              <a:rPr lang="en-AU" sz="2400" dirty="0">
+                <a:solidFill>
+                  <a:srgbClr val="0070C0"/>
+                </a:solidFill>
+              </a:rPr>
+              <a:t>D11</a:t>
+            </a:r>
+          </a:p>
+        </p:txBody>
+      </p:sp>
       <p:cxnSp>
         <p:nvCxnSpPr>
-          <p:cNvPr id="130" name="Straight Connector 129">
-            <a:extLst>
-              <a:ext uri="{FF2B5EF4-FFF2-40B4-BE49-F238E27FC236}">
-                <a16:creationId xmlns:a16="http://schemas.microsoft.com/office/drawing/2014/main" id="{552CEEE9-ADA4-E148-8349-934E58056053}"/>
+          <p:cNvPr id="150" name="Straight Connector 149">
+            <a:extLst>
+              <a:ext uri="{FF2B5EF4-FFF2-40B4-BE49-F238E27FC236}">
+                <a16:creationId xmlns:a16="http://schemas.microsoft.com/office/drawing/2014/main" id="{9A0C7A03-062F-844C-A133-B7E570A9A0D0}"/>
               </a:ext>
             </a:extLst>
           </p:cNvPr>
@@ -9175,7 +9605,7 @@
         </p:nvCxnSpPr>
         <p:spPr>
           <a:xfrm>
-            <a:off x="3425245" y="6469056"/>
+            <a:off x="3421703" y="7031282"/>
             <a:ext cx="3238092" cy="0"/>
           </a:xfrm>
           <a:prstGeom prst="line">
@@ -9183,9 +9613,183 @@
           </a:prstGeom>
           <a:ln w="38100">
             <a:solidFill>
-              <a:srgbClr val="FF0000"/>
+              <a:schemeClr val="bg1">
+                <a:lumMod val="50000"/>
+              </a:schemeClr>
             </a:solidFill>
             <a:prstDash val="sysDash"/>
+          </a:ln>
+        </p:spPr>
+        <p:style>
+          <a:lnRef idx="1">
+            <a:schemeClr val="accent1"/>
+          </a:lnRef>
+          <a:fillRef idx="0">
+            <a:schemeClr val="accent1"/>
+          </a:fillRef>
+          <a:effectRef idx="0">
+            <a:schemeClr val="accent1"/>
+          </a:effectRef>
+          <a:fontRef idx="minor">
+            <a:schemeClr val="tx1"/>
+          </a:fontRef>
+        </p:style>
+      </p:cxnSp>
+      <p:sp>
+        <p:nvSpPr>
+          <p:cNvPr id="155" name="TextBox 154">
+            <a:extLst>
+              <a:ext uri="{FF2B5EF4-FFF2-40B4-BE49-F238E27FC236}">
+                <a16:creationId xmlns:a16="http://schemas.microsoft.com/office/drawing/2014/main" id="{A2666C20-00C3-C54F-91D4-B712B15F7B20}"/>
+              </a:ext>
+            </a:extLst>
+          </p:cNvPr>
+          <p:cNvSpPr txBox="1"/>
+          <p:nvPr/>
+        </p:nvSpPr>
+        <p:spPr>
+          <a:xfrm>
+            <a:off x="5821373" y="4931899"/>
+            <a:ext cx="420691" cy="461665"/>
+          </a:xfrm>
+          <a:prstGeom prst="rect">
+            <a:avLst/>
+          </a:prstGeom>
+          <a:solidFill>
+            <a:schemeClr val="bg1">
+              <a:lumMod val="50000"/>
+            </a:schemeClr>
+          </a:solidFill>
+        </p:spPr>
+        <p:txBody>
+          <a:bodyPr wrap="square" rtlCol="0">
+            <a:spAutoFit/>
+          </a:bodyPr>
+          <a:lstStyle/>
+          <a:p>
+            <a:pPr algn="ctr"/>
+            <a:r>
+              <a:rPr lang="en-AU" sz="2400" dirty="0">
+                <a:solidFill>
+                  <a:schemeClr val="bg1"/>
+                </a:solidFill>
+              </a:rPr>
+              <a:t>D</a:t>
+            </a:r>
+          </a:p>
+        </p:txBody>
+      </p:sp>
+      <p:sp>
+        <p:nvSpPr>
+          <p:cNvPr id="133" name="TextBox 132">
+            <a:extLst>
+              <a:ext uri="{FF2B5EF4-FFF2-40B4-BE49-F238E27FC236}">
+                <a16:creationId xmlns:a16="http://schemas.microsoft.com/office/drawing/2014/main" id="{7FDD81F1-A2EB-CD41-83C9-9CA4DC2E0094}"/>
+              </a:ext>
+            </a:extLst>
+          </p:cNvPr>
+          <p:cNvSpPr txBox="1"/>
+          <p:nvPr/>
+        </p:nvSpPr>
+        <p:spPr>
+          <a:xfrm>
+            <a:off x="4186441" y="4865551"/>
+            <a:ext cx="577693" cy="461665"/>
+          </a:xfrm>
+          <a:prstGeom prst="rect">
+            <a:avLst/>
+          </a:prstGeom>
+          <a:noFill/>
+        </p:spPr>
+        <p:txBody>
+          <a:bodyPr wrap="square" rtlCol="0">
+            <a:spAutoFit/>
+          </a:bodyPr>
+          <a:lstStyle/>
+          <a:p>
+            <a:r>
+              <a:rPr lang="en-AU" sz="2400" dirty="0"/>
+              <a:t>O1</a:t>
+            </a:r>
+          </a:p>
+        </p:txBody>
+      </p:sp>
+      <p:sp>
+        <p:nvSpPr>
+          <p:cNvPr id="157" name="Oval 156">
+            <a:extLst>
+              <a:ext uri="{FF2B5EF4-FFF2-40B4-BE49-F238E27FC236}">
+                <a16:creationId xmlns:a16="http://schemas.microsoft.com/office/drawing/2014/main" id="{87C82AB8-0EEF-A042-9E8B-CFFF0C8F973E}"/>
+              </a:ext>
+            </a:extLst>
+          </p:cNvPr>
+          <p:cNvSpPr/>
+          <p:nvPr/>
+        </p:nvSpPr>
+        <p:spPr>
+          <a:xfrm>
+            <a:off x="4081644" y="5157867"/>
+            <a:ext cx="180000" cy="180000"/>
+          </a:xfrm>
+          <a:prstGeom prst="ellipse">
+            <a:avLst/>
+          </a:prstGeom>
+          <a:solidFill>
+            <a:schemeClr val="tx1"/>
+          </a:solidFill>
+        </p:spPr>
+        <p:style>
+          <a:lnRef idx="2">
+            <a:schemeClr val="accent1">
+              <a:shade val="50000"/>
+            </a:schemeClr>
+          </a:lnRef>
+          <a:fillRef idx="1">
+            <a:schemeClr val="accent1"/>
+          </a:fillRef>
+          <a:effectRef idx="0">
+            <a:schemeClr val="accent1"/>
+          </a:effectRef>
+          <a:fontRef idx="minor">
+            <a:schemeClr val="lt1"/>
+          </a:fontRef>
+        </p:style>
+        <p:txBody>
+          <a:bodyPr rtlCol="0" anchor="ctr"/>
+          <a:lstStyle/>
+          <a:p>
+            <a:pPr algn="ctr"/>
+            <a:endParaRPr lang="en-AU" sz="2400"/>
+          </a:p>
+        </p:txBody>
+      </p:sp>
+      <p:cxnSp>
+        <p:nvCxnSpPr>
+          <p:cNvPr id="159" name="Straight Connector 158">
+            <a:extLst>
+              <a:ext uri="{FF2B5EF4-FFF2-40B4-BE49-F238E27FC236}">
+                <a16:creationId xmlns:a16="http://schemas.microsoft.com/office/drawing/2014/main" id="{B35B9B9E-8B32-5848-BFC1-66177CC66A38}"/>
+              </a:ext>
+            </a:extLst>
+          </p:cNvPr>
+          <p:cNvCxnSpPr>
+            <a:cxnSpLocks/>
+          </p:cNvCxnSpPr>
+          <p:nvPr/>
+        </p:nvCxnSpPr>
+        <p:spPr>
+          <a:xfrm flipV="1">
+            <a:off x="6502088" y="3214146"/>
+            <a:ext cx="0" cy="938269"/>
+          </a:xfrm>
+          <a:prstGeom prst="line">
+            <a:avLst/>
+          </a:prstGeom>
+          <a:ln w="60325">
+            <a:solidFill>
+              <a:srgbClr val="00B050"/>
+            </a:solidFill>
+            <a:headEnd type="stealth" w="lg" len="lg"/>
           </a:ln>
         </p:spPr>
         <p:style>
@@ -9205,10 +9809,10 @@
       </p:cxnSp>
       <p:cxnSp>
         <p:nvCxnSpPr>
-          <p:cNvPr id="131" name="Straight Connector 130">
-            <a:extLst>
-              <a:ext uri="{FF2B5EF4-FFF2-40B4-BE49-F238E27FC236}">
-                <a16:creationId xmlns:a16="http://schemas.microsoft.com/office/drawing/2014/main" id="{D9860886-8271-FE4D-A9A4-01E58654BE02}"/>
+          <p:cNvPr id="160" name="Straight Connector 159">
+            <a:extLst>
+              <a:ext uri="{FF2B5EF4-FFF2-40B4-BE49-F238E27FC236}">
+                <a16:creationId xmlns:a16="http://schemas.microsoft.com/office/drawing/2014/main" id="{5152E201-996A-A149-BCEB-69399F4D94EC}"/>
               </a:ext>
             </a:extLst>
           </p:cNvPr>
@@ -9218,8 +9822,143 @@
           <p:nvPr/>
         </p:nvCxnSpPr>
         <p:spPr>
+          <a:xfrm>
+            <a:off x="3429000" y="7897418"/>
+            <a:ext cx="3238092" cy="0"/>
+          </a:xfrm>
+          <a:prstGeom prst="line">
+            <a:avLst/>
+          </a:prstGeom>
+          <a:ln w="38100">
+            <a:solidFill>
+              <a:srgbClr val="FF0000"/>
+            </a:solidFill>
+            <a:prstDash val="sysDash"/>
+          </a:ln>
+        </p:spPr>
+        <p:style>
+          <a:lnRef idx="1">
+            <a:schemeClr val="accent1"/>
+          </a:lnRef>
+          <a:fillRef idx="0">
+            <a:schemeClr val="accent1"/>
+          </a:fillRef>
+          <a:effectRef idx="0">
+            <a:schemeClr val="accent1"/>
+          </a:effectRef>
+          <a:fontRef idx="minor">
+            <a:schemeClr val="tx1"/>
+          </a:fontRef>
+        </p:style>
+      </p:cxnSp>
+      <p:cxnSp>
+        <p:nvCxnSpPr>
+          <p:cNvPr id="164" name="Straight Arrow Connector 163">
+            <a:extLst>
+              <a:ext uri="{FF2B5EF4-FFF2-40B4-BE49-F238E27FC236}">
+                <a16:creationId xmlns:a16="http://schemas.microsoft.com/office/drawing/2014/main" id="{7BACD311-6404-A34E-A9B4-CB8BBB172AF2}"/>
+              </a:ext>
+            </a:extLst>
+          </p:cNvPr>
+          <p:cNvCxnSpPr>
+            <a:cxnSpLocks/>
+          </p:cNvCxnSpPr>
+          <p:nvPr/>
+        </p:nvCxnSpPr>
+        <p:spPr>
+          <a:xfrm flipH="1" flipV="1">
+            <a:off x="4371804" y="2485013"/>
+            <a:ext cx="237145" cy="1023242"/>
+          </a:xfrm>
+          <a:prstGeom prst="straightConnector1">
+            <a:avLst/>
+          </a:prstGeom>
+          <a:ln w="60325">
+            <a:solidFill>
+              <a:schemeClr val="bg1">
+                <a:lumMod val="50000"/>
+              </a:schemeClr>
+            </a:solidFill>
+            <a:tailEnd type="triangle"/>
+          </a:ln>
+        </p:spPr>
+        <p:style>
+          <a:lnRef idx="1">
+            <a:schemeClr val="accent1"/>
+          </a:lnRef>
+          <a:fillRef idx="0">
+            <a:schemeClr val="accent1"/>
+          </a:fillRef>
+          <a:effectRef idx="0">
+            <a:schemeClr val="accent1"/>
+          </a:effectRef>
+          <a:fontRef idx="minor">
+            <a:schemeClr val="tx1"/>
+          </a:fontRef>
+        </p:style>
+      </p:cxnSp>
+      <p:cxnSp>
+        <p:nvCxnSpPr>
+          <p:cNvPr id="165" name="Straight Arrow Connector 164">
+            <a:extLst>
+              <a:ext uri="{FF2B5EF4-FFF2-40B4-BE49-F238E27FC236}">
+                <a16:creationId xmlns:a16="http://schemas.microsoft.com/office/drawing/2014/main" id="{AD09C825-238F-8846-A43A-8E62F14FF7F4}"/>
+              </a:ext>
+            </a:extLst>
+          </p:cNvPr>
+          <p:cNvCxnSpPr>
+            <a:cxnSpLocks/>
+            <a:endCxn id="103" idx="0"/>
+          </p:cNvCxnSpPr>
+          <p:nvPr/>
+        </p:nvCxnSpPr>
+        <p:spPr>
+          <a:xfrm>
+            <a:off x="6005616" y="2052523"/>
+            <a:ext cx="109211" cy="2020703"/>
+          </a:xfrm>
+          <a:prstGeom prst="straightConnector1">
+            <a:avLst/>
+          </a:prstGeom>
+          <a:ln w="60325">
+            <a:solidFill>
+              <a:schemeClr val="tx1"/>
+            </a:solidFill>
+            <a:tailEnd type="triangle"/>
+          </a:ln>
+        </p:spPr>
+        <p:style>
+          <a:lnRef idx="1">
+            <a:schemeClr val="accent1"/>
+          </a:lnRef>
+          <a:fillRef idx="0">
+            <a:schemeClr val="accent1"/>
+          </a:fillRef>
+          <a:effectRef idx="0">
+            <a:schemeClr val="accent1"/>
+          </a:effectRef>
+          <a:fontRef idx="minor">
+            <a:schemeClr val="tx1"/>
+          </a:fontRef>
+        </p:style>
+      </p:cxnSp>
+      <p:cxnSp>
+        <p:nvCxnSpPr>
+          <p:cNvPr id="167" name="Straight Connector 166">
+            <a:extLst>
+              <a:ext uri="{FF2B5EF4-FFF2-40B4-BE49-F238E27FC236}">
+                <a16:creationId xmlns:a16="http://schemas.microsoft.com/office/drawing/2014/main" id="{9B1E8433-ED59-0F43-B95E-247FCE15B81F}"/>
+              </a:ext>
+            </a:extLst>
+          </p:cNvPr>
+          <p:cNvCxnSpPr>
+            <a:cxnSpLocks/>
+          </p:cNvCxnSpPr>
+          <p:nvPr/>
+        </p:nvCxnSpPr>
+        <p:spPr>
           <a:xfrm flipV="1">
-            <a:off x="3421467" y="4191053"/>
+            <a:off x="3407435" y="5670058"/>
             <a:ext cx="3240000" cy="0"/>
           </a:xfrm>
           <a:prstGeom prst="line">
@@ -9249,19 +9988,199 @@
       </p:cxnSp>
       <p:sp>
         <p:nvSpPr>
-          <p:cNvPr id="136" name="TextBox 135">
-            <a:extLst>
-              <a:ext uri="{FF2B5EF4-FFF2-40B4-BE49-F238E27FC236}">
-                <a16:creationId xmlns:a16="http://schemas.microsoft.com/office/drawing/2014/main" id="{ABFF93B2-2B29-C94B-AC7B-40F0B65C7691}"/>
-              </a:ext>
-            </a:extLst>
-          </p:cNvPr>
-          <p:cNvSpPr txBox="1"/>
-          <p:nvPr/>
-        </p:nvSpPr>
-        <p:spPr>
-          <a:xfrm>
-            <a:off x="6102006" y="8721484"/>
+          <p:cNvPr id="169" name="TextBox 168">
+            <a:extLst>
+              <a:ext uri="{FF2B5EF4-FFF2-40B4-BE49-F238E27FC236}">
+                <a16:creationId xmlns:a16="http://schemas.microsoft.com/office/drawing/2014/main" id="{025EFF6E-3C11-DC41-ADFC-D04F648909AC}"/>
+              </a:ext>
+            </a:extLst>
+          </p:cNvPr>
+          <p:cNvSpPr txBox="1"/>
+          <p:nvPr/>
+        </p:nvSpPr>
+        <p:spPr>
+          <a:xfrm>
+            <a:off x="3956389" y="5788960"/>
+            <a:ext cx="504912" cy="461665"/>
+          </a:xfrm>
+          <a:prstGeom prst="rect">
+            <a:avLst/>
+          </a:prstGeom>
+          <a:solidFill>
+            <a:schemeClr val="bg1">
+              <a:lumMod val="50000"/>
+            </a:schemeClr>
+          </a:solidFill>
+        </p:spPr>
+        <p:txBody>
+          <a:bodyPr wrap="square" rtlCol="0">
+            <a:spAutoFit/>
+          </a:bodyPr>
+          <a:lstStyle/>
+          <a:p>
+            <a:pPr algn="ctr"/>
+            <a:r>
+              <a:rPr lang="en-AU" sz="2400" dirty="0">
+                <a:solidFill>
+                  <a:schemeClr val="bg1"/>
+                </a:solidFill>
+              </a:rPr>
+              <a:t>C’</a:t>
+            </a:r>
+          </a:p>
+        </p:txBody>
+      </p:sp>
+      <p:cxnSp>
+        <p:nvCxnSpPr>
+          <p:cNvPr id="170" name="Straight Arrow Connector 169">
+            <a:extLst>
+              <a:ext uri="{FF2B5EF4-FFF2-40B4-BE49-F238E27FC236}">
+                <a16:creationId xmlns:a16="http://schemas.microsoft.com/office/drawing/2014/main" id="{D60A9FA3-0062-D048-86EB-D9E0B109A650}"/>
+              </a:ext>
+            </a:extLst>
+          </p:cNvPr>
+          <p:cNvCxnSpPr>
+            <a:cxnSpLocks/>
+          </p:cNvCxnSpPr>
+          <p:nvPr/>
+        </p:nvCxnSpPr>
+        <p:spPr>
+          <a:xfrm>
+            <a:off x="6015025" y="5406479"/>
+            <a:ext cx="216533" cy="2004742"/>
+          </a:xfrm>
+          <a:prstGeom prst="straightConnector1">
+            <a:avLst/>
+          </a:prstGeom>
+          <a:ln w="60325">
+            <a:solidFill>
+              <a:schemeClr val="tx1"/>
+            </a:solidFill>
+            <a:tailEnd type="triangle"/>
+          </a:ln>
+        </p:spPr>
+        <p:style>
+          <a:lnRef idx="1">
+            <a:schemeClr val="accent1"/>
+          </a:lnRef>
+          <a:fillRef idx="0">
+            <a:schemeClr val="accent1"/>
+          </a:fillRef>
+          <a:effectRef idx="0">
+            <a:schemeClr val="accent1"/>
+          </a:effectRef>
+          <a:fontRef idx="minor">
+            <a:schemeClr val="tx1"/>
+          </a:fontRef>
+        </p:style>
+      </p:cxnSp>
+      <p:cxnSp>
+        <p:nvCxnSpPr>
+          <p:cNvPr id="171" name="Straight Arrow Connector 170">
+            <a:extLst>
+              <a:ext uri="{FF2B5EF4-FFF2-40B4-BE49-F238E27FC236}">
+                <a16:creationId xmlns:a16="http://schemas.microsoft.com/office/drawing/2014/main" id="{29BD59F7-30DC-1F40-B10A-05A845C17259}"/>
+              </a:ext>
+            </a:extLst>
+          </p:cNvPr>
+          <p:cNvCxnSpPr>
+            <a:cxnSpLocks/>
+          </p:cNvCxnSpPr>
+          <p:nvPr/>
+        </p:nvCxnSpPr>
+        <p:spPr>
+          <a:xfrm flipH="1">
+            <a:off x="4916172" y="6870728"/>
+            <a:ext cx="158097" cy="866869"/>
+          </a:xfrm>
+          <a:prstGeom prst="straightConnector1">
+            <a:avLst/>
+          </a:prstGeom>
+          <a:ln w="60325">
+            <a:solidFill>
+              <a:schemeClr val="bg1">
+                <a:lumMod val="50000"/>
+              </a:schemeClr>
+            </a:solidFill>
+            <a:tailEnd type="triangle"/>
+          </a:ln>
+        </p:spPr>
+        <p:style>
+          <a:lnRef idx="1">
+            <a:schemeClr val="accent1"/>
+          </a:lnRef>
+          <a:fillRef idx="0">
+            <a:schemeClr val="accent1"/>
+          </a:fillRef>
+          <a:effectRef idx="0">
+            <a:schemeClr val="accent1"/>
+          </a:effectRef>
+          <a:fontRef idx="minor">
+            <a:schemeClr val="tx1"/>
+          </a:fontRef>
+        </p:style>
+      </p:cxnSp>
+      <p:cxnSp>
+        <p:nvCxnSpPr>
+          <p:cNvPr id="172" name="Straight Arrow Connector 171">
+            <a:extLst>
+              <a:ext uri="{FF2B5EF4-FFF2-40B4-BE49-F238E27FC236}">
+                <a16:creationId xmlns:a16="http://schemas.microsoft.com/office/drawing/2014/main" id="{95205DBF-DE91-CF48-A08E-D99E1096BDD9}"/>
+              </a:ext>
+            </a:extLst>
+          </p:cNvPr>
+          <p:cNvCxnSpPr>
+            <a:cxnSpLocks/>
+          </p:cNvCxnSpPr>
+          <p:nvPr/>
+        </p:nvCxnSpPr>
+        <p:spPr>
+          <a:xfrm flipH="1" flipV="1">
+            <a:off x="4201620" y="6300706"/>
+            <a:ext cx="636418" cy="1343781"/>
+          </a:xfrm>
+          <a:prstGeom prst="straightConnector1">
+            <a:avLst/>
+          </a:prstGeom>
+          <a:ln w="60325">
+            <a:solidFill>
+              <a:schemeClr val="bg1">
+                <a:lumMod val="50000"/>
+              </a:schemeClr>
+            </a:solidFill>
+            <a:tailEnd type="triangle"/>
+          </a:ln>
+        </p:spPr>
+        <p:style>
+          <a:lnRef idx="1">
+            <a:schemeClr val="accent1"/>
+          </a:lnRef>
+          <a:fillRef idx="0">
+            <a:schemeClr val="accent1"/>
+          </a:fillRef>
+          <a:effectRef idx="0">
+            <a:schemeClr val="accent1"/>
+          </a:effectRef>
+          <a:fontRef idx="minor">
+            <a:schemeClr val="tx1"/>
+          </a:fontRef>
+        </p:style>
+      </p:cxnSp>
+      <p:sp>
+        <p:nvSpPr>
+          <p:cNvPr id="174" name="TextBox 173">
+            <a:extLst>
+              <a:ext uri="{FF2B5EF4-FFF2-40B4-BE49-F238E27FC236}">
+                <a16:creationId xmlns:a16="http://schemas.microsoft.com/office/drawing/2014/main" id="{D82529ED-264E-854F-A093-DAA8CC865A5B}"/>
+              </a:ext>
+            </a:extLst>
+          </p:cNvPr>
+          <p:cNvSpPr txBox="1"/>
+          <p:nvPr/>
+        </p:nvSpPr>
+        <p:spPr>
+          <a:xfrm>
+            <a:off x="6093756" y="9301098"/>
             <a:ext cx="404594" cy="461665"/>
           </a:xfrm>
           <a:prstGeom prst="rect">
@@ -9293,19 +10212,19 @@
       </p:sp>
       <p:sp>
         <p:nvSpPr>
-          <p:cNvPr id="137" name="TextBox 136">
-            <a:extLst>
-              <a:ext uri="{FF2B5EF4-FFF2-40B4-BE49-F238E27FC236}">
-                <a16:creationId xmlns:a16="http://schemas.microsoft.com/office/drawing/2014/main" id="{C24C2439-25DF-8642-B5C5-C2A303BCE190}"/>
-              </a:ext>
-            </a:extLst>
-          </p:cNvPr>
-          <p:cNvSpPr txBox="1"/>
-          <p:nvPr/>
-        </p:nvSpPr>
-        <p:spPr>
-          <a:xfrm>
-            <a:off x="3540526" y="8721484"/>
+          <p:cNvPr id="175" name="TextBox 174">
+            <a:extLst>
+              <a:ext uri="{FF2B5EF4-FFF2-40B4-BE49-F238E27FC236}">
+                <a16:creationId xmlns:a16="http://schemas.microsoft.com/office/drawing/2014/main" id="{D1117AFB-D57E-7E45-A77B-607CB2A0DCFF}"/>
+              </a:ext>
+            </a:extLst>
+          </p:cNvPr>
+          <p:cNvSpPr txBox="1"/>
+          <p:nvPr/>
+        </p:nvSpPr>
+        <p:spPr>
+          <a:xfrm>
+            <a:off x="3532276" y="9301098"/>
             <a:ext cx="435536" cy="466759"/>
           </a:xfrm>
           <a:prstGeom prst="rect">
@@ -9337,133 +10256,102 @@
       </p:sp>
       <p:sp>
         <p:nvSpPr>
-          <p:cNvPr id="139" name="TextBox 138">
-            <a:extLst>
-              <a:ext uri="{FF2B5EF4-FFF2-40B4-BE49-F238E27FC236}">
-                <a16:creationId xmlns:a16="http://schemas.microsoft.com/office/drawing/2014/main" id="{2264E570-3673-2440-8CFD-D3B23F887920}"/>
-              </a:ext>
-            </a:extLst>
-          </p:cNvPr>
-          <p:cNvSpPr txBox="1"/>
-          <p:nvPr/>
-        </p:nvSpPr>
-        <p:spPr>
-          <a:xfrm>
-            <a:off x="6011254" y="3304892"/>
-            <a:ext cx="609575" cy="461665"/>
-          </a:xfrm>
-          <a:prstGeom prst="rect">
-            <a:avLst/>
-          </a:prstGeom>
-          <a:noFill/>
-        </p:spPr>
-        <p:txBody>
-          <a:bodyPr wrap="square" rtlCol="0">
-            <a:spAutoFit/>
-          </a:bodyPr>
-          <a:lstStyle/>
-          <a:p>
-            <a:r>
-              <a:rPr lang="en-AU" sz="2400" dirty="0">
-                <a:solidFill>
-                  <a:schemeClr val="bg1">
-                    <a:lumMod val="50000"/>
-                  </a:schemeClr>
-                </a:solidFill>
-              </a:rPr>
-              <a:t>O5</a:t>
-            </a:r>
-          </a:p>
-        </p:txBody>
-      </p:sp>
-      <p:sp>
-        <p:nvSpPr>
-          <p:cNvPr id="140" name="TextBox 139">
-            <a:extLst>
-              <a:ext uri="{FF2B5EF4-FFF2-40B4-BE49-F238E27FC236}">
-                <a16:creationId xmlns:a16="http://schemas.microsoft.com/office/drawing/2014/main" id="{66B09938-01A1-2D4A-945F-2C7606F541AB}"/>
-              </a:ext>
-            </a:extLst>
-          </p:cNvPr>
-          <p:cNvSpPr txBox="1"/>
-          <p:nvPr/>
-        </p:nvSpPr>
-        <p:spPr>
-          <a:xfrm>
-            <a:off x="5824915" y="4369673"/>
-            <a:ext cx="420691" cy="461665"/>
-          </a:xfrm>
-          <a:prstGeom prst="rect">
-            <a:avLst/>
-          </a:prstGeom>
-          <a:solidFill>
-            <a:schemeClr val="bg1">
-              <a:lumMod val="50000"/>
-            </a:schemeClr>
-          </a:solidFill>
-        </p:spPr>
-        <p:txBody>
-          <a:bodyPr wrap="square" rtlCol="0">
-            <a:spAutoFit/>
-          </a:bodyPr>
+          <p:cNvPr id="176" name="Arc 175">
+            <a:extLst>
+              <a:ext uri="{FF2B5EF4-FFF2-40B4-BE49-F238E27FC236}">
+                <a16:creationId xmlns:a16="http://schemas.microsoft.com/office/drawing/2014/main" id="{27461B36-1900-AF43-879D-13D0A68E175A}"/>
+              </a:ext>
+            </a:extLst>
+          </p:cNvPr>
+          <p:cNvSpPr/>
+          <p:nvPr/>
+        </p:nvSpPr>
+        <p:spPr>
+          <a:xfrm rot="18845810" flipH="1">
+            <a:off x="7144964" y="3521288"/>
+            <a:ext cx="2592389" cy="12687250"/>
+          </a:xfrm>
+          <a:prstGeom prst="arc">
+            <a:avLst>
+              <a:gd name="adj1" fmla="val 16131872"/>
+              <a:gd name="adj2" fmla="val 17895821"/>
+            </a:avLst>
+          </a:prstGeom>
+          <a:ln w="82550">
+            <a:solidFill>
+              <a:schemeClr val="tx1"/>
+            </a:solidFill>
+            <a:prstDash val="sysDot"/>
+            <a:tailEnd type="stealth"/>
+          </a:ln>
+        </p:spPr>
+        <p:style>
+          <a:lnRef idx="1">
+            <a:schemeClr val="accent1"/>
+          </a:lnRef>
+          <a:fillRef idx="0">
+            <a:schemeClr val="accent1"/>
+          </a:fillRef>
+          <a:effectRef idx="0">
+            <a:schemeClr val="accent1"/>
+          </a:effectRef>
+          <a:fontRef idx="minor">
+            <a:schemeClr val="tx1"/>
+          </a:fontRef>
+        </p:style>
+        <p:txBody>
+          <a:bodyPr rtlCol="0" anchor="ctr"/>
           <a:lstStyle/>
           <a:p>
             <a:pPr algn="ctr"/>
-            <a:r>
-              <a:rPr lang="en-AU" sz="2400" dirty="0">
-                <a:solidFill>
-                  <a:schemeClr val="bg1"/>
-                </a:solidFill>
-              </a:rPr>
-              <a:t>D</a:t>
-            </a:r>
-          </a:p>
-        </p:txBody>
-      </p:sp>
-      <p:sp>
-        <p:nvSpPr>
-          <p:cNvPr id="245" name="TextBox 244">
-            <a:extLst>
-              <a:ext uri="{FF2B5EF4-FFF2-40B4-BE49-F238E27FC236}">
-                <a16:creationId xmlns:a16="http://schemas.microsoft.com/office/drawing/2014/main" id="{478A620B-7BAA-C145-9119-3323DA6768E8}"/>
-              </a:ext>
-            </a:extLst>
-          </p:cNvPr>
-          <p:cNvSpPr txBox="1"/>
-          <p:nvPr/>
-        </p:nvSpPr>
-        <p:spPr>
-          <a:xfrm>
-            <a:off x="3928038" y="4278895"/>
-            <a:ext cx="409152" cy="461665"/>
-          </a:xfrm>
-          <a:prstGeom prst="rect">
-            <a:avLst/>
-          </a:prstGeom>
-          <a:solidFill>
-            <a:schemeClr val="bg1">
-              <a:lumMod val="50000"/>
-            </a:schemeClr>
-          </a:solidFill>
-        </p:spPr>
-        <p:txBody>
-          <a:bodyPr wrap="square" rtlCol="0">
-            <a:spAutoFit/>
-          </a:bodyPr>
-          <a:lstStyle/>
-          <a:p>
-            <a:pPr algn="ctr"/>
-            <a:r>
-              <a:rPr lang="en-AU" sz="2400" dirty="0">
-                <a:solidFill>
-                  <a:schemeClr val="bg1"/>
-                </a:solidFill>
-              </a:rPr>
-              <a:t>C</a:t>
-            </a:r>
-          </a:p>
-        </p:txBody>
-      </p:sp>
+            <a:endParaRPr lang="en-AU"/>
+          </a:p>
+        </p:txBody>
+      </p:sp>
+      <p:cxnSp>
+        <p:nvCxnSpPr>
+          <p:cNvPr id="121" name="Straight Connector 120">
+            <a:extLst>
+              <a:ext uri="{FF2B5EF4-FFF2-40B4-BE49-F238E27FC236}">
+                <a16:creationId xmlns:a16="http://schemas.microsoft.com/office/drawing/2014/main" id="{F6453A60-907B-B44D-8EF9-71C8D8EB2DA3}"/>
+              </a:ext>
+            </a:extLst>
+          </p:cNvPr>
+          <p:cNvCxnSpPr>
+            <a:cxnSpLocks/>
+          </p:cNvCxnSpPr>
+          <p:nvPr/>
+        </p:nvCxnSpPr>
+        <p:spPr>
+          <a:xfrm flipV="1">
+            <a:off x="6489996" y="7049592"/>
+            <a:ext cx="0" cy="938269"/>
+          </a:xfrm>
+          <a:prstGeom prst="line">
+            <a:avLst/>
+          </a:prstGeom>
+          <a:ln w="60325">
+            <a:solidFill>
+              <a:srgbClr val="00B050"/>
+            </a:solidFill>
+            <a:headEnd type="stealth" w="lg" len="lg"/>
+          </a:ln>
+        </p:spPr>
+        <p:style>
+          <a:lnRef idx="1">
+            <a:schemeClr val="accent1"/>
+          </a:lnRef>
+          <a:fillRef idx="0">
+            <a:schemeClr val="accent1"/>
+          </a:fillRef>
+          <a:effectRef idx="0">
+            <a:schemeClr val="accent1"/>
+          </a:effectRef>
+          <a:fontRef idx="minor">
+            <a:schemeClr val="tx1"/>
+          </a:fontRef>
+        </p:style>
+      </p:cxnSp>
     </p:spTree>
     <p:extLst>
       <p:ext uri="{BB962C8B-B14F-4D97-AF65-F5344CB8AC3E}">

</xml_diff>